<commit_message>
Started Topic 4 - AE1
</commit_message>
<xml_diff>
--- a/Topic 2 - AE1.pptx
+++ b/Topic 2 - AE1.pptx
@@ -112,6 +112,11 @@
       </a:defRPr>
     </a:lvl9pPr>
   </p:defaultTextStyle>
+  <p:extLst>
+    <p:ext uri="{EFAFB233-063F-42B5-8137-9DF3F51BA10A}">
+      <p15:sldGuideLst xmlns:p15="http://schemas.microsoft.com/office/powerpoint/2012/main"/>
+    </p:ext>
+  </p:extLst>
 </p:presentation>
 </file>
 
@@ -197,7 +202,7 @@
           <a:p>
             <a:fld id="{7D1D2ACD-840B-4FA9-9F16-DAC6CF3B9BC3}" type="datetimeFigureOut">
               <a:rPr lang="en-GB" smtClean="0"/>
-              <a:t>01/04/2018</a:t>
+              <a:t>02/04/2018</a:t>
             </a:fld>
             <a:endParaRPr lang="en-GB"/>
           </a:p>
@@ -690,27 +695,15 @@
           <a:p>
             <a:r>
               <a:rPr lang="en-GB" dirty="0"/>
-              <a:t>3</a:t>
+              <a:t>2</a:t>
             </a:r>
             <a:r>
               <a:rPr lang="en-GB" baseline="30000" dirty="0"/>
-              <a:t>rd</a:t>
+              <a:t>nd</a:t>
             </a:r>
             <a:r>
               <a:rPr lang="en-GB" dirty="0"/>
-              <a:t> point – The typical course of </a:t>
-            </a:r>
-            <a:r>
-              <a:rPr lang="en-GB"/>
-              <a:t>events [from </a:t>
-            </a:r>
-            <a:r>
-              <a:rPr lang="en-GB" dirty="0"/>
-              <a:t>the expanded </a:t>
-            </a:r>
-            <a:r>
-              <a:rPr lang="en-GB"/>
-              <a:t>use case] enabled</a:t>
+              <a:t> point – The typical course of events [from the expanded use case] enabled</a:t>
             </a:r>
           </a:p>
         </p:txBody>
@@ -5033,7 +5026,7 @@
           <a:p>
             <a:fld id="{041B6913-160D-42A0-B0F5-1CC4E0223D66}" type="datetimeFigureOut">
               <a:rPr lang="en-GB" smtClean="0"/>
-              <a:t>01/04/2018</a:t>
+              <a:t>02/04/2018</a:t>
             </a:fld>
             <a:endParaRPr lang="en-GB"/>
           </a:p>
@@ -5101,6 +5094,18 @@
   <p:clrMapOvr>
     <a:masterClrMapping/>
   </p:clrMapOvr>
+  <mc:AlternateContent xmlns:mc="http://schemas.openxmlformats.org/markup-compatibility/2006" xmlns:p14="http://schemas.microsoft.com/office/powerpoint/2010/main">
+    <mc:Choice Requires="p14">
+      <p:transition spd="slow" p14:dur="1600">
+        <p:blinds dir="vert"/>
+      </p:transition>
+    </mc:Choice>
+    <mc:Fallback xmlns="">
+      <p:transition spd="slow">
+        <p:blinds dir="vert"/>
+      </p:transition>
+    </mc:Fallback>
+  </mc:AlternateContent>
 </p:sldLayout>
 </file>
 
@@ -5300,7 +5305,7 @@
           <a:p>
             <a:fld id="{041B6913-160D-42A0-B0F5-1CC4E0223D66}" type="datetimeFigureOut">
               <a:rPr lang="en-GB" smtClean="0"/>
-              <a:t>01/04/2018</a:t>
+              <a:t>02/04/2018</a:t>
             </a:fld>
             <a:endParaRPr lang="en-GB"/>
           </a:p>
@@ -5358,6 +5363,18 @@
   <p:clrMapOvr>
     <a:masterClrMapping/>
   </p:clrMapOvr>
+  <mc:AlternateContent xmlns:mc="http://schemas.openxmlformats.org/markup-compatibility/2006" xmlns:p14="http://schemas.microsoft.com/office/powerpoint/2010/main">
+    <mc:Choice Requires="p14">
+      <p:transition spd="slow" p14:dur="1600">
+        <p:blinds dir="vert"/>
+      </p:transition>
+    </mc:Choice>
+    <mc:Fallback xmlns="">
+      <p:transition spd="slow">
+        <p:blinds dir="vert"/>
+      </p:transition>
+    </mc:Fallback>
+  </mc:AlternateContent>
 </p:sldLayout>
 </file>
 
@@ -5496,7 +5513,7 @@
           <a:p>
             <a:fld id="{041B6913-160D-42A0-B0F5-1CC4E0223D66}" type="datetimeFigureOut">
               <a:rPr lang="en-GB" smtClean="0"/>
-              <a:t>01/04/2018</a:t>
+              <a:t>02/04/2018</a:t>
             </a:fld>
             <a:endParaRPr lang="en-GB"/>
           </a:p>
@@ -5554,6 +5571,18 @@
   <p:clrMapOvr>
     <a:masterClrMapping/>
   </p:clrMapOvr>
+  <mc:AlternateContent xmlns:mc="http://schemas.openxmlformats.org/markup-compatibility/2006" xmlns:p14="http://schemas.microsoft.com/office/powerpoint/2010/main">
+    <mc:Choice Requires="p14">
+      <p:transition spd="slow" p14:dur="1600">
+        <p:blinds dir="vert"/>
+      </p:transition>
+    </mc:Choice>
+    <mc:Fallback xmlns="">
+      <p:transition spd="slow">
+        <p:blinds dir="vert"/>
+      </p:transition>
+    </mc:Fallback>
+  </mc:AlternateContent>
 </p:sldLayout>
 </file>
 
@@ -5759,7 +5788,7 @@
           <a:p>
             <a:fld id="{041B6913-160D-42A0-B0F5-1CC4E0223D66}" type="datetimeFigureOut">
               <a:rPr lang="en-GB" smtClean="0"/>
-              <a:t>01/04/2018</a:t>
+              <a:t>02/04/2018</a:t>
             </a:fld>
             <a:endParaRPr lang="en-GB"/>
           </a:p>
@@ -6055,6 +6084,18 @@
   <p:clrMapOvr>
     <a:masterClrMapping/>
   </p:clrMapOvr>
+  <mc:AlternateContent xmlns:mc="http://schemas.openxmlformats.org/markup-compatibility/2006" xmlns:p14="http://schemas.microsoft.com/office/powerpoint/2010/main">
+    <mc:Choice Requires="p14">
+      <p:transition spd="slow" p14:dur="1600">
+        <p:blinds dir="vert"/>
+      </p:transition>
+    </mc:Choice>
+    <mc:Fallback xmlns="">
+      <p:transition spd="slow">
+        <p:blinds dir="vert"/>
+      </p:transition>
+    </mc:Fallback>
+  </mc:AlternateContent>
 </p:sldLayout>
 </file>
 
@@ -6193,7 +6234,7 @@
           <a:p>
             <a:fld id="{041B6913-160D-42A0-B0F5-1CC4E0223D66}" type="datetimeFigureOut">
               <a:rPr lang="en-GB" smtClean="0"/>
-              <a:t>01/04/2018</a:t>
+              <a:t>02/04/2018</a:t>
             </a:fld>
             <a:endParaRPr lang="en-GB"/>
           </a:p>
@@ -6251,6 +6292,18 @@
   <p:clrMapOvr>
     <a:masterClrMapping/>
   </p:clrMapOvr>
+  <mc:AlternateContent xmlns:mc="http://schemas.openxmlformats.org/markup-compatibility/2006" xmlns:p14="http://schemas.microsoft.com/office/powerpoint/2010/main">
+    <mc:Choice Requires="p14">
+      <p:transition spd="slow" p14:dur="1600">
+        <p:blinds dir="vert"/>
+      </p:transition>
+    </mc:Choice>
+    <mc:Fallback xmlns="">
+      <p:transition spd="slow">
+        <p:blinds dir="vert"/>
+      </p:transition>
+    </mc:Fallback>
+  </mc:AlternateContent>
 </p:sldLayout>
 </file>
 
@@ -6739,7 +6792,7 @@
           <a:p>
             <a:fld id="{041B6913-160D-42A0-B0F5-1CC4E0223D66}" type="datetimeFigureOut">
               <a:rPr lang="en-GB" smtClean="0"/>
-              <a:t>01/04/2018</a:t>
+              <a:t>02/04/2018</a:t>
             </a:fld>
             <a:endParaRPr lang="en-GB"/>
           </a:p>
@@ -6797,6 +6850,18 @@
   <p:clrMapOvr>
     <a:masterClrMapping/>
   </p:clrMapOvr>
+  <mc:AlternateContent xmlns:mc="http://schemas.openxmlformats.org/markup-compatibility/2006" xmlns:p14="http://schemas.microsoft.com/office/powerpoint/2010/main">
+    <mc:Choice Requires="p14">
+      <p:transition spd="slow" p14:dur="1600">
+        <p:blinds dir="vert"/>
+      </p:transition>
+    </mc:Choice>
+    <mc:Fallback xmlns="">
+      <p:transition spd="slow">
+        <p:blinds dir="vert"/>
+      </p:transition>
+    </mc:Fallback>
+  </mc:AlternateContent>
 </p:sldLayout>
 </file>
 
@@ -7459,7 +7524,7 @@
           <a:p>
             <a:fld id="{041B6913-160D-42A0-B0F5-1CC4E0223D66}" type="datetimeFigureOut">
               <a:rPr lang="en-GB" smtClean="0"/>
-              <a:t>01/04/2018</a:t>
+              <a:t>02/04/2018</a:t>
             </a:fld>
             <a:endParaRPr lang="en-GB"/>
           </a:p>
@@ -7517,6 +7582,18 @@
   <p:clrMapOvr>
     <a:masterClrMapping/>
   </p:clrMapOvr>
+  <mc:AlternateContent xmlns:mc="http://schemas.openxmlformats.org/markup-compatibility/2006" xmlns:p14="http://schemas.microsoft.com/office/powerpoint/2010/main">
+    <mc:Choice Requires="p14">
+      <p:transition spd="slow" p14:dur="1600">
+        <p:blinds dir="vert"/>
+      </p:transition>
+    </mc:Choice>
+    <mc:Fallback xmlns="">
+      <p:transition spd="slow">
+        <p:blinds dir="vert"/>
+      </p:transition>
+    </mc:Fallback>
+  </mc:AlternateContent>
 </p:sldLayout>
 </file>
 
@@ -7629,7 +7706,7 @@
           <a:p>
             <a:fld id="{041B6913-160D-42A0-B0F5-1CC4E0223D66}" type="datetimeFigureOut">
               <a:rPr lang="en-GB" smtClean="0"/>
-              <a:t>01/04/2018</a:t>
+              <a:t>02/04/2018</a:t>
             </a:fld>
             <a:endParaRPr lang="en-GB"/>
           </a:p>
@@ -7687,6 +7764,18 @@
   <p:clrMapOvr>
     <a:masterClrMapping/>
   </p:clrMapOvr>
+  <mc:AlternateContent xmlns:mc="http://schemas.openxmlformats.org/markup-compatibility/2006" xmlns:p14="http://schemas.microsoft.com/office/powerpoint/2010/main">
+    <mc:Choice Requires="p14">
+      <p:transition spd="slow" p14:dur="1600">
+        <p:blinds dir="vert"/>
+      </p:transition>
+    </mc:Choice>
+    <mc:Fallback xmlns="">
+      <p:transition spd="slow">
+        <p:blinds dir="vert"/>
+      </p:transition>
+    </mc:Fallback>
+  </mc:AlternateContent>
 </p:sldLayout>
 </file>
 
@@ -7809,7 +7898,7 @@
           <a:p>
             <a:fld id="{041B6913-160D-42A0-B0F5-1CC4E0223D66}" type="datetimeFigureOut">
               <a:rPr lang="en-GB" smtClean="0"/>
-              <a:t>01/04/2018</a:t>
+              <a:t>02/04/2018</a:t>
             </a:fld>
             <a:endParaRPr lang="en-GB"/>
           </a:p>
@@ -7867,6 +7956,18 @@
   <p:clrMapOvr>
     <a:masterClrMapping/>
   </p:clrMapOvr>
+  <mc:AlternateContent xmlns:mc="http://schemas.openxmlformats.org/markup-compatibility/2006" xmlns:p14="http://schemas.microsoft.com/office/powerpoint/2010/main">
+    <mc:Choice Requires="p14">
+      <p:transition spd="slow" p14:dur="1600">
+        <p:blinds dir="vert"/>
+      </p:transition>
+    </mc:Choice>
+    <mc:Fallback xmlns="">
+      <p:transition spd="slow">
+        <p:blinds dir="vert"/>
+      </p:transition>
+    </mc:Fallback>
+  </mc:AlternateContent>
 </p:sldLayout>
 </file>
 
@@ -7979,7 +8080,7 @@
           <a:p>
             <a:fld id="{041B6913-160D-42A0-B0F5-1CC4E0223D66}" type="datetimeFigureOut">
               <a:rPr lang="en-GB" smtClean="0"/>
-              <a:t>01/04/2018</a:t>
+              <a:t>02/04/2018</a:t>
             </a:fld>
             <a:endParaRPr lang="en-GB"/>
           </a:p>
@@ -8037,6 +8138,18 @@
   <p:clrMapOvr>
     <a:masterClrMapping/>
   </p:clrMapOvr>
+  <mc:AlternateContent xmlns:mc="http://schemas.openxmlformats.org/markup-compatibility/2006" xmlns:p14="http://schemas.microsoft.com/office/powerpoint/2010/main">
+    <mc:Choice Requires="p14">
+      <p:transition spd="slow" p14:dur="1600">
+        <p:blinds dir="vert"/>
+      </p:transition>
+    </mc:Choice>
+    <mc:Fallback xmlns="">
+      <p:transition spd="slow">
+        <p:blinds dir="vert"/>
+      </p:transition>
+    </mc:Fallback>
+  </mc:AlternateContent>
 </p:sldLayout>
 </file>
 
@@ -8229,7 +8342,7 @@
           <a:p>
             <a:fld id="{041B6913-160D-42A0-B0F5-1CC4E0223D66}" type="datetimeFigureOut">
               <a:rPr lang="en-GB" smtClean="0"/>
-              <a:t>01/04/2018</a:t>
+              <a:t>02/04/2018</a:t>
             </a:fld>
             <a:endParaRPr lang="en-GB"/>
           </a:p>
@@ -8287,6 +8400,18 @@
   <p:clrMapOvr>
     <a:masterClrMapping/>
   </p:clrMapOvr>
+  <mc:AlternateContent xmlns:mc="http://schemas.openxmlformats.org/markup-compatibility/2006" xmlns:p14="http://schemas.microsoft.com/office/powerpoint/2010/main">
+    <mc:Choice Requires="p14">
+      <p:transition spd="slow" p14:dur="1600">
+        <p:blinds dir="vert"/>
+      </p:transition>
+    </mc:Choice>
+    <mc:Fallback xmlns="">
+      <p:transition spd="slow">
+        <p:blinds dir="vert"/>
+      </p:transition>
+    </mc:Fallback>
+  </mc:AlternateContent>
 </p:sldLayout>
 </file>
 
@@ -8461,7 +8586,7 @@
           <a:p>
             <a:fld id="{041B6913-160D-42A0-B0F5-1CC4E0223D66}" type="datetimeFigureOut">
               <a:rPr lang="en-GB" smtClean="0"/>
-              <a:t>01/04/2018</a:t>
+              <a:t>02/04/2018</a:t>
             </a:fld>
             <a:endParaRPr lang="en-GB"/>
           </a:p>
@@ -8519,6 +8644,18 @@
   <p:clrMapOvr>
     <a:masterClrMapping/>
   </p:clrMapOvr>
+  <mc:AlternateContent xmlns:mc="http://schemas.openxmlformats.org/markup-compatibility/2006" xmlns:p14="http://schemas.microsoft.com/office/powerpoint/2010/main">
+    <mc:Choice Requires="p14">
+      <p:transition spd="slow" p14:dur="1600">
+        <p:blinds dir="vert"/>
+      </p:transition>
+    </mc:Choice>
+    <mc:Fallback xmlns="">
+      <p:transition spd="slow">
+        <p:blinds dir="vert"/>
+      </p:transition>
+    </mc:Fallback>
+  </mc:AlternateContent>
 </p:sldLayout>
 </file>
 
@@ -8842,7 +8979,7 @@
           <a:p>
             <a:fld id="{041B6913-160D-42A0-B0F5-1CC4E0223D66}" type="datetimeFigureOut">
               <a:rPr lang="en-GB" smtClean="0"/>
-              <a:t>01/04/2018</a:t>
+              <a:t>02/04/2018</a:t>
             </a:fld>
             <a:endParaRPr lang="en-GB"/>
           </a:p>
@@ -8900,6 +9037,18 @@
   <p:clrMapOvr>
     <a:masterClrMapping/>
   </p:clrMapOvr>
+  <mc:AlternateContent xmlns:mc="http://schemas.openxmlformats.org/markup-compatibility/2006" xmlns:p14="http://schemas.microsoft.com/office/powerpoint/2010/main">
+    <mc:Choice Requires="p14">
+      <p:transition spd="slow" p14:dur="1600">
+        <p:blinds dir="vert"/>
+      </p:transition>
+    </mc:Choice>
+    <mc:Fallback xmlns="">
+      <p:transition spd="slow">
+        <p:blinds dir="vert"/>
+      </p:transition>
+    </mc:Fallback>
+  </mc:AlternateContent>
 </p:sldLayout>
 </file>
 
@@ -8960,7 +9109,7 @@
           <a:p>
             <a:fld id="{041B6913-160D-42A0-B0F5-1CC4E0223D66}" type="datetimeFigureOut">
               <a:rPr lang="en-GB" smtClean="0"/>
-              <a:t>01/04/2018</a:t>
+              <a:t>02/04/2018</a:t>
             </a:fld>
             <a:endParaRPr lang="en-GB"/>
           </a:p>
@@ -9018,6 +9167,18 @@
   <p:clrMapOvr>
     <a:masterClrMapping/>
   </p:clrMapOvr>
+  <mc:AlternateContent xmlns:mc="http://schemas.openxmlformats.org/markup-compatibility/2006" xmlns:p14="http://schemas.microsoft.com/office/powerpoint/2010/main">
+    <mc:Choice Requires="p14">
+      <p:transition spd="slow" p14:dur="1600">
+        <p:blinds dir="vert"/>
+      </p:transition>
+    </mc:Choice>
+    <mc:Fallback xmlns="">
+      <p:transition spd="slow">
+        <p:blinds dir="vert"/>
+      </p:transition>
+    </mc:Fallback>
+  </mc:AlternateContent>
 </p:sldLayout>
 </file>
 
@@ -9055,7 +9216,7 @@
           <a:p>
             <a:fld id="{041B6913-160D-42A0-B0F5-1CC4E0223D66}" type="datetimeFigureOut">
               <a:rPr lang="en-GB" smtClean="0"/>
-              <a:t>01/04/2018</a:t>
+              <a:t>02/04/2018</a:t>
             </a:fld>
             <a:endParaRPr lang="en-GB"/>
           </a:p>
@@ -9113,6 +9274,18 @@
   <p:clrMapOvr>
     <a:masterClrMapping/>
   </p:clrMapOvr>
+  <mc:AlternateContent xmlns:mc="http://schemas.openxmlformats.org/markup-compatibility/2006" xmlns:p14="http://schemas.microsoft.com/office/powerpoint/2010/main">
+    <mc:Choice Requires="p14">
+      <p:transition spd="slow" p14:dur="1600">
+        <p:blinds dir="vert"/>
+      </p:transition>
+    </mc:Choice>
+    <mc:Fallback xmlns="">
+      <p:transition spd="slow">
+        <p:blinds dir="vert"/>
+      </p:transition>
+    </mc:Fallback>
+  </mc:AlternateContent>
 </p:sldLayout>
 </file>
 
@@ -9304,7 +9477,7 @@
           <a:p>
             <a:fld id="{041B6913-160D-42A0-B0F5-1CC4E0223D66}" type="datetimeFigureOut">
               <a:rPr lang="en-GB" smtClean="0"/>
-              <a:t>01/04/2018</a:t>
+              <a:t>02/04/2018</a:t>
             </a:fld>
             <a:endParaRPr lang="en-GB"/>
           </a:p>
@@ -9362,6 +9535,18 @@
   <p:clrMapOvr>
     <a:masterClrMapping/>
   </p:clrMapOvr>
+  <mc:AlternateContent xmlns:mc="http://schemas.openxmlformats.org/markup-compatibility/2006" xmlns:p14="http://schemas.microsoft.com/office/powerpoint/2010/main">
+    <mc:Choice Requires="p14">
+      <p:transition spd="slow" p14:dur="1600">
+        <p:blinds dir="vert"/>
+      </p:transition>
+    </mc:Choice>
+    <mc:Fallback xmlns="">
+      <p:transition spd="slow">
+        <p:blinds dir="vert"/>
+      </p:transition>
+    </mc:Fallback>
+  </mc:AlternateContent>
 </p:sldLayout>
 </file>
 
@@ -9584,7 +9769,7 @@
           <a:p>
             <a:fld id="{041B6913-160D-42A0-B0F5-1CC4E0223D66}" type="datetimeFigureOut">
               <a:rPr lang="en-GB" smtClean="0"/>
-              <a:t>01/04/2018</a:t>
+              <a:t>02/04/2018</a:t>
             </a:fld>
             <a:endParaRPr lang="en-GB"/>
           </a:p>
@@ -9642,6 +9827,18 @@
   <p:clrMapOvr>
     <a:masterClrMapping/>
   </p:clrMapOvr>
+  <mc:AlternateContent xmlns:mc="http://schemas.openxmlformats.org/markup-compatibility/2006" xmlns:p14="http://schemas.microsoft.com/office/powerpoint/2010/main">
+    <mc:Choice Requires="p14">
+      <p:transition spd="slow" p14:dur="1600">
+        <p:blinds dir="vert"/>
+      </p:transition>
+    </mc:Choice>
+    <mc:Fallback xmlns="">
+      <p:transition spd="slow">
+        <p:blinds dir="vert"/>
+      </p:transition>
+    </mc:Fallback>
+  </mc:AlternateContent>
 </p:sldLayout>
 </file>
 
@@ -12651,7 +12848,7 @@
           <a:p>
             <a:fld id="{041B6913-160D-42A0-B0F5-1CC4E0223D66}" type="datetimeFigureOut">
               <a:rPr lang="en-GB" smtClean="0"/>
-              <a:t>01/04/2018</a:t>
+              <a:t>02/04/2018</a:t>
             </a:fld>
             <a:endParaRPr lang="en-GB"/>
           </a:p>
@@ -12762,6 +12959,18 @@
     <p:sldLayoutId id="2147483706" r:id="rId16"/>
     <p:sldLayoutId id="2147483707" r:id="rId17"/>
   </p:sldLayoutIdLst>
+  <mc:AlternateContent xmlns:mc="http://schemas.openxmlformats.org/markup-compatibility/2006" xmlns:p14="http://schemas.microsoft.com/office/powerpoint/2010/main">
+    <mc:Choice Requires="p14">
+      <p:transition spd="slow" p14:dur="1600">
+        <p:blinds dir="vert"/>
+      </p:transition>
+    </mc:Choice>
+    <mc:Fallback xmlns="">
+      <p:transition spd="slow">
+        <p:blinds dir="vert"/>
+      </p:transition>
+    </mc:Fallback>
+  </mc:AlternateContent>
   <p:txStyles>
     <p:titleStyle>
       <a:lvl1pPr algn="l" defTabSz="914400" rtl="0" eaLnBrk="1" latinLnBrk="0" hangingPunct="1">
@@ -13141,15 +13350,15 @@
   <p:clrMapOvr>
     <a:masterClrMapping/>
   </p:clrMapOvr>
-  <mc:AlternateContent xmlns:mc="http://schemas.openxmlformats.org/markup-compatibility/2006">
-    <mc:Choice xmlns:p14="http://schemas.microsoft.com/office/powerpoint/2010/main" Requires="p14">
-      <p:transition spd="med" p14:dur="700">
-        <p:fade/>
+  <mc:AlternateContent xmlns:mc="http://schemas.openxmlformats.org/markup-compatibility/2006" xmlns:p14="http://schemas.microsoft.com/office/powerpoint/2010/main">
+    <mc:Choice Requires="p14">
+      <p:transition spd="slow" p14:dur="1600">
+        <p:blinds dir="vert"/>
       </p:transition>
     </mc:Choice>
-    <mc:Fallback>
-      <p:transition spd="med">
-        <p:fade/>
+    <mc:Fallback xmlns="">
+      <p:transition spd="slow">
+        <p:blinds dir="vert"/>
       </p:transition>
     </mc:Fallback>
   </mc:AlternateContent>
@@ -13267,15 +13476,15 @@
   <p:clrMapOvr>
     <a:masterClrMapping/>
   </p:clrMapOvr>
-  <mc:AlternateContent xmlns:mc="http://schemas.openxmlformats.org/markup-compatibility/2006">
-    <mc:Choice xmlns:p14="http://schemas.microsoft.com/office/powerpoint/2010/main" Requires="p14">
-      <p:transition spd="med" p14:dur="700">
-        <p:fade/>
+  <mc:AlternateContent xmlns:mc="http://schemas.openxmlformats.org/markup-compatibility/2006" xmlns:p14="http://schemas.microsoft.com/office/powerpoint/2010/main">
+    <mc:Choice Requires="p14">
+      <p:transition spd="slow" p14:dur="1600">
+        <p:blinds dir="vert"/>
       </p:transition>
     </mc:Choice>
-    <mc:Fallback>
-      <p:transition spd="med">
-        <p:fade/>
+    <mc:Fallback xmlns="">
+      <p:transition spd="slow">
+        <p:blinds dir="vert"/>
       </p:transition>
     </mc:Fallback>
   </mc:AlternateContent>
@@ -13713,7 +13922,7 @@
           <a:p>
             <a:r>
               <a:rPr lang="en-GB" dirty="0"/>
-              <a:t>The functions and processes of the system software were derived from the product backlog of this project.</a:t>
+              <a:t>The functions and processes of the system software were derived from the user stories of this project.</a:t>
             </a:r>
           </a:p>
           <a:p>
@@ -13722,7 +13931,15 @@
           <a:p>
             <a:r>
               <a:rPr lang="en-GB" dirty="0"/>
-              <a:t>From these functions, the team was able to prioritize each function into primary and secondary functions. </a:t>
+              <a:t>From these functions, the team was able </a:t>
+            </a:r>
+            <a:r>
+              <a:rPr lang="en-GB"/>
+              <a:t>to categorise </a:t>
+            </a:r>
+            <a:r>
+              <a:rPr lang="en-GB" dirty="0"/>
+              <a:t>each function into primary and secondary functions. </a:t>
             </a:r>
           </a:p>
           <a:p>
@@ -13746,15 +13963,15 @@
   <p:clrMapOvr>
     <a:masterClrMapping/>
   </p:clrMapOvr>
-  <mc:AlternateContent xmlns:mc="http://schemas.openxmlformats.org/markup-compatibility/2006">
-    <mc:Choice xmlns:p14="http://schemas.microsoft.com/office/powerpoint/2010/main" Requires="p14">
-      <p:transition spd="med" p14:dur="700">
-        <p:fade/>
+  <mc:AlternateContent xmlns:mc="http://schemas.openxmlformats.org/markup-compatibility/2006" xmlns:p14="http://schemas.microsoft.com/office/powerpoint/2010/main">
+    <mc:Choice Requires="p14">
+      <p:transition spd="slow" p14:dur="1600">
+        <p:blinds dir="vert"/>
       </p:transition>
     </mc:Choice>
-    <mc:Fallback>
-      <p:transition spd="med">
-        <p:fade/>
+    <mc:Fallback xmlns="">
+      <p:transition spd="slow">
+        <p:blinds dir="vert"/>
       </p:transition>
     </mc:Fallback>
   </mc:AlternateContent>
@@ -14233,7 +14450,7 @@
             </a:pPr>
             <a:r>
               <a:rPr lang="en-US" sz="2200" dirty="0"/>
-              <a:t>The use case diagram provided a clear visual flow but was unable to explain each step clearly.</a:t>
+              <a:t>The use case diagram provided a clear visual flow but was unable to describe some steps in more detail.</a:t>
             </a:r>
           </a:p>
           <a:p>
@@ -14271,7 +14488,7 @@
             </a:pPr>
             <a:r>
               <a:rPr lang="en-US" sz="2200" dirty="0"/>
-              <a:t>Thus, expanded use cases were needed to obtain an in-depth knowledge of these functions.</a:t>
+              <a:t>Thus, expanded use cases were created to obtain an in-depth knowledge of these functions.</a:t>
             </a:r>
           </a:p>
           <a:p>
@@ -14322,10 +14539,10 @@
       </p:pic>
       <p:pic>
         <p:nvPicPr>
-          <p:cNvPr id="20" name="Picture 19" descr="A screenshot of a cell phone&#10;&#10;Description generated with very high confidence">
+          <p:cNvPr id="4" name="Picture 3" descr="A screenshot of a cell phone&#10;&#10;Description generated with high confidence">
             <a:extLst>
               <a:ext uri="{FF2B5EF4-FFF2-40B4-BE49-F238E27FC236}">
-                <a16:creationId xmlns:a16="http://schemas.microsoft.com/office/drawing/2014/main" id="{9E3E8F09-DDC1-4E65-8AFD-9A204BBB608D}"/>
+                <a16:creationId xmlns:a16="http://schemas.microsoft.com/office/drawing/2014/main" id="{E0847DF7-0289-4DEB-B311-F114535A7A2D}"/>
               </a:ext>
             </a:extLst>
           </p:cNvPr>
@@ -14349,7 +14566,7 @@
         <p:spPr>
           <a:xfrm>
             <a:off x="1141413" y="4058816"/>
-            <a:ext cx="3180313" cy="2626203"/>
+            <a:ext cx="3180312" cy="2626202"/>
           </a:xfrm>
           <a:prstGeom prst="rect">
             <a:avLst/>
@@ -14366,15 +14583,15 @@
   <p:clrMapOvr>
     <a:masterClrMapping/>
   </p:clrMapOvr>
-  <mc:AlternateContent xmlns:mc="http://schemas.openxmlformats.org/markup-compatibility/2006">
-    <mc:Choice xmlns:p14="http://schemas.microsoft.com/office/powerpoint/2010/main" Requires="p14">
-      <p:transition spd="med" p14:dur="700">
-        <p:fade/>
+  <mc:AlternateContent xmlns:mc="http://schemas.openxmlformats.org/markup-compatibility/2006" xmlns:p14="http://schemas.microsoft.com/office/powerpoint/2010/main">
+    <mc:Choice Requires="p14">
+      <p:transition spd="slow" p14:dur="1600">
+        <p:blinds dir="vert"/>
       </p:transition>
     </mc:Choice>
-    <mc:Fallback>
-      <p:transition spd="med">
-        <p:fade/>
+    <mc:Fallback xmlns="">
+      <p:transition spd="slow">
+        <p:blinds dir="vert"/>
       </p:transition>
     </mc:Fallback>
   </mc:AlternateContent>
@@ -14735,7 +14952,7 @@
                                           </p:stCondLst>
                                         </p:cTn>
                                         <p:tgtEl>
-                                          <p:spTgt spid="20"/>
+                                          <p:spTgt spid="4"/>
                                         </p:tgtEl>
                                         <p:attrNameLst>
                                           <p:attrName>style.visibility</p:attrName>
@@ -14749,7 +14966,7 @@
                                       <p:cBhvr>
                                         <p:cTn id="34" dur="500"/>
                                         <p:tgtEl>
-                                          <p:spTgt spid="20"/>
+                                          <p:spTgt spid="4"/>
                                         </p:tgtEl>
                                       </p:cBhvr>
                                     </p:animEffect>
@@ -14952,7 +15169,7 @@
           <a:p>
             <a:r>
               <a:rPr lang="en-GB" dirty="0"/>
-              <a:t>The detailed description from the expanded use case helped the team to sort out the tasks and assign the tasks to each member.</a:t>
+              <a:t>The detailed description from the expanded use case helped the team to sort out the weight of the tasks and assign them to each member equally.</a:t>
             </a:r>
           </a:p>
           <a:p>
@@ -14961,7 +15178,7 @@
           <a:p>
             <a:r>
               <a:rPr lang="en-GB" dirty="0"/>
-              <a:t>The typical course of events enabled the team to understand the flow of process in more detail and structure the query appropriately.</a:t>
+              <a:t>The typical course of events enabled the team to understand the flow of processes in more detail and structure the query appropriately.</a:t>
             </a:r>
           </a:p>
           <a:p>
@@ -15000,15 +15217,15 @@
   <p:clrMapOvr>
     <a:masterClrMapping/>
   </p:clrMapOvr>
-  <mc:AlternateContent xmlns:mc="http://schemas.openxmlformats.org/markup-compatibility/2006">
-    <mc:Choice xmlns:p14="http://schemas.microsoft.com/office/powerpoint/2010/main" Requires="p14">
-      <p:transition spd="med" p14:dur="700">
-        <p:fade/>
+  <mc:AlternateContent xmlns:mc="http://schemas.openxmlformats.org/markup-compatibility/2006" xmlns:p14="http://schemas.microsoft.com/office/powerpoint/2010/main">
+    <mc:Choice Requires="p14">
+      <p:transition spd="slow" p14:dur="1600">
+        <p:blinds dir="vert"/>
       </p:transition>
     </mc:Choice>
-    <mc:Fallback>
-      <p:transition spd="med">
-        <p:fade/>
+    <mc:Fallback xmlns="">
+      <p:transition spd="slow">
+        <p:blinds dir="vert"/>
       </p:transition>
     </mc:Fallback>
   </mc:AlternateContent>
@@ -15128,6 +15345,41 @@
                                   </p:childTnLst>
                                 </p:cTn>
                               </p:par>
+                              <p:par>
+                                <p:cTn id="13" presetID="10" presetClass="entr" presetSubtype="0" fill="hold" nodeType="withEffect">
+                                  <p:stCondLst>
+                                    <p:cond delay="0"/>
+                                  </p:stCondLst>
+                                  <p:childTnLst>
+                                    <p:set>
+                                      <p:cBhvr>
+                                        <p:cTn id="14" dur="1" fill="hold">
+                                          <p:stCondLst>
+                                            <p:cond delay="0"/>
+                                          </p:stCondLst>
+                                        </p:cTn>
+                                        <p:tgtEl>
+                                          <p:spTgt spid="5"/>
+                                        </p:tgtEl>
+                                        <p:attrNameLst>
+                                          <p:attrName>style.visibility</p:attrName>
+                                        </p:attrNameLst>
+                                      </p:cBhvr>
+                                      <p:to>
+                                        <p:strVal val="visible"/>
+                                      </p:to>
+                                    </p:set>
+                                    <p:animEffect transition="in" filter="fade">
+                                      <p:cBhvr>
+                                        <p:cTn id="15" dur="500"/>
+                                        <p:tgtEl>
+                                          <p:spTgt spid="5"/>
+                                        </p:tgtEl>
+                                      </p:cBhvr>
+                                    </p:animEffect>
+                                  </p:childTnLst>
+                                </p:cTn>
+                              </p:par>
                             </p:childTnLst>
                           </p:cTn>
                         </p:par>
@@ -15135,26 +15387,26 @@
                     </p:cTn>
                   </p:par>
                   <p:par>
-                    <p:cTn id="13" fill="hold">
+                    <p:cTn id="16" fill="hold">
                       <p:stCondLst>
                         <p:cond delay="indefinite"/>
                       </p:stCondLst>
                       <p:childTnLst>
                         <p:par>
-                          <p:cTn id="14" fill="hold">
+                          <p:cTn id="17" fill="hold">
                             <p:stCondLst>
                               <p:cond delay="0"/>
                             </p:stCondLst>
                             <p:childTnLst>
                               <p:par>
-                                <p:cTn id="15" presetID="10" presetClass="entr" presetSubtype="0" fill="hold" nodeType="clickEffect">
+                                <p:cTn id="18" presetID="10" presetClass="entr" presetSubtype="0" fill="hold" nodeType="clickEffect">
                                   <p:stCondLst>
                                     <p:cond delay="0"/>
                                   </p:stCondLst>
                                   <p:childTnLst>
                                     <p:set>
                                       <p:cBhvr>
-                                        <p:cTn id="16" dur="1" fill="hold">
+                                        <p:cTn id="19" dur="1" fill="hold">
                                           <p:stCondLst>
                                             <p:cond delay="0"/>
                                           </p:stCondLst>
@@ -15176,48 +15428,13 @@
                                     </p:set>
                                     <p:animEffect transition="in" filter="fade">
                                       <p:cBhvr>
-                                        <p:cTn id="17" dur="500"/>
+                                        <p:cTn id="20" dur="500"/>
                                         <p:tgtEl>
                                           <p:spTgt spid="3">
                                             <p:txEl>
                                               <p:pRg st="2" end="2"/>
                                             </p:txEl>
                                           </p:spTgt>
-                                        </p:tgtEl>
-                                      </p:cBhvr>
-                                    </p:animEffect>
-                                  </p:childTnLst>
-                                </p:cTn>
-                              </p:par>
-                              <p:par>
-                                <p:cTn id="18" presetID="10" presetClass="entr" presetSubtype="0" fill="hold" nodeType="withEffect">
-                                  <p:stCondLst>
-                                    <p:cond delay="0"/>
-                                  </p:stCondLst>
-                                  <p:childTnLst>
-                                    <p:set>
-                                      <p:cBhvr>
-                                        <p:cTn id="19" dur="1" fill="hold">
-                                          <p:stCondLst>
-                                            <p:cond delay="0"/>
-                                          </p:stCondLst>
-                                        </p:cTn>
-                                        <p:tgtEl>
-                                          <p:spTgt spid="5"/>
-                                        </p:tgtEl>
-                                        <p:attrNameLst>
-                                          <p:attrName>style.visibility</p:attrName>
-                                        </p:attrNameLst>
-                                      </p:cBhvr>
-                                      <p:to>
-                                        <p:strVal val="visible"/>
-                                      </p:to>
-                                    </p:set>
-                                    <p:animEffect transition="in" filter="fade">
-                                      <p:cBhvr>
-                                        <p:cTn id="20" dur="500"/>
-                                        <p:tgtEl>
-                                          <p:spTgt spid="5"/>
                                         </p:tgtEl>
                                       </p:cBhvr>
                                     </p:animEffect>
@@ -15349,15 +15566,15 @@
   <p:clrMapOvr>
     <a:masterClrMapping/>
   </p:clrMapOvr>
-  <mc:AlternateContent xmlns:mc="http://schemas.openxmlformats.org/markup-compatibility/2006">
-    <mc:Choice xmlns:p14="http://schemas.microsoft.com/office/powerpoint/2010/main" Requires="p14">
-      <p:transition spd="med" p14:dur="700">
-        <p:fade/>
+  <mc:AlternateContent xmlns:mc="http://schemas.openxmlformats.org/markup-compatibility/2006" xmlns:p14="http://schemas.microsoft.com/office/powerpoint/2010/main">
+    <mc:Choice Requires="p14">
+      <p:transition spd="slow" p14:dur="1600">
+        <p:blinds dir="vert"/>
       </p:transition>
     </mc:Choice>
-    <mc:Fallback>
-      <p:transition spd="med">
-        <p:fade/>
+    <mc:Fallback xmlns="">
+      <p:transition spd="slow">
+        <p:blinds dir="vert"/>
       </p:transition>
     </mc:Fallback>
   </mc:AlternateContent>

</xml_diff>

<commit_message>
Completed Topic 9 Presentation
</commit_message>
<xml_diff>
--- a/Topic 2 - AE1.pptx
+++ b/Topic 2 - AE1.pptx
@@ -202,7 +202,7 @@
           <a:p>
             <a:fld id="{7D1D2ACD-840B-4FA9-9F16-DAC6CF3B9BC3}" type="datetimeFigureOut">
               <a:rPr lang="en-GB" smtClean="0"/>
-              <a:t>02/04/2018</a:t>
+              <a:t>04/04/2018</a:t>
             </a:fld>
             <a:endParaRPr lang="en-GB"/>
           </a:p>
@@ -801,7 +801,7 @@
           <a:noFill/>
           <a:extLst>
             <a:ext uri="{909E8E84-426E-40dd-AFC4-6F175D3DCCD1}">
-              <a14:hiddenFill xmlns="" xmlns:a14="http://schemas.microsoft.com/office/drawing/2010/main">
+              <a14:hiddenFill xmlns:a14="http://schemas.microsoft.com/office/drawing/2010/main" xmlns="">
                 <a:solidFill>
                   <a:srgbClr val="FFFFFF"/>
                 </a:solidFill>
@@ -860,7 +860,7 @@
             </a:ln>
             <a:extLst>
               <a:ext uri="{91240B29-F687-4f45-9708-019B960494DF}">
-                <a14:hiddenLine xmlns="" xmlns:a14="http://schemas.microsoft.com/office/drawing/2010/main" w="9525">
+                <a14:hiddenLine xmlns:a14="http://schemas.microsoft.com/office/drawing/2010/main" xmlns="" w="9525">
                   <a:solidFill>
                     <a:srgbClr val="000000"/>
                   </a:solidFill>
@@ -950,7 +950,7 @@
             </a:ln>
             <a:extLst>
               <a:ext uri="{91240B29-F687-4f45-9708-019B960494DF}">
-                <a14:hiddenLine xmlns="" xmlns:a14="http://schemas.microsoft.com/office/drawing/2010/main" w="9525">
+                <a14:hiddenLine xmlns:a14="http://schemas.microsoft.com/office/drawing/2010/main" xmlns="" w="9525">
                   <a:solidFill>
                     <a:srgbClr val="000000"/>
                   </a:solidFill>
@@ -1040,7 +1040,7 @@
             </a:ln>
             <a:extLst>
               <a:ext uri="{91240B29-F687-4f45-9708-019B960494DF}">
-                <a14:hiddenLine xmlns="" xmlns:a14="http://schemas.microsoft.com/office/drawing/2010/main" w="9525">
+                <a14:hiddenLine xmlns:a14="http://schemas.microsoft.com/office/drawing/2010/main" xmlns="" w="9525">
                   <a:solidFill>
                     <a:srgbClr val="000000"/>
                   </a:solidFill>
@@ -1074,7 +1074,7 @@
             </a:ln>
             <a:extLst>
               <a:ext uri="{91240B29-F687-4f45-9708-019B960494DF}">
-                <a14:hiddenLine xmlns="" xmlns:a14="http://schemas.microsoft.com/office/drawing/2010/main" w="9525">
+                <a14:hiddenLine xmlns:a14="http://schemas.microsoft.com/office/drawing/2010/main" xmlns="" w="9525">
                   <a:solidFill>
                     <a:srgbClr val="000000"/>
                   </a:solidFill>
@@ -1164,7 +1164,7 @@
             </a:ln>
             <a:extLst>
               <a:ext uri="{91240B29-F687-4f45-9708-019B960494DF}">
-                <a14:hiddenLine xmlns="" xmlns:a14="http://schemas.microsoft.com/office/drawing/2010/main" w="9525">
+                <a14:hiddenLine xmlns:a14="http://schemas.microsoft.com/office/drawing/2010/main" xmlns="" w="9525">
                   <a:solidFill>
                     <a:srgbClr val="000000"/>
                   </a:solidFill>
@@ -1226,7 +1226,7 @@
             </a:ln>
             <a:extLst>
               <a:ext uri="{91240B29-F687-4f45-9708-019B960494DF}">
-                <a14:hiddenLine xmlns="" xmlns:a14="http://schemas.microsoft.com/office/drawing/2010/main" w="9525">
+                <a14:hiddenLine xmlns:a14="http://schemas.microsoft.com/office/drawing/2010/main" xmlns="" w="9525">
                   <a:solidFill>
                     <a:srgbClr val="000000"/>
                   </a:solidFill>
@@ -1288,7 +1288,7 @@
             </a:ln>
             <a:extLst>
               <a:ext uri="{91240B29-F687-4f45-9708-019B960494DF}">
-                <a14:hiddenLine xmlns="" xmlns:a14="http://schemas.microsoft.com/office/drawing/2010/main" w="9525">
+                <a14:hiddenLine xmlns:a14="http://schemas.microsoft.com/office/drawing/2010/main" xmlns="" w="9525">
                   <a:solidFill>
                     <a:srgbClr val="000000"/>
                   </a:solidFill>
@@ -1378,7 +1378,7 @@
             </a:ln>
             <a:extLst>
               <a:ext uri="{91240B29-F687-4f45-9708-019B960494DF}">
-                <a14:hiddenLine xmlns="" xmlns:a14="http://schemas.microsoft.com/office/drawing/2010/main" w="9525">
+                <a14:hiddenLine xmlns:a14="http://schemas.microsoft.com/office/drawing/2010/main" xmlns="" w="9525">
                   <a:solidFill>
                     <a:srgbClr val="000000"/>
                   </a:solidFill>
@@ -1440,7 +1440,7 @@
             </a:ln>
             <a:extLst>
               <a:ext uri="{91240B29-F687-4f45-9708-019B960494DF}">
-                <a14:hiddenLine xmlns="" xmlns:a14="http://schemas.microsoft.com/office/drawing/2010/main" w="9525">
+                <a14:hiddenLine xmlns:a14="http://schemas.microsoft.com/office/drawing/2010/main" xmlns="" w="9525">
                   <a:solidFill>
                     <a:srgbClr val="000000"/>
                   </a:solidFill>
@@ -1502,7 +1502,7 @@
             </a:ln>
             <a:extLst>
               <a:ext uri="{91240B29-F687-4f45-9708-019B960494DF}">
-                <a14:hiddenLine xmlns="" xmlns:a14="http://schemas.microsoft.com/office/drawing/2010/main" w="9525">
+                <a14:hiddenLine xmlns:a14="http://schemas.microsoft.com/office/drawing/2010/main" xmlns="" w="9525">
                   <a:solidFill>
                     <a:srgbClr val="000000"/>
                   </a:solidFill>
@@ -1592,7 +1592,7 @@
             </a:ln>
             <a:extLst>
               <a:ext uri="{91240B29-F687-4f45-9708-019B960494DF}">
-                <a14:hiddenLine xmlns="" xmlns:a14="http://schemas.microsoft.com/office/drawing/2010/main" w="9525">
+                <a14:hiddenLine xmlns:a14="http://schemas.microsoft.com/office/drawing/2010/main" xmlns="" w="9525">
                   <a:solidFill>
                     <a:srgbClr val="000000"/>
                   </a:solidFill>
@@ -1682,7 +1682,7 @@
             </a:ln>
             <a:extLst>
               <a:ext uri="{91240B29-F687-4f45-9708-019B960494DF}">
-                <a14:hiddenLine xmlns="" xmlns:a14="http://schemas.microsoft.com/office/drawing/2010/main" w="9525">
+                <a14:hiddenLine xmlns:a14="http://schemas.microsoft.com/office/drawing/2010/main" xmlns="" w="9525">
                   <a:solidFill>
                     <a:srgbClr val="000000"/>
                   </a:solidFill>
@@ -1744,7 +1744,7 @@
             </a:ln>
             <a:extLst>
               <a:ext uri="{91240B29-F687-4f45-9708-019B960494DF}">
-                <a14:hiddenLine xmlns="" xmlns:a14="http://schemas.microsoft.com/office/drawing/2010/main" w="9525">
+                <a14:hiddenLine xmlns:a14="http://schemas.microsoft.com/office/drawing/2010/main" xmlns="" w="9525">
                   <a:solidFill>
                     <a:srgbClr val="000000"/>
                   </a:solidFill>
@@ -1854,7 +1854,7 @@
             </a:ln>
             <a:extLst>
               <a:ext uri="{91240B29-F687-4f45-9708-019B960494DF}">
-                <a14:hiddenLine xmlns="" xmlns:a14="http://schemas.microsoft.com/office/drawing/2010/main" w="9525">
+                <a14:hiddenLine xmlns:a14="http://schemas.microsoft.com/office/drawing/2010/main" xmlns="" w="9525">
                   <a:solidFill>
                     <a:srgbClr val="000000"/>
                   </a:solidFill>
@@ -1916,7 +1916,7 @@
             </a:ln>
             <a:extLst>
               <a:ext uri="{91240B29-F687-4f45-9708-019B960494DF}">
-                <a14:hiddenLine xmlns="" xmlns:a14="http://schemas.microsoft.com/office/drawing/2010/main" w="9525">
+                <a14:hiddenLine xmlns:a14="http://schemas.microsoft.com/office/drawing/2010/main" xmlns="" w="9525">
                   <a:solidFill>
                     <a:srgbClr val="000000"/>
                   </a:solidFill>
@@ -2006,7 +2006,7 @@
             </a:ln>
             <a:extLst>
               <a:ext uri="{91240B29-F687-4f45-9708-019B960494DF}">
-                <a14:hiddenLine xmlns="" xmlns:a14="http://schemas.microsoft.com/office/drawing/2010/main" w="9525">
+                <a14:hiddenLine xmlns:a14="http://schemas.microsoft.com/office/drawing/2010/main" xmlns="" w="9525">
                   <a:solidFill>
                     <a:srgbClr val="000000"/>
                   </a:solidFill>
@@ -2096,7 +2096,7 @@
             </a:ln>
             <a:extLst>
               <a:ext uri="{91240B29-F687-4f45-9708-019B960494DF}">
-                <a14:hiddenLine xmlns="" xmlns:a14="http://schemas.microsoft.com/office/drawing/2010/main" w="9525">
+                <a14:hiddenLine xmlns:a14="http://schemas.microsoft.com/office/drawing/2010/main" xmlns="" w="9525">
                   <a:solidFill>
                     <a:srgbClr val="000000"/>
                   </a:solidFill>
@@ -2158,7 +2158,7 @@
             </a:ln>
             <a:extLst>
               <a:ext uri="{91240B29-F687-4f45-9708-019B960494DF}">
-                <a14:hiddenLine xmlns="" xmlns:a14="http://schemas.microsoft.com/office/drawing/2010/main" w="9525">
+                <a14:hiddenLine xmlns:a14="http://schemas.microsoft.com/office/drawing/2010/main" xmlns="" w="9525">
                   <a:solidFill>
                     <a:srgbClr val="000000"/>
                   </a:solidFill>
@@ -2248,7 +2248,7 @@
             </a:ln>
             <a:extLst>
               <a:ext uri="{91240B29-F687-4f45-9708-019B960494DF}">
-                <a14:hiddenLine xmlns="" xmlns:a14="http://schemas.microsoft.com/office/drawing/2010/main" w="9525">
+                <a14:hiddenLine xmlns:a14="http://schemas.microsoft.com/office/drawing/2010/main" xmlns="" w="9525">
                   <a:solidFill>
                     <a:srgbClr val="000000"/>
                   </a:solidFill>
@@ -2338,7 +2338,7 @@
             </a:ln>
             <a:extLst>
               <a:ext uri="{91240B29-F687-4f45-9708-019B960494DF}">
-                <a14:hiddenLine xmlns="" xmlns:a14="http://schemas.microsoft.com/office/drawing/2010/main" w="9525">
+                <a14:hiddenLine xmlns:a14="http://schemas.microsoft.com/office/drawing/2010/main" xmlns="" w="9525">
                   <a:solidFill>
                     <a:srgbClr val="000000"/>
                   </a:solidFill>
@@ -2394,7 +2394,7 @@
             </a:ln>
             <a:extLst>
               <a:ext uri="{91240B29-F687-4f45-9708-019B960494DF}">
-                <a14:hiddenLine xmlns="" xmlns:a14="http://schemas.microsoft.com/office/drawing/2010/main" w="9525">
+                <a14:hiddenLine xmlns:a14="http://schemas.microsoft.com/office/drawing/2010/main" xmlns="" w="9525">
                   <a:solidFill>
                     <a:srgbClr val="000000"/>
                   </a:solidFill>
@@ -2484,7 +2484,7 @@
             </a:ln>
             <a:extLst>
               <a:ext uri="{91240B29-F687-4f45-9708-019B960494DF}">
-                <a14:hiddenLine xmlns="" xmlns:a14="http://schemas.microsoft.com/office/drawing/2010/main" w="9525">
+                <a14:hiddenLine xmlns:a14="http://schemas.microsoft.com/office/drawing/2010/main" xmlns="" w="9525">
                   <a:solidFill>
                     <a:srgbClr val="000000"/>
                   </a:solidFill>
@@ -2540,7 +2540,7 @@
             </a:ln>
             <a:extLst>
               <a:ext uri="{91240B29-F687-4f45-9708-019B960494DF}">
-                <a14:hiddenLine xmlns="" xmlns:a14="http://schemas.microsoft.com/office/drawing/2010/main" w="9525">
+                <a14:hiddenLine xmlns:a14="http://schemas.microsoft.com/office/drawing/2010/main" xmlns="" w="9525">
                   <a:solidFill>
                     <a:srgbClr val="000000"/>
                   </a:solidFill>
@@ -2630,7 +2630,7 @@
             </a:ln>
             <a:extLst>
               <a:ext uri="{91240B29-F687-4f45-9708-019B960494DF}">
-                <a14:hiddenLine xmlns="" xmlns:a14="http://schemas.microsoft.com/office/drawing/2010/main" w="9525">
+                <a14:hiddenLine xmlns:a14="http://schemas.microsoft.com/office/drawing/2010/main" xmlns="" w="9525">
                   <a:solidFill>
                     <a:srgbClr val="000000"/>
                   </a:solidFill>
@@ -2698,7 +2698,7 @@
             </a:ln>
             <a:extLst>
               <a:ext uri="{91240B29-F687-4f45-9708-019B960494DF}">
-                <a14:hiddenLine xmlns="" xmlns:a14="http://schemas.microsoft.com/office/drawing/2010/main" w="9525">
+                <a14:hiddenLine xmlns:a14="http://schemas.microsoft.com/office/drawing/2010/main" xmlns="" w="9525">
                   <a:solidFill>
                     <a:srgbClr val="000000"/>
                   </a:solidFill>
@@ -2788,7 +2788,7 @@
             </a:ln>
             <a:extLst>
               <a:ext uri="{91240B29-F687-4f45-9708-019B960494DF}">
-                <a14:hiddenLine xmlns="" xmlns:a14="http://schemas.microsoft.com/office/drawing/2010/main" w="9525">
+                <a14:hiddenLine xmlns:a14="http://schemas.microsoft.com/office/drawing/2010/main" xmlns="" w="9525">
                   <a:solidFill>
                     <a:srgbClr val="000000"/>
                   </a:solidFill>
@@ -2856,7 +2856,7 @@
             </a:ln>
             <a:extLst>
               <a:ext uri="{91240B29-F687-4f45-9708-019B960494DF}">
-                <a14:hiddenLine xmlns="" xmlns:a14="http://schemas.microsoft.com/office/drawing/2010/main" w="9525">
+                <a14:hiddenLine xmlns:a14="http://schemas.microsoft.com/office/drawing/2010/main" xmlns="" w="9525">
                   <a:solidFill>
                     <a:srgbClr val="000000"/>
                   </a:solidFill>
@@ -2946,7 +2946,7 @@
             </a:ln>
             <a:extLst>
               <a:ext uri="{91240B29-F687-4f45-9708-019B960494DF}">
-                <a14:hiddenLine xmlns="" xmlns:a14="http://schemas.microsoft.com/office/drawing/2010/main" w="9525">
+                <a14:hiddenLine xmlns:a14="http://schemas.microsoft.com/office/drawing/2010/main" xmlns="" w="9525">
                   <a:solidFill>
                     <a:srgbClr val="000000"/>
                   </a:solidFill>
@@ -2980,7 +2980,7 @@
             </a:ln>
             <a:extLst>
               <a:ext uri="{91240B29-F687-4f45-9708-019B960494DF}">
-                <a14:hiddenLine xmlns="" xmlns:a14="http://schemas.microsoft.com/office/drawing/2010/main" w="9525">
+                <a14:hiddenLine xmlns:a14="http://schemas.microsoft.com/office/drawing/2010/main" xmlns="" w="9525">
                   <a:solidFill>
                     <a:srgbClr val="000000"/>
                   </a:solidFill>
@@ -3070,7 +3070,7 @@
             </a:ln>
             <a:extLst>
               <a:ext uri="{91240B29-F687-4f45-9708-019B960494DF}">
-                <a14:hiddenLine xmlns="" xmlns:a14="http://schemas.microsoft.com/office/drawing/2010/main" w="9525">
+                <a14:hiddenLine xmlns:a14="http://schemas.microsoft.com/office/drawing/2010/main" xmlns="" w="9525">
                   <a:solidFill>
                     <a:srgbClr val="000000"/>
                   </a:solidFill>
@@ -3132,7 +3132,7 @@
             </a:ln>
             <a:extLst>
               <a:ext uri="{91240B29-F687-4f45-9708-019B960494DF}">
-                <a14:hiddenLine xmlns="" xmlns:a14="http://schemas.microsoft.com/office/drawing/2010/main" w="9525">
+                <a14:hiddenLine xmlns:a14="http://schemas.microsoft.com/office/drawing/2010/main" xmlns="" w="9525">
                   <a:solidFill>
                     <a:srgbClr val="000000"/>
                   </a:solidFill>
@@ -3194,7 +3194,7 @@
             </a:ln>
             <a:extLst>
               <a:ext uri="{91240B29-F687-4f45-9708-019B960494DF}">
-                <a14:hiddenLine xmlns="" xmlns:a14="http://schemas.microsoft.com/office/drawing/2010/main" w="9525">
+                <a14:hiddenLine xmlns:a14="http://schemas.microsoft.com/office/drawing/2010/main" xmlns="" w="9525">
                   <a:solidFill>
                     <a:srgbClr val="000000"/>
                   </a:solidFill>
@@ -3284,7 +3284,7 @@
             </a:ln>
             <a:extLst>
               <a:ext uri="{91240B29-F687-4f45-9708-019B960494DF}">
-                <a14:hiddenLine xmlns="" xmlns:a14="http://schemas.microsoft.com/office/drawing/2010/main" w="9525">
+                <a14:hiddenLine xmlns:a14="http://schemas.microsoft.com/office/drawing/2010/main" xmlns="" w="9525">
                   <a:solidFill>
                     <a:srgbClr val="000000"/>
                   </a:solidFill>
@@ -3352,7 +3352,7 @@
             </a:ln>
             <a:extLst>
               <a:ext uri="{91240B29-F687-4f45-9708-019B960494DF}">
-                <a14:hiddenLine xmlns="" xmlns:a14="http://schemas.microsoft.com/office/drawing/2010/main" w="9525">
+                <a14:hiddenLine xmlns:a14="http://schemas.microsoft.com/office/drawing/2010/main" xmlns="" w="9525">
                   <a:solidFill>
                     <a:srgbClr val="000000"/>
                   </a:solidFill>
@@ -3414,7 +3414,7 @@
             </a:ln>
             <a:extLst>
               <a:ext uri="{91240B29-F687-4f45-9708-019B960494DF}">
-                <a14:hiddenLine xmlns="" xmlns:a14="http://schemas.microsoft.com/office/drawing/2010/main" w="9525">
+                <a14:hiddenLine xmlns:a14="http://schemas.microsoft.com/office/drawing/2010/main" xmlns="" w="9525">
                   <a:solidFill>
                     <a:srgbClr val="000000"/>
                   </a:solidFill>
@@ -3504,7 +3504,7 @@
             </a:ln>
             <a:extLst>
               <a:ext uri="{91240B29-F687-4f45-9708-019B960494DF}">
-                <a14:hiddenLine xmlns="" xmlns:a14="http://schemas.microsoft.com/office/drawing/2010/main" w="9525">
+                <a14:hiddenLine xmlns:a14="http://schemas.microsoft.com/office/drawing/2010/main" xmlns="" w="9525">
                   <a:solidFill>
                     <a:srgbClr val="000000"/>
                   </a:solidFill>
@@ -3566,7 +3566,7 @@
             </a:ln>
             <a:extLst>
               <a:ext uri="{91240B29-F687-4f45-9708-019B960494DF}">
-                <a14:hiddenLine xmlns="" xmlns:a14="http://schemas.microsoft.com/office/drawing/2010/main" w="9525">
+                <a14:hiddenLine xmlns:a14="http://schemas.microsoft.com/office/drawing/2010/main" xmlns="" w="9525">
                   <a:solidFill>
                     <a:srgbClr val="000000"/>
                   </a:solidFill>
@@ -3656,7 +3656,7 @@
             </a:ln>
             <a:extLst>
               <a:ext uri="{91240B29-F687-4f45-9708-019B960494DF}">
-                <a14:hiddenLine xmlns="" xmlns:a14="http://schemas.microsoft.com/office/drawing/2010/main" w="9525">
+                <a14:hiddenLine xmlns:a14="http://schemas.microsoft.com/office/drawing/2010/main" xmlns="" w="9525">
                   <a:solidFill>
                     <a:srgbClr val="000000"/>
                   </a:solidFill>
@@ -3718,7 +3718,7 @@
             </a:ln>
             <a:extLst>
               <a:ext uri="{91240B29-F687-4f45-9708-019B960494DF}">
-                <a14:hiddenLine xmlns="" xmlns:a14="http://schemas.microsoft.com/office/drawing/2010/main" w="9525">
+                <a14:hiddenLine xmlns:a14="http://schemas.microsoft.com/office/drawing/2010/main" xmlns="" w="9525">
                   <a:solidFill>
                     <a:srgbClr val="000000"/>
                   </a:solidFill>
@@ -3808,7 +3808,7 @@
             </a:ln>
             <a:extLst>
               <a:ext uri="{91240B29-F687-4f45-9708-019B960494DF}">
-                <a14:hiddenLine xmlns="" xmlns:a14="http://schemas.microsoft.com/office/drawing/2010/main" w="9525">
+                <a14:hiddenLine xmlns:a14="http://schemas.microsoft.com/office/drawing/2010/main" xmlns="" w="9525">
                   <a:solidFill>
                     <a:srgbClr val="000000"/>
                   </a:solidFill>
@@ -3842,7 +3842,7 @@
             </a:ln>
             <a:extLst>
               <a:ext uri="{91240B29-F687-4f45-9708-019B960494DF}">
-                <a14:hiddenLine xmlns="" xmlns:a14="http://schemas.microsoft.com/office/drawing/2010/main" w="9525">
+                <a14:hiddenLine xmlns:a14="http://schemas.microsoft.com/office/drawing/2010/main" xmlns="" w="9525">
                   <a:solidFill>
                     <a:srgbClr val="000000"/>
                   </a:solidFill>
@@ -3907,7 +3907,7 @@
             </a:ln>
             <a:extLst>
               <a:ext uri="{91240B29-F687-4f45-9708-019B960494DF}">
-                <a14:hiddenLine xmlns="" xmlns:a14="http://schemas.microsoft.com/office/drawing/2010/main" w="9525">
+                <a14:hiddenLine xmlns:a14="http://schemas.microsoft.com/office/drawing/2010/main" xmlns="" w="9525">
                   <a:solidFill>
                     <a:srgbClr val="000000"/>
                   </a:solidFill>
@@ -3997,7 +3997,7 @@
             </a:ln>
             <a:extLst>
               <a:ext uri="{91240B29-F687-4f45-9708-019B960494DF}">
-                <a14:hiddenLine xmlns="" xmlns:a14="http://schemas.microsoft.com/office/drawing/2010/main" w="9525">
+                <a14:hiddenLine xmlns:a14="http://schemas.microsoft.com/office/drawing/2010/main" xmlns="" w="9525">
                   <a:solidFill>
                     <a:srgbClr val="000000"/>
                   </a:solidFill>
@@ -4059,7 +4059,7 @@
             </a:ln>
             <a:extLst>
               <a:ext uri="{91240B29-F687-4f45-9708-019B960494DF}">
-                <a14:hiddenLine xmlns="" xmlns:a14="http://schemas.microsoft.com/office/drawing/2010/main" w="9525">
+                <a14:hiddenLine xmlns:a14="http://schemas.microsoft.com/office/drawing/2010/main" xmlns="" w="9525">
                   <a:solidFill>
                     <a:srgbClr val="000000"/>
                   </a:solidFill>
@@ -4149,7 +4149,7 @@
             </a:ln>
             <a:extLst>
               <a:ext uri="{91240B29-F687-4f45-9708-019B960494DF}">
-                <a14:hiddenLine xmlns="" xmlns:a14="http://schemas.microsoft.com/office/drawing/2010/main" w="9525">
+                <a14:hiddenLine xmlns:a14="http://schemas.microsoft.com/office/drawing/2010/main" xmlns="" w="9525">
                   <a:solidFill>
                     <a:srgbClr val="000000"/>
                   </a:solidFill>
@@ -4239,7 +4239,7 @@
             </a:ln>
             <a:extLst>
               <a:ext uri="{91240B29-F687-4f45-9708-019B960494DF}">
-                <a14:hiddenLine xmlns="" xmlns:a14="http://schemas.microsoft.com/office/drawing/2010/main" w="9525">
+                <a14:hiddenLine xmlns:a14="http://schemas.microsoft.com/office/drawing/2010/main" xmlns="" w="9525">
                   <a:solidFill>
                     <a:srgbClr val="000000"/>
                   </a:solidFill>
@@ -4304,7 +4304,7 @@
             </a:ln>
             <a:extLst>
               <a:ext uri="{91240B29-F687-4f45-9708-019B960494DF}">
-                <a14:hiddenLine xmlns="" xmlns:a14="http://schemas.microsoft.com/office/drawing/2010/main" w="9525">
+                <a14:hiddenLine xmlns:a14="http://schemas.microsoft.com/office/drawing/2010/main" xmlns="" w="9525">
                   <a:solidFill>
                     <a:srgbClr val="000000"/>
                   </a:solidFill>
@@ -4366,7 +4366,7 @@
             </a:ln>
             <a:extLst>
               <a:ext uri="{91240B29-F687-4f45-9708-019B960494DF}">
-                <a14:hiddenLine xmlns="" xmlns:a14="http://schemas.microsoft.com/office/drawing/2010/main" w="9525">
+                <a14:hiddenLine xmlns:a14="http://schemas.microsoft.com/office/drawing/2010/main" xmlns="" w="9525">
                   <a:solidFill>
                     <a:srgbClr val="000000"/>
                   </a:solidFill>
@@ -4456,7 +4456,7 @@
             </a:ln>
             <a:extLst>
               <a:ext uri="{91240B29-F687-4f45-9708-019B960494DF}">
-                <a14:hiddenLine xmlns="" xmlns:a14="http://schemas.microsoft.com/office/drawing/2010/main" w="9525">
+                <a14:hiddenLine xmlns:a14="http://schemas.microsoft.com/office/drawing/2010/main" xmlns="" w="9525">
                   <a:solidFill>
                     <a:srgbClr val="000000"/>
                   </a:solidFill>
@@ -4546,7 +4546,7 @@
             </a:ln>
             <a:extLst>
               <a:ext uri="{91240B29-F687-4f45-9708-019B960494DF}">
-                <a14:hiddenLine xmlns="" xmlns:a14="http://schemas.microsoft.com/office/drawing/2010/main" w="9525">
+                <a14:hiddenLine xmlns:a14="http://schemas.microsoft.com/office/drawing/2010/main" xmlns="" w="9525">
                   <a:solidFill>
                     <a:srgbClr val="000000"/>
                   </a:solidFill>
@@ -4608,7 +4608,7 @@
             </a:ln>
             <a:extLst>
               <a:ext uri="{91240B29-F687-4f45-9708-019B960494DF}">
-                <a14:hiddenLine xmlns="" xmlns:a14="http://schemas.microsoft.com/office/drawing/2010/main" w="9525">
+                <a14:hiddenLine xmlns:a14="http://schemas.microsoft.com/office/drawing/2010/main" xmlns="" w="9525">
                   <a:solidFill>
                     <a:srgbClr val="000000"/>
                   </a:solidFill>
@@ -4728,7 +4728,7 @@
             </a:ln>
             <a:extLst>
               <a:ext uri="{91240B29-F687-4f45-9708-019B960494DF}">
-                <a14:hiddenLine xmlns="" xmlns:a14="http://schemas.microsoft.com/office/drawing/2010/main" w="9525">
+                <a14:hiddenLine xmlns:a14="http://schemas.microsoft.com/office/drawing/2010/main" xmlns="" w="9525">
                   <a:solidFill>
                     <a:srgbClr val="000000"/>
                   </a:solidFill>
@@ -4796,7 +4796,7 @@
             </a:ln>
             <a:extLst>
               <a:ext uri="{91240B29-F687-4f45-9708-019B960494DF}">
-                <a14:hiddenLine xmlns="" xmlns:a14="http://schemas.microsoft.com/office/drawing/2010/main" w="9525">
+                <a14:hiddenLine xmlns:a14="http://schemas.microsoft.com/office/drawing/2010/main" xmlns="" w="9525">
                   <a:solidFill>
                     <a:srgbClr val="000000"/>
                   </a:solidFill>
@@ -4886,7 +4886,7 @@
             </a:ln>
             <a:extLst>
               <a:ext uri="{91240B29-F687-4f45-9708-019B960494DF}">
-                <a14:hiddenLine xmlns="" xmlns:a14="http://schemas.microsoft.com/office/drawing/2010/main" w="9525">
+                <a14:hiddenLine xmlns:a14="http://schemas.microsoft.com/office/drawing/2010/main" xmlns="" w="9525">
                   <a:solidFill>
                     <a:srgbClr val="000000"/>
                   </a:solidFill>
@@ -5026,7 +5026,7 @@
           <a:p>
             <a:fld id="{041B6913-160D-42A0-B0F5-1CC4E0223D66}" type="datetimeFigureOut">
               <a:rPr lang="en-GB" smtClean="0"/>
-              <a:t>02/04/2018</a:t>
+              <a:t>04/04/2018</a:t>
             </a:fld>
             <a:endParaRPr lang="en-GB"/>
           </a:p>
@@ -5305,7 +5305,7 @@
           <a:p>
             <a:fld id="{041B6913-160D-42A0-B0F5-1CC4E0223D66}" type="datetimeFigureOut">
               <a:rPr lang="en-GB" smtClean="0"/>
-              <a:t>02/04/2018</a:t>
+              <a:t>04/04/2018</a:t>
             </a:fld>
             <a:endParaRPr lang="en-GB"/>
           </a:p>
@@ -5513,7 +5513,7 @@
           <a:p>
             <a:fld id="{041B6913-160D-42A0-B0F5-1CC4E0223D66}" type="datetimeFigureOut">
               <a:rPr lang="en-GB" smtClean="0"/>
-              <a:t>02/04/2018</a:t>
+              <a:t>04/04/2018</a:t>
             </a:fld>
             <a:endParaRPr lang="en-GB"/>
           </a:p>
@@ -5788,7 +5788,7 @@
           <a:p>
             <a:fld id="{041B6913-160D-42A0-B0F5-1CC4E0223D66}" type="datetimeFigureOut">
               <a:rPr lang="en-GB" smtClean="0"/>
-              <a:t>02/04/2018</a:t>
+              <a:t>04/04/2018</a:t>
             </a:fld>
             <a:endParaRPr lang="en-GB"/>
           </a:p>
@@ -6234,7 +6234,7 @@
           <a:p>
             <a:fld id="{041B6913-160D-42A0-B0F5-1CC4E0223D66}" type="datetimeFigureOut">
               <a:rPr lang="en-GB" smtClean="0"/>
-              <a:t>02/04/2018</a:t>
+              <a:t>04/04/2018</a:t>
             </a:fld>
             <a:endParaRPr lang="en-GB"/>
           </a:p>
@@ -6792,7 +6792,7 @@
           <a:p>
             <a:fld id="{041B6913-160D-42A0-B0F5-1CC4E0223D66}" type="datetimeFigureOut">
               <a:rPr lang="en-GB" smtClean="0"/>
-              <a:t>02/04/2018</a:t>
+              <a:t>04/04/2018</a:t>
             </a:fld>
             <a:endParaRPr lang="en-GB"/>
           </a:p>
@@ -7524,7 +7524,7 @@
           <a:p>
             <a:fld id="{041B6913-160D-42A0-B0F5-1CC4E0223D66}" type="datetimeFigureOut">
               <a:rPr lang="en-GB" smtClean="0"/>
-              <a:t>02/04/2018</a:t>
+              <a:t>04/04/2018</a:t>
             </a:fld>
             <a:endParaRPr lang="en-GB"/>
           </a:p>
@@ -7706,7 +7706,7 @@
           <a:p>
             <a:fld id="{041B6913-160D-42A0-B0F5-1CC4E0223D66}" type="datetimeFigureOut">
               <a:rPr lang="en-GB" smtClean="0"/>
-              <a:t>02/04/2018</a:t>
+              <a:t>04/04/2018</a:t>
             </a:fld>
             <a:endParaRPr lang="en-GB"/>
           </a:p>
@@ -7898,7 +7898,7 @@
           <a:p>
             <a:fld id="{041B6913-160D-42A0-B0F5-1CC4E0223D66}" type="datetimeFigureOut">
               <a:rPr lang="en-GB" smtClean="0"/>
-              <a:t>02/04/2018</a:t>
+              <a:t>04/04/2018</a:t>
             </a:fld>
             <a:endParaRPr lang="en-GB"/>
           </a:p>
@@ -8080,7 +8080,7 @@
           <a:p>
             <a:fld id="{041B6913-160D-42A0-B0F5-1CC4E0223D66}" type="datetimeFigureOut">
               <a:rPr lang="en-GB" smtClean="0"/>
-              <a:t>02/04/2018</a:t>
+              <a:t>04/04/2018</a:t>
             </a:fld>
             <a:endParaRPr lang="en-GB"/>
           </a:p>
@@ -8342,7 +8342,7 @@
           <a:p>
             <a:fld id="{041B6913-160D-42A0-B0F5-1CC4E0223D66}" type="datetimeFigureOut">
               <a:rPr lang="en-GB" smtClean="0"/>
-              <a:t>02/04/2018</a:t>
+              <a:t>04/04/2018</a:t>
             </a:fld>
             <a:endParaRPr lang="en-GB"/>
           </a:p>
@@ -8586,7 +8586,7 @@
           <a:p>
             <a:fld id="{041B6913-160D-42A0-B0F5-1CC4E0223D66}" type="datetimeFigureOut">
               <a:rPr lang="en-GB" smtClean="0"/>
-              <a:t>02/04/2018</a:t>
+              <a:t>04/04/2018</a:t>
             </a:fld>
             <a:endParaRPr lang="en-GB"/>
           </a:p>
@@ -8979,7 +8979,7 @@
           <a:p>
             <a:fld id="{041B6913-160D-42A0-B0F5-1CC4E0223D66}" type="datetimeFigureOut">
               <a:rPr lang="en-GB" smtClean="0"/>
-              <a:t>02/04/2018</a:t>
+              <a:t>04/04/2018</a:t>
             </a:fld>
             <a:endParaRPr lang="en-GB"/>
           </a:p>
@@ -9109,7 +9109,7 @@
           <a:p>
             <a:fld id="{041B6913-160D-42A0-B0F5-1CC4E0223D66}" type="datetimeFigureOut">
               <a:rPr lang="en-GB" smtClean="0"/>
-              <a:t>02/04/2018</a:t>
+              <a:t>04/04/2018</a:t>
             </a:fld>
             <a:endParaRPr lang="en-GB"/>
           </a:p>
@@ -9216,7 +9216,7 @@
           <a:p>
             <a:fld id="{041B6913-160D-42A0-B0F5-1CC4E0223D66}" type="datetimeFigureOut">
               <a:rPr lang="en-GB" smtClean="0"/>
-              <a:t>02/04/2018</a:t>
+              <a:t>04/04/2018</a:t>
             </a:fld>
             <a:endParaRPr lang="en-GB"/>
           </a:p>
@@ -9477,7 +9477,7 @@
           <a:p>
             <a:fld id="{041B6913-160D-42A0-B0F5-1CC4E0223D66}" type="datetimeFigureOut">
               <a:rPr lang="en-GB" smtClean="0"/>
-              <a:t>02/04/2018</a:t>
+              <a:t>04/04/2018</a:t>
             </a:fld>
             <a:endParaRPr lang="en-GB"/>
           </a:p>
@@ -9769,7 +9769,7 @@
           <a:p>
             <a:fld id="{041B6913-160D-42A0-B0F5-1CC4E0223D66}" type="datetimeFigureOut">
               <a:rPr lang="en-GB" smtClean="0"/>
-              <a:t>02/04/2018</a:t>
+              <a:t>04/04/2018</a:t>
             </a:fld>
             <a:endParaRPr lang="en-GB"/>
           </a:p>
@@ -9904,7 +9904,7 @@
           <a:noFill/>
           <a:extLst>
             <a:ext uri="{909E8E84-426E-40dd-AFC4-6F175D3DCCD1}">
-              <a14:hiddenFill xmlns="" xmlns:a14="http://schemas.microsoft.com/office/drawing/2010/main">
+              <a14:hiddenFill xmlns:a14="http://schemas.microsoft.com/office/drawing/2010/main" xmlns="">
                 <a:solidFill>
                   <a:srgbClr val="FFFFFF"/>
                 </a:solidFill>
@@ -9978,7 +9978,7 @@
               </a:ln>
               <a:extLst>
                 <a:ext uri="{91240B29-F687-4f45-9708-019B960494DF}">
-                  <a14:hiddenLine xmlns="" xmlns:a14="http://schemas.microsoft.com/office/drawing/2010/main" w="9525">
+                  <a14:hiddenLine xmlns:a14="http://schemas.microsoft.com/office/drawing/2010/main" xmlns="" w="9525">
                     <a:solidFill>
                       <a:srgbClr val="000000"/>
                     </a:solidFill>
@@ -10068,7 +10068,7 @@
               </a:ln>
               <a:extLst>
                 <a:ext uri="{91240B29-F687-4f45-9708-019B960494DF}">
-                  <a14:hiddenLine xmlns="" xmlns:a14="http://schemas.microsoft.com/office/drawing/2010/main" w="9525">
+                  <a14:hiddenLine xmlns:a14="http://schemas.microsoft.com/office/drawing/2010/main" xmlns="" w="9525">
                     <a:solidFill>
                       <a:srgbClr val="000000"/>
                     </a:solidFill>
@@ -10158,7 +10158,7 @@
               </a:ln>
               <a:extLst>
                 <a:ext uri="{91240B29-F687-4f45-9708-019B960494DF}">
-                  <a14:hiddenLine xmlns="" xmlns:a14="http://schemas.microsoft.com/office/drawing/2010/main" w="9525">
+                  <a14:hiddenLine xmlns:a14="http://schemas.microsoft.com/office/drawing/2010/main" xmlns="" w="9525">
                     <a:solidFill>
                       <a:srgbClr val="000000"/>
                     </a:solidFill>
@@ -10220,7 +10220,7 @@
               </a:ln>
               <a:extLst>
                 <a:ext uri="{91240B29-F687-4f45-9708-019B960494DF}">
-                  <a14:hiddenLine xmlns="" xmlns:a14="http://schemas.microsoft.com/office/drawing/2010/main" w="9525">
+                  <a14:hiddenLine xmlns:a14="http://schemas.microsoft.com/office/drawing/2010/main" xmlns="" w="9525">
                     <a:solidFill>
                       <a:srgbClr val="000000"/>
                     </a:solidFill>
@@ -10310,7 +10310,7 @@
               </a:ln>
               <a:extLst>
                 <a:ext uri="{91240B29-F687-4f45-9708-019B960494DF}">
-                  <a14:hiddenLine xmlns="" xmlns:a14="http://schemas.microsoft.com/office/drawing/2010/main" w="9525">
+                  <a14:hiddenLine xmlns:a14="http://schemas.microsoft.com/office/drawing/2010/main" xmlns="" w="9525">
                     <a:solidFill>
                       <a:srgbClr val="000000"/>
                     </a:solidFill>
@@ -10372,7 +10372,7 @@
               </a:ln>
               <a:extLst>
                 <a:ext uri="{91240B29-F687-4f45-9708-019B960494DF}">
-                  <a14:hiddenLine xmlns="" xmlns:a14="http://schemas.microsoft.com/office/drawing/2010/main" w="9525">
+                  <a14:hiddenLine xmlns:a14="http://schemas.microsoft.com/office/drawing/2010/main" xmlns="" w="9525">
                     <a:solidFill>
                       <a:srgbClr val="000000"/>
                     </a:solidFill>
@@ -10434,7 +10434,7 @@
               </a:ln>
               <a:extLst>
                 <a:ext uri="{91240B29-F687-4f45-9708-019B960494DF}">
-                  <a14:hiddenLine xmlns="" xmlns:a14="http://schemas.microsoft.com/office/drawing/2010/main" w="9525">
+                  <a14:hiddenLine xmlns:a14="http://schemas.microsoft.com/office/drawing/2010/main" xmlns="" w="9525">
                     <a:solidFill>
                       <a:srgbClr val="000000"/>
                     </a:solidFill>
@@ -10524,7 +10524,7 @@
               </a:ln>
               <a:extLst>
                 <a:ext uri="{91240B29-F687-4f45-9708-019B960494DF}">
-                  <a14:hiddenLine xmlns="" xmlns:a14="http://schemas.microsoft.com/office/drawing/2010/main" w="9525">
+                  <a14:hiddenLine xmlns:a14="http://schemas.microsoft.com/office/drawing/2010/main" xmlns="" w="9525">
                     <a:solidFill>
                       <a:srgbClr val="000000"/>
                     </a:solidFill>
@@ -10614,7 +10614,7 @@
               </a:ln>
               <a:extLst>
                 <a:ext uri="{91240B29-F687-4f45-9708-019B960494DF}">
-                  <a14:hiddenLine xmlns="" xmlns:a14="http://schemas.microsoft.com/office/drawing/2010/main" w="9525">
+                  <a14:hiddenLine xmlns:a14="http://schemas.microsoft.com/office/drawing/2010/main" xmlns="" w="9525">
                     <a:solidFill>
                       <a:srgbClr val="000000"/>
                     </a:solidFill>
@@ -10676,7 +10676,7 @@
               </a:ln>
               <a:extLst>
                 <a:ext uri="{91240B29-F687-4f45-9708-019B960494DF}">
-                  <a14:hiddenLine xmlns="" xmlns:a14="http://schemas.microsoft.com/office/drawing/2010/main" w="9525">
+                  <a14:hiddenLine xmlns:a14="http://schemas.microsoft.com/office/drawing/2010/main" xmlns="" w="9525">
                     <a:solidFill>
                       <a:srgbClr val="000000"/>
                     </a:solidFill>
@@ -10786,7 +10786,7 @@
               </a:ln>
               <a:extLst>
                 <a:ext uri="{91240B29-F687-4f45-9708-019B960494DF}">
-                  <a14:hiddenLine xmlns="" xmlns:a14="http://schemas.microsoft.com/office/drawing/2010/main" w="9525">
+                  <a14:hiddenLine xmlns:a14="http://schemas.microsoft.com/office/drawing/2010/main" xmlns="" w="9525">
                     <a:solidFill>
                       <a:srgbClr val="000000"/>
                     </a:solidFill>
@@ -10870,7 +10870,7 @@
               </a:ln>
               <a:extLst>
                 <a:ext uri="{91240B29-F687-4f45-9708-019B960494DF}">
-                  <a14:hiddenLine xmlns="" xmlns:a14="http://schemas.microsoft.com/office/drawing/2010/main" w="9525">
+                  <a14:hiddenLine xmlns:a14="http://schemas.microsoft.com/office/drawing/2010/main" xmlns="" w="9525">
                     <a:solidFill>
                       <a:srgbClr val="000000"/>
                     </a:solidFill>
@@ -10932,7 +10932,7 @@
               </a:ln>
               <a:extLst>
                 <a:ext uri="{91240B29-F687-4f45-9708-019B960494DF}">
-                  <a14:hiddenLine xmlns="" xmlns:a14="http://schemas.microsoft.com/office/drawing/2010/main" w="9525">
+                  <a14:hiddenLine xmlns:a14="http://schemas.microsoft.com/office/drawing/2010/main" xmlns="" w="9525">
                     <a:solidFill>
                       <a:srgbClr val="000000"/>
                     </a:solidFill>
@@ -10994,7 +10994,7 @@
               </a:ln>
               <a:extLst>
                 <a:ext uri="{91240B29-F687-4f45-9708-019B960494DF}">
-                  <a14:hiddenLine xmlns="" xmlns:a14="http://schemas.microsoft.com/office/drawing/2010/main" w="9525">
+                  <a14:hiddenLine xmlns:a14="http://schemas.microsoft.com/office/drawing/2010/main" xmlns="" w="9525">
                     <a:solidFill>
                       <a:srgbClr val="000000"/>
                     </a:solidFill>
@@ -11084,7 +11084,7 @@
               </a:ln>
               <a:extLst>
                 <a:ext uri="{91240B29-F687-4f45-9708-019B960494DF}">
-                  <a14:hiddenLine xmlns="" xmlns:a14="http://schemas.microsoft.com/office/drawing/2010/main" w="9525">
+                  <a14:hiddenLine xmlns:a14="http://schemas.microsoft.com/office/drawing/2010/main" xmlns="" w="9525">
                     <a:solidFill>
                       <a:srgbClr val="000000"/>
                     </a:solidFill>
@@ -11118,7 +11118,7 @@
               </a:ln>
               <a:extLst>
                 <a:ext uri="{91240B29-F687-4f45-9708-019B960494DF}">
-                  <a14:hiddenLine xmlns="" xmlns:a14="http://schemas.microsoft.com/office/drawing/2010/main" w="9525">
+                  <a14:hiddenLine xmlns:a14="http://schemas.microsoft.com/office/drawing/2010/main" xmlns="" w="9525">
                     <a:solidFill>
                       <a:srgbClr val="000000"/>
                     </a:solidFill>
@@ -11183,7 +11183,7 @@
               </a:ln>
               <a:extLst>
                 <a:ext uri="{91240B29-F687-4f45-9708-019B960494DF}">
-                  <a14:hiddenLine xmlns="" xmlns:a14="http://schemas.microsoft.com/office/drawing/2010/main" w="9525">
+                  <a14:hiddenLine xmlns:a14="http://schemas.microsoft.com/office/drawing/2010/main" xmlns="" w="9525">
                     <a:solidFill>
                       <a:srgbClr val="000000"/>
                     </a:solidFill>
@@ -11273,7 +11273,7 @@
               </a:ln>
               <a:extLst>
                 <a:ext uri="{91240B29-F687-4f45-9708-019B960494DF}">
-                  <a14:hiddenLine xmlns="" xmlns:a14="http://schemas.microsoft.com/office/drawing/2010/main" w="9525">
+                  <a14:hiddenLine xmlns:a14="http://schemas.microsoft.com/office/drawing/2010/main" xmlns="" w="9525">
                     <a:solidFill>
                       <a:srgbClr val="000000"/>
                     </a:solidFill>
@@ -11335,7 +11335,7 @@
               </a:ln>
               <a:extLst>
                 <a:ext uri="{91240B29-F687-4f45-9708-019B960494DF}">
-                  <a14:hiddenLine xmlns="" xmlns:a14="http://schemas.microsoft.com/office/drawing/2010/main" w="9525">
+                  <a14:hiddenLine xmlns:a14="http://schemas.microsoft.com/office/drawing/2010/main" xmlns="" w="9525">
                     <a:solidFill>
                       <a:srgbClr val="000000"/>
                     </a:solidFill>
@@ -11425,7 +11425,7 @@
               </a:ln>
               <a:extLst>
                 <a:ext uri="{91240B29-F687-4f45-9708-019B960494DF}">
-                  <a14:hiddenLine xmlns="" xmlns:a14="http://schemas.microsoft.com/office/drawing/2010/main" w="9525">
+                  <a14:hiddenLine xmlns:a14="http://schemas.microsoft.com/office/drawing/2010/main" xmlns="" w="9525">
                     <a:solidFill>
                       <a:srgbClr val="000000"/>
                     </a:solidFill>
@@ -11490,7 +11490,7 @@
               </a:ln>
               <a:extLst>
                 <a:ext uri="{91240B29-F687-4f45-9708-019B960494DF}">
-                  <a14:hiddenLine xmlns="" xmlns:a14="http://schemas.microsoft.com/office/drawing/2010/main" w="9525">
+                  <a14:hiddenLine xmlns:a14="http://schemas.microsoft.com/office/drawing/2010/main" xmlns="" w="9525">
                     <a:solidFill>
                       <a:srgbClr val="000000"/>
                     </a:solidFill>
@@ -11552,7 +11552,7 @@
               </a:ln>
               <a:extLst>
                 <a:ext uri="{91240B29-F687-4f45-9708-019B960494DF}">
-                  <a14:hiddenLine xmlns="" xmlns:a14="http://schemas.microsoft.com/office/drawing/2010/main" w="9525">
+                  <a14:hiddenLine xmlns:a14="http://schemas.microsoft.com/office/drawing/2010/main" xmlns="" w="9525">
                     <a:solidFill>
                       <a:srgbClr val="000000"/>
                     </a:solidFill>
@@ -11642,7 +11642,7 @@
               </a:ln>
               <a:extLst>
                 <a:ext uri="{91240B29-F687-4f45-9708-019B960494DF}">
-                  <a14:hiddenLine xmlns="" xmlns:a14="http://schemas.microsoft.com/office/drawing/2010/main" w="9525">
+                  <a14:hiddenLine xmlns:a14="http://schemas.microsoft.com/office/drawing/2010/main" xmlns="" w="9525">
                     <a:solidFill>
                       <a:srgbClr val="000000"/>
                     </a:solidFill>
@@ -11732,7 +11732,7 @@
               </a:ln>
               <a:extLst>
                 <a:ext uri="{91240B29-F687-4f45-9708-019B960494DF}">
-                  <a14:hiddenLine xmlns="" xmlns:a14="http://schemas.microsoft.com/office/drawing/2010/main" w="9525">
+                  <a14:hiddenLine xmlns:a14="http://schemas.microsoft.com/office/drawing/2010/main" xmlns="" w="9525">
                     <a:solidFill>
                       <a:srgbClr val="000000"/>
                     </a:solidFill>
@@ -11797,7 +11797,7 @@
               </a:ln>
               <a:extLst>
                 <a:ext uri="{91240B29-F687-4f45-9708-019B960494DF}">
-                  <a14:hiddenLine xmlns="" xmlns:a14="http://schemas.microsoft.com/office/drawing/2010/main" w="9525">
+                  <a14:hiddenLine xmlns:a14="http://schemas.microsoft.com/office/drawing/2010/main" xmlns="" w="9525">
                     <a:solidFill>
                       <a:srgbClr val="000000"/>
                     </a:solidFill>
@@ -11917,7 +11917,7 @@
               </a:ln>
               <a:extLst>
                 <a:ext uri="{91240B29-F687-4f45-9708-019B960494DF}">
-                  <a14:hiddenLine xmlns="" xmlns:a14="http://schemas.microsoft.com/office/drawing/2010/main" w="9525">
+                  <a14:hiddenLine xmlns:a14="http://schemas.microsoft.com/office/drawing/2010/main" xmlns="" w="9525">
                     <a:solidFill>
                       <a:srgbClr val="000000"/>
                     </a:solidFill>
@@ -11998,7 +11998,7 @@
               </a:ln>
               <a:extLst>
                 <a:ext uri="{91240B29-F687-4f45-9708-019B960494DF}">
-                  <a14:hiddenLine xmlns="" xmlns:a14="http://schemas.microsoft.com/office/drawing/2010/main" w="9525">
+                  <a14:hiddenLine xmlns:a14="http://schemas.microsoft.com/office/drawing/2010/main" xmlns="" w="9525">
                     <a:solidFill>
                       <a:srgbClr val="000000"/>
                     </a:solidFill>
@@ -12113,7 +12113,7 @@
               </a:ln>
               <a:extLst>
                 <a:ext uri="{91240B29-F687-4f45-9708-019B960494DF}">
-                  <a14:hiddenLine xmlns="" xmlns:a14="http://schemas.microsoft.com/office/drawing/2010/main" w="9525">
+                  <a14:hiddenLine xmlns:a14="http://schemas.microsoft.com/office/drawing/2010/main" xmlns="" w="9525">
                     <a:solidFill>
                       <a:srgbClr val="000000"/>
                     </a:solidFill>
@@ -12203,7 +12203,7 @@
               </a:ln>
               <a:extLst>
                 <a:ext uri="{91240B29-F687-4f45-9708-019B960494DF}">
-                  <a14:hiddenLine xmlns="" xmlns:a14="http://schemas.microsoft.com/office/drawing/2010/main" w="9525">
+                  <a14:hiddenLine xmlns:a14="http://schemas.microsoft.com/office/drawing/2010/main" xmlns="" w="9525">
                     <a:solidFill>
                       <a:srgbClr val="000000"/>
                     </a:solidFill>
@@ -12268,7 +12268,7 @@
               </a:ln>
               <a:extLst>
                 <a:ext uri="{91240B29-F687-4f45-9708-019B960494DF}">
-                  <a14:hiddenLine xmlns="" xmlns:a14="http://schemas.microsoft.com/office/drawing/2010/main" w="9525">
+                  <a14:hiddenLine xmlns:a14="http://schemas.microsoft.com/office/drawing/2010/main" xmlns="" w="9525">
                     <a:solidFill>
                       <a:srgbClr val="000000"/>
                     </a:solidFill>
@@ -12358,7 +12358,7 @@
               </a:ln>
               <a:extLst>
                 <a:ext uri="{91240B29-F687-4f45-9708-019B960494DF}">
-                  <a14:hiddenLine xmlns="" xmlns:a14="http://schemas.microsoft.com/office/drawing/2010/main" w="9525">
+                  <a14:hiddenLine xmlns:a14="http://schemas.microsoft.com/office/drawing/2010/main" xmlns="" w="9525">
                     <a:solidFill>
                       <a:srgbClr val="000000"/>
                     </a:solidFill>
@@ -12426,7 +12426,7 @@
               </a:ln>
               <a:extLst>
                 <a:ext uri="{91240B29-F687-4f45-9708-019B960494DF}">
-                  <a14:hiddenLine xmlns="" xmlns:a14="http://schemas.microsoft.com/office/drawing/2010/main" w="9525">
+                  <a14:hiddenLine xmlns:a14="http://schemas.microsoft.com/office/drawing/2010/main" xmlns="" w="9525">
                     <a:solidFill>
                       <a:srgbClr val="000000"/>
                     </a:solidFill>
@@ -12516,7 +12516,7 @@
               </a:ln>
               <a:extLst>
                 <a:ext uri="{91240B29-F687-4f45-9708-019B960494DF}">
-                  <a14:hiddenLine xmlns="" xmlns:a14="http://schemas.microsoft.com/office/drawing/2010/main" w="9525">
+                  <a14:hiddenLine xmlns:a14="http://schemas.microsoft.com/office/drawing/2010/main" xmlns="" w="9525">
                     <a:solidFill>
                       <a:srgbClr val="000000"/>
                     </a:solidFill>
@@ -12584,7 +12584,7 @@
               </a:ln>
               <a:extLst>
                 <a:ext uri="{91240B29-F687-4f45-9708-019B960494DF}">
-                  <a14:hiddenLine xmlns="" xmlns:a14="http://schemas.microsoft.com/office/drawing/2010/main" w="9525">
+                  <a14:hiddenLine xmlns:a14="http://schemas.microsoft.com/office/drawing/2010/main" xmlns="" w="9525">
                     <a:solidFill>
                       <a:srgbClr val="000000"/>
                     </a:solidFill>
@@ -12674,7 +12674,7 @@
               </a:ln>
               <a:extLst>
                 <a:ext uri="{91240B29-F687-4f45-9708-019B960494DF}">
-                  <a14:hiddenLine xmlns="" xmlns:a14="http://schemas.microsoft.com/office/drawing/2010/main" w="9525">
+                  <a14:hiddenLine xmlns:a14="http://schemas.microsoft.com/office/drawing/2010/main" xmlns="" w="9525">
                     <a:solidFill>
                       <a:srgbClr val="000000"/>
                     </a:solidFill>
@@ -12708,7 +12708,7 @@
               </a:ln>
               <a:extLst>
                 <a:ext uri="{91240B29-F687-4f45-9708-019B960494DF}">
-                  <a14:hiddenLine xmlns="" xmlns:a14="http://schemas.microsoft.com/office/drawing/2010/main" w="9525">
+                  <a14:hiddenLine xmlns:a14="http://schemas.microsoft.com/office/drawing/2010/main" xmlns="" w="9525">
                     <a:solidFill>
                       <a:srgbClr val="000000"/>
                     </a:solidFill>
@@ -12848,7 +12848,7 @@
           <a:p>
             <a:fld id="{041B6913-160D-42A0-B0F5-1CC4E0223D66}" type="datetimeFigureOut">
               <a:rPr lang="en-GB" smtClean="0"/>
-              <a:t>02/04/2018</a:t>
+              <a:t>04/04/2018</a:t>
             </a:fld>
             <a:endParaRPr lang="en-GB"/>
           </a:p>
@@ -13350,18 +13350,9 @@
   <p:clrMapOvr>
     <a:masterClrMapping/>
   </p:clrMapOvr>
-  <mc:AlternateContent xmlns:mc="http://schemas.openxmlformats.org/markup-compatibility/2006" xmlns:p14="http://schemas.microsoft.com/office/powerpoint/2010/main">
-    <mc:Choice Requires="p14">
-      <p:transition spd="slow" p14:dur="1600">
-        <p:blinds dir="vert"/>
-      </p:transition>
-    </mc:Choice>
-    <mc:Fallback xmlns="">
-      <p:transition spd="slow">
-        <p:blinds dir="vert"/>
-      </p:transition>
-    </mc:Fallback>
-  </mc:AlternateContent>
+  <p:transition spd="slow">
+    <p:blinds dir="vert"/>
+  </p:transition>
 </p:sld>
 </file>
 
@@ -13476,18 +13467,9 @@
   <p:clrMapOvr>
     <a:masterClrMapping/>
   </p:clrMapOvr>
-  <mc:AlternateContent xmlns:mc="http://schemas.openxmlformats.org/markup-compatibility/2006">
-    <mc:Choice xmlns:p14="http://schemas.microsoft.com/office/powerpoint/2010/main" Requires="p14">
-      <p:transition spd="slow" p14:dur="1400">
-        <p:blinds/>
-      </p:transition>
-    </mc:Choice>
-    <mc:Fallback>
-      <p:transition spd="slow">
-        <p:blinds/>
-      </p:transition>
-    </mc:Fallback>
-  </mc:AlternateContent>
+  <p:transition spd="slow">
+    <p:blinds/>
+  </p:transition>
   <p:timing>
     <p:tnLst>
       <p:par>
@@ -13963,18 +13945,9 @@
   <p:clrMapOvr>
     <a:masterClrMapping/>
   </p:clrMapOvr>
-  <mc:AlternateContent xmlns:mc="http://schemas.openxmlformats.org/markup-compatibility/2006" xmlns:p14="http://schemas.microsoft.com/office/powerpoint/2010/main">
-    <mc:Choice Requires="p14">
-      <p:transition spd="slow" p14:dur="1600">
-        <p:blinds dir="vert"/>
-      </p:transition>
-    </mc:Choice>
-    <mc:Fallback xmlns="">
-      <p:transition spd="slow">
-        <p:blinds dir="vert"/>
-      </p:transition>
-    </mc:Fallback>
-  </mc:AlternateContent>
+  <p:transition spd="slow">
+    <p:blinds dir="vert"/>
+  </p:transition>
   <p:timing>
     <p:tnLst>
       <p:par>
@@ -14583,18 +14556,9 @@
   <p:clrMapOvr>
     <a:masterClrMapping/>
   </p:clrMapOvr>
-  <mc:AlternateContent xmlns:mc="http://schemas.openxmlformats.org/markup-compatibility/2006">
-    <mc:Choice xmlns:p14="http://schemas.microsoft.com/office/powerpoint/2010/main" Requires="p14">
-      <p:transition spd="slow" p14:dur="1400">
-        <p:blinds/>
-      </p:transition>
-    </mc:Choice>
-    <mc:Fallback>
-      <p:transition spd="slow">
-        <p:blinds/>
-      </p:transition>
-    </mc:Fallback>
-  </mc:AlternateContent>
+  <p:transition spd="slow">
+    <p:blinds/>
+  </p:transition>
   <p:timing>
     <p:tnLst>
       <p:par>
@@ -15217,18 +15181,9 @@
   <p:clrMapOvr>
     <a:masterClrMapping/>
   </p:clrMapOvr>
-  <mc:AlternateContent xmlns:mc="http://schemas.openxmlformats.org/markup-compatibility/2006" xmlns:p14="http://schemas.microsoft.com/office/powerpoint/2010/main">
-    <mc:Choice Requires="p14">
-      <p:transition spd="slow" p14:dur="1600">
-        <p:blinds dir="vert"/>
-      </p:transition>
-    </mc:Choice>
-    <mc:Fallback xmlns="">
-      <p:transition spd="slow">
-        <p:blinds dir="vert"/>
-      </p:transition>
-    </mc:Fallback>
-  </mc:AlternateContent>
+  <p:transition spd="slow">
+    <p:blinds dir="vert"/>
+  </p:transition>
   <p:timing>
     <p:tnLst>
       <p:par>
@@ -15566,18 +15521,9 @@
   <p:clrMapOvr>
     <a:masterClrMapping/>
   </p:clrMapOvr>
-  <mc:AlternateContent xmlns:mc="http://schemas.openxmlformats.org/markup-compatibility/2006">
-    <mc:Choice xmlns:p14="http://schemas.microsoft.com/office/powerpoint/2010/main" Requires="p14">
-      <p:transition spd="slow" p14:dur="1400">
-        <p:blinds/>
-      </p:transition>
-    </mc:Choice>
-    <mc:Fallback>
-      <p:transition spd="slow">
-        <p:blinds/>
-      </p:transition>
-    </mc:Fallback>
-  </mc:AlternateContent>
+  <p:transition spd="slow">
+    <p:blinds/>
+  </p:transition>
 </p:sld>
 </file>
 

</xml_diff>

<commit_message>
Updated Topic 1 and Topic 2 presentations
</commit_message>
<xml_diff>
--- a/Topic 2 - AE1.pptx
+++ b/Topic 2 - AE1.pptx
@@ -5,7 +5,7 @@
     <p:sldMasterId id="2147483690" r:id="rId1"/>
   </p:sldMasterIdLst>
   <p:notesMasterIdLst>
-    <p:notesMasterId r:id="rId8"/>
+    <p:notesMasterId r:id="rId10"/>
   </p:notesMasterIdLst>
   <p:sldIdLst>
     <p:sldId id="256" r:id="rId2"/>
@@ -13,7 +13,9 @@
     <p:sldId id="258" r:id="rId4"/>
     <p:sldId id="260" r:id="rId5"/>
     <p:sldId id="261" r:id="rId6"/>
-    <p:sldId id="259" r:id="rId7"/>
+    <p:sldId id="262" r:id="rId7"/>
+    <p:sldId id="263" r:id="rId8"/>
+    <p:sldId id="259" r:id="rId9"/>
   </p:sldIdLst>
   <p:sldSz cx="12192000" cy="6858000"/>
   <p:notesSz cx="6858000" cy="9144000"/>
@@ -202,7 +204,7 @@
           <a:p>
             <a:fld id="{7D1D2ACD-840B-4FA9-9F16-DAC6CF3B9BC3}" type="datetimeFigureOut">
               <a:rPr lang="en-GB" smtClean="0"/>
-              <a:t>04/04/2018</a:t>
+              <a:t>06/04/2018</a:t>
             </a:fld>
             <a:endParaRPr lang="en-GB"/>
           </a:p>
@@ -744,6 +746,115 @@
 </p:notes>
 </file>
 
+<file path=ppt/notesSlides/notesSlide4.xml><?xml version="1.0" encoding="utf-8"?>
+<p:notes xmlns:a="http://schemas.openxmlformats.org/drawingml/2006/main" xmlns:r="http://schemas.openxmlformats.org/officeDocument/2006/relationships" xmlns:p="http://schemas.openxmlformats.org/presentationml/2006/main">
+  <p:cSld>
+    <p:spTree>
+      <p:nvGrpSpPr>
+        <p:cNvPr id="1" name=""/>
+        <p:cNvGrpSpPr/>
+        <p:nvPr/>
+      </p:nvGrpSpPr>
+      <p:grpSpPr>
+        <a:xfrm>
+          <a:off x="0" y="0"/>
+          <a:ext cx="0" cy="0"/>
+          <a:chOff x="0" y="0"/>
+          <a:chExt cx="0" cy="0"/>
+        </a:xfrm>
+      </p:grpSpPr>
+      <p:sp>
+        <p:nvSpPr>
+          <p:cNvPr id="2" name="Slide Image Placeholder 1"/>
+          <p:cNvSpPr>
+            <a:spLocks noGrp="1" noRot="1" noChangeAspect="1"/>
+          </p:cNvSpPr>
+          <p:nvPr>
+            <p:ph type="sldImg"/>
+          </p:nvPr>
+        </p:nvSpPr>
+        <p:spPr/>
+      </p:sp>
+      <p:sp>
+        <p:nvSpPr>
+          <p:cNvPr id="3" name="Notes Placeholder 2"/>
+          <p:cNvSpPr>
+            <a:spLocks noGrp="1"/>
+          </p:cNvSpPr>
+          <p:nvPr>
+            <p:ph type="body" idx="1"/>
+          </p:nvPr>
+        </p:nvSpPr>
+        <p:spPr/>
+        <p:txBody>
+          <a:bodyPr/>
+          <a:lstStyle/>
+          <a:p>
+            <a:r>
+              <a:rPr lang="en-GB" dirty="0"/>
+              <a:t>2</a:t>
+            </a:r>
+            <a:r>
+              <a:rPr lang="en-GB" baseline="30000" dirty="0"/>
+              <a:t>nd</a:t>
+            </a:r>
+            <a:r>
+              <a:rPr lang="en-GB" dirty="0"/>
+              <a:t> Point – For example, the typical course of events seen in the expanded use case is what the sequence diagram showcases. </a:t>
+            </a:r>
+          </a:p>
+          <a:p>
+            <a:r>
+              <a:rPr lang="en-GB" dirty="0"/>
+              <a:t>3</a:t>
+            </a:r>
+            <a:r>
+              <a:rPr lang="en-GB" baseline="30000" dirty="0"/>
+              <a:t>rd</a:t>
+            </a:r>
+            <a:r>
+              <a:rPr lang="en-GB" dirty="0"/>
+              <a:t> point – I, personally, think it would take less time in writing expanded use cases than drawing a robustness diagram because the diagram had special figures and having them properly placed and aligned was a lot of work. Expanded Use cases where it’s primary textual eased the workload for the team.</a:t>
+            </a:r>
+          </a:p>
+        </p:txBody>
+      </p:sp>
+      <p:sp>
+        <p:nvSpPr>
+          <p:cNvPr id="4" name="Slide Number Placeholder 3"/>
+          <p:cNvSpPr>
+            <a:spLocks noGrp="1"/>
+          </p:cNvSpPr>
+          <p:nvPr>
+            <p:ph type="sldNum" sz="quarter" idx="10"/>
+          </p:nvPr>
+        </p:nvSpPr>
+        <p:spPr/>
+        <p:txBody>
+          <a:bodyPr/>
+          <a:lstStyle/>
+          <a:p>
+            <a:fld id="{08364FC6-39C8-420C-8598-AB542CA12116}" type="slidenum">
+              <a:rPr lang="en-GB" smtClean="0"/>
+              <a:t>7</a:t>
+            </a:fld>
+            <a:endParaRPr lang="en-GB"/>
+          </a:p>
+        </p:txBody>
+      </p:sp>
+    </p:spTree>
+    <p:extLst>
+      <p:ext uri="{BB962C8B-B14F-4D97-AF65-F5344CB8AC3E}">
+        <p14:creationId xmlns:p14="http://schemas.microsoft.com/office/powerpoint/2010/main" val="2488848129"/>
+      </p:ext>
+    </p:extLst>
+  </p:cSld>
+  <p:clrMapOvr>
+    <a:masterClrMapping/>
+  </p:clrMapOvr>
+</p:notes>
+</file>
+
 <file path=ppt/slideLayouts/slideLayout1.xml><?xml version="1.0" encoding="utf-8"?>
 <p:sldLayout xmlns:a="http://schemas.openxmlformats.org/drawingml/2006/main" xmlns:r="http://schemas.openxmlformats.org/officeDocument/2006/relationships" xmlns:p="http://schemas.openxmlformats.org/presentationml/2006/main" showMasterSp="0" type="title" preserve="1">
   <p:cSld name="Title Slide">
@@ -801,7 +912,7 @@
           <a:noFill/>
           <a:extLst>
             <a:ext uri="{909E8E84-426E-40dd-AFC4-6F175D3DCCD1}">
-              <a14:hiddenFill xmlns:a14="http://schemas.microsoft.com/office/drawing/2010/main" xmlns="">
+              <a14:hiddenFill xmlns="" xmlns:a14="http://schemas.microsoft.com/office/drawing/2010/main">
                 <a:solidFill>
                   <a:srgbClr val="FFFFFF"/>
                 </a:solidFill>
@@ -860,7 +971,7 @@
             </a:ln>
             <a:extLst>
               <a:ext uri="{91240B29-F687-4f45-9708-019B960494DF}">
-                <a14:hiddenLine xmlns:a14="http://schemas.microsoft.com/office/drawing/2010/main" xmlns="" w="9525">
+                <a14:hiddenLine xmlns="" xmlns:a14="http://schemas.microsoft.com/office/drawing/2010/main" w="9525">
                   <a:solidFill>
                     <a:srgbClr val="000000"/>
                   </a:solidFill>
@@ -950,7 +1061,7 @@
             </a:ln>
             <a:extLst>
               <a:ext uri="{91240B29-F687-4f45-9708-019B960494DF}">
-                <a14:hiddenLine xmlns:a14="http://schemas.microsoft.com/office/drawing/2010/main" xmlns="" w="9525">
+                <a14:hiddenLine xmlns="" xmlns:a14="http://schemas.microsoft.com/office/drawing/2010/main" w="9525">
                   <a:solidFill>
                     <a:srgbClr val="000000"/>
                   </a:solidFill>
@@ -1040,7 +1151,7 @@
             </a:ln>
             <a:extLst>
               <a:ext uri="{91240B29-F687-4f45-9708-019B960494DF}">
-                <a14:hiddenLine xmlns:a14="http://schemas.microsoft.com/office/drawing/2010/main" xmlns="" w="9525">
+                <a14:hiddenLine xmlns="" xmlns:a14="http://schemas.microsoft.com/office/drawing/2010/main" w="9525">
                   <a:solidFill>
                     <a:srgbClr val="000000"/>
                   </a:solidFill>
@@ -1074,7 +1185,7 @@
             </a:ln>
             <a:extLst>
               <a:ext uri="{91240B29-F687-4f45-9708-019B960494DF}">
-                <a14:hiddenLine xmlns:a14="http://schemas.microsoft.com/office/drawing/2010/main" xmlns="" w="9525">
+                <a14:hiddenLine xmlns="" xmlns:a14="http://schemas.microsoft.com/office/drawing/2010/main" w="9525">
                   <a:solidFill>
                     <a:srgbClr val="000000"/>
                   </a:solidFill>
@@ -1164,7 +1275,7 @@
             </a:ln>
             <a:extLst>
               <a:ext uri="{91240B29-F687-4f45-9708-019B960494DF}">
-                <a14:hiddenLine xmlns:a14="http://schemas.microsoft.com/office/drawing/2010/main" xmlns="" w="9525">
+                <a14:hiddenLine xmlns="" xmlns:a14="http://schemas.microsoft.com/office/drawing/2010/main" w="9525">
                   <a:solidFill>
                     <a:srgbClr val="000000"/>
                   </a:solidFill>
@@ -1226,7 +1337,7 @@
             </a:ln>
             <a:extLst>
               <a:ext uri="{91240B29-F687-4f45-9708-019B960494DF}">
-                <a14:hiddenLine xmlns:a14="http://schemas.microsoft.com/office/drawing/2010/main" xmlns="" w="9525">
+                <a14:hiddenLine xmlns="" xmlns:a14="http://schemas.microsoft.com/office/drawing/2010/main" w="9525">
                   <a:solidFill>
                     <a:srgbClr val="000000"/>
                   </a:solidFill>
@@ -1288,7 +1399,7 @@
             </a:ln>
             <a:extLst>
               <a:ext uri="{91240B29-F687-4f45-9708-019B960494DF}">
-                <a14:hiddenLine xmlns:a14="http://schemas.microsoft.com/office/drawing/2010/main" xmlns="" w="9525">
+                <a14:hiddenLine xmlns="" xmlns:a14="http://schemas.microsoft.com/office/drawing/2010/main" w="9525">
                   <a:solidFill>
                     <a:srgbClr val="000000"/>
                   </a:solidFill>
@@ -1378,7 +1489,7 @@
             </a:ln>
             <a:extLst>
               <a:ext uri="{91240B29-F687-4f45-9708-019B960494DF}">
-                <a14:hiddenLine xmlns:a14="http://schemas.microsoft.com/office/drawing/2010/main" xmlns="" w="9525">
+                <a14:hiddenLine xmlns="" xmlns:a14="http://schemas.microsoft.com/office/drawing/2010/main" w="9525">
                   <a:solidFill>
                     <a:srgbClr val="000000"/>
                   </a:solidFill>
@@ -1440,7 +1551,7 @@
             </a:ln>
             <a:extLst>
               <a:ext uri="{91240B29-F687-4f45-9708-019B960494DF}">
-                <a14:hiddenLine xmlns:a14="http://schemas.microsoft.com/office/drawing/2010/main" xmlns="" w="9525">
+                <a14:hiddenLine xmlns="" xmlns:a14="http://schemas.microsoft.com/office/drawing/2010/main" w="9525">
                   <a:solidFill>
                     <a:srgbClr val="000000"/>
                   </a:solidFill>
@@ -1502,7 +1613,7 @@
             </a:ln>
             <a:extLst>
               <a:ext uri="{91240B29-F687-4f45-9708-019B960494DF}">
-                <a14:hiddenLine xmlns:a14="http://schemas.microsoft.com/office/drawing/2010/main" xmlns="" w="9525">
+                <a14:hiddenLine xmlns="" xmlns:a14="http://schemas.microsoft.com/office/drawing/2010/main" w="9525">
                   <a:solidFill>
                     <a:srgbClr val="000000"/>
                   </a:solidFill>
@@ -1592,7 +1703,7 @@
             </a:ln>
             <a:extLst>
               <a:ext uri="{91240B29-F687-4f45-9708-019B960494DF}">
-                <a14:hiddenLine xmlns:a14="http://schemas.microsoft.com/office/drawing/2010/main" xmlns="" w="9525">
+                <a14:hiddenLine xmlns="" xmlns:a14="http://schemas.microsoft.com/office/drawing/2010/main" w="9525">
                   <a:solidFill>
                     <a:srgbClr val="000000"/>
                   </a:solidFill>
@@ -1682,7 +1793,7 @@
             </a:ln>
             <a:extLst>
               <a:ext uri="{91240B29-F687-4f45-9708-019B960494DF}">
-                <a14:hiddenLine xmlns:a14="http://schemas.microsoft.com/office/drawing/2010/main" xmlns="" w="9525">
+                <a14:hiddenLine xmlns="" xmlns:a14="http://schemas.microsoft.com/office/drawing/2010/main" w="9525">
                   <a:solidFill>
                     <a:srgbClr val="000000"/>
                   </a:solidFill>
@@ -1744,7 +1855,7 @@
             </a:ln>
             <a:extLst>
               <a:ext uri="{91240B29-F687-4f45-9708-019B960494DF}">
-                <a14:hiddenLine xmlns:a14="http://schemas.microsoft.com/office/drawing/2010/main" xmlns="" w="9525">
+                <a14:hiddenLine xmlns="" xmlns:a14="http://schemas.microsoft.com/office/drawing/2010/main" w="9525">
                   <a:solidFill>
                     <a:srgbClr val="000000"/>
                   </a:solidFill>
@@ -1854,7 +1965,7 @@
             </a:ln>
             <a:extLst>
               <a:ext uri="{91240B29-F687-4f45-9708-019B960494DF}">
-                <a14:hiddenLine xmlns:a14="http://schemas.microsoft.com/office/drawing/2010/main" xmlns="" w="9525">
+                <a14:hiddenLine xmlns="" xmlns:a14="http://schemas.microsoft.com/office/drawing/2010/main" w="9525">
                   <a:solidFill>
                     <a:srgbClr val="000000"/>
                   </a:solidFill>
@@ -1916,7 +2027,7 @@
             </a:ln>
             <a:extLst>
               <a:ext uri="{91240B29-F687-4f45-9708-019B960494DF}">
-                <a14:hiddenLine xmlns:a14="http://schemas.microsoft.com/office/drawing/2010/main" xmlns="" w="9525">
+                <a14:hiddenLine xmlns="" xmlns:a14="http://schemas.microsoft.com/office/drawing/2010/main" w="9525">
                   <a:solidFill>
                     <a:srgbClr val="000000"/>
                   </a:solidFill>
@@ -2006,7 +2117,7 @@
             </a:ln>
             <a:extLst>
               <a:ext uri="{91240B29-F687-4f45-9708-019B960494DF}">
-                <a14:hiddenLine xmlns:a14="http://schemas.microsoft.com/office/drawing/2010/main" xmlns="" w="9525">
+                <a14:hiddenLine xmlns="" xmlns:a14="http://schemas.microsoft.com/office/drawing/2010/main" w="9525">
                   <a:solidFill>
                     <a:srgbClr val="000000"/>
                   </a:solidFill>
@@ -2096,7 +2207,7 @@
             </a:ln>
             <a:extLst>
               <a:ext uri="{91240B29-F687-4f45-9708-019B960494DF}">
-                <a14:hiddenLine xmlns:a14="http://schemas.microsoft.com/office/drawing/2010/main" xmlns="" w="9525">
+                <a14:hiddenLine xmlns="" xmlns:a14="http://schemas.microsoft.com/office/drawing/2010/main" w="9525">
                   <a:solidFill>
                     <a:srgbClr val="000000"/>
                   </a:solidFill>
@@ -2158,7 +2269,7 @@
             </a:ln>
             <a:extLst>
               <a:ext uri="{91240B29-F687-4f45-9708-019B960494DF}">
-                <a14:hiddenLine xmlns:a14="http://schemas.microsoft.com/office/drawing/2010/main" xmlns="" w="9525">
+                <a14:hiddenLine xmlns="" xmlns:a14="http://schemas.microsoft.com/office/drawing/2010/main" w="9525">
                   <a:solidFill>
                     <a:srgbClr val="000000"/>
                   </a:solidFill>
@@ -2248,7 +2359,7 @@
             </a:ln>
             <a:extLst>
               <a:ext uri="{91240B29-F687-4f45-9708-019B960494DF}">
-                <a14:hiddenLine xmlns:a14="http://schemas.microsoft.com/office/drawing/2010/main" xmlns="" w="9525">
+                <a14:hiddenLine xmlns="" xmlns:a14="http://schemas.microsoft.com/office/drawing/2010/main" w="9525">
                   <a:solidFill>
                     <a:srgbClr val="000000"/>
                   </a:solidFill>
@@ -2338,7 +2449,7 @@
             </a:ln>
             <a:extLst>
               <a:ext uri="{91240B29-F687-4f45-9708-019B960494DF}">
-                <a14:hiddenLine xmlns:a14="http://schemas.microsoft.com/office/drawing/2010/main" xmlns="" w="9525">
+                <a14:hiddenLine xmlns="" xmlns:a14="http://schemas.microsoft.com/office/drawing/2010/main" w="9525">
                   <a:solidFill>
                     <a:srgbClr val="000000"/>
                   </a:solidFill>
@@ -2394,7 +2505,7 @@
             </a:ln>
             <a:extLst>
               <a:ext uri="{91240B29-F687-4f45-9708-019B960494DF}">
-                <a14:hiddenLine xmlns:a14="http://schemas.microsoft.com/office/drawing/2010/main" xmlns="" w="9525">
+                <a14:hiddenLine xmlns="" xmlns:a14="http://schemas.microsoft.com/office/drawing/2010/main" w="9525">
                   <a:solidFill>
                     <a:srgbClr val="000000"/>
                   </a:solidFill>
@@ -2484,7 +2595,7 @@
             </a:ln>
             <a:extLst>
               <a:ext uri="{91240B29-F687-4f45-9708-019B960494DF}">
-                <a14:hiddenLine xmlns:a14="http://schemas.microsoft.com/office/drawing/2010/main" xmlns="" w="9525">
+                <a14:hiddenLine xmlns="" xmlns:a14="http://schemas.microsoft.com/office/drawing/2010/main" w="9525">
                   <a:solidFill>
                     <a:srgbClr val="000000"/>
                   </a:solidFill>
@@ -2540,7 +2651,7 @@
             </a:ln>
             <a:extLst>
               <a:ext uri="{91240B29-F687-4f45-9708-019B960494DF}">
-                <a14:hiddenLine xmlns:a14="http://schemas.microsoft.com/office/drawing/2010/main" xmlns="" w="9525">
+                <a14:hiddenLine xmlns="" xmlns:a14="http://schemas.microsoft.com/office/drawing/2010/main" w="9525">
                   <a:solidFill>
                     <a:srgbClr val="000000"/>
                   </a:solidFill>
@@ -2630,7 +2741,7 @@
             </a:ln>
             <a:extLst>
               <a:ext uri="{91240B29-F687-4f45-9708-019B960494DF}">
-                <a14:hiddenLine xmlns:a14="http://schemas.microsoft.com/office/drawing/2010/main" xmlns="" w="9525">
+                <a14:hiddenLine xmlns="" xmlns:a14="http://schemas.microsoft.com/office/drawing/2010/main" w="9525">
                   <a:solidFill>
                     <a:srgbClr val="000000"/>
                   </a:solidFill>
@@ -2698,7 +2809,7 @@
             </a:ln>
             <a:extLst>
               <a:ext uri="{91240B29-F687-4f45-9708-019B960494DF}">
-                <a14:hiddenLine xmlns:a14="http://schemas.microsoft.com/office/drawing/2010/main" xmlns="" w="9525">
+                <a14:hiddenLine xmlns="" xmlns:a14="http://schemas.microsoft.com/office/drawing/2010/main" w="9525">
                   <a:solidFill>
                     <a:srgbClr val="000000"/>
                   </a:solidFill>
@@ -2788,7 +2899,7 @@
             </a:ln>
             <a:extLst>
               <a:ext uri="{91240B29-F687-4f45-9708-019B960494DF}">
-                <a14:hiddenLine xmlns:a14="http://schemas.microsoft.com/office/drawing/2010/main" xmlns="" w="9525">
+                <a14:hiddenLine xmlns="" xmlns:a14="http://schemas.microsoft.com/office/drawing/2010/main" w="9525">
                   <a:solidFill>
                     <a:srgbClr val="000000"/>
                   </a:solidFill>
@@ -2856,7 +2967,7 @@
             </a:ln>
             <a:extLst>
               <a:ext uri="{91240B29-F687-4f45-9708-019B960494DF}">
-                <a14:hiddenLine xmlns:a14="http://schemas.microsoft.com/office/drawing/2010/main" xmlns="" w="9525">
+                <a14:hiddenLine xmlns="" xmlns:a14="http://schemas.microsoft.com/office/drawing/2010/main" w="9525">
                   <a:solidFill>
                     <a:srgbClr val="000000"/>
                   </a:solidFill>
@@ -2946,7 +3057,7 @@
             </a:ln>
             <a:extLst>
               <a:ext uri="{91240B29-F687-4f45-9708-019B960494DF}">
-                <a14:hiddenLine xmlns:a14="http://schemas.microsoft.com/office/drawing/2010/main" xmlns="" w="9525">
+                <a14:hiddenLine xmlns="" xmlns:a14="http://schemas.microsoft.com/office/drawing/2010/main" w="9525">
                   <a:solidFill>
                     <a:srgbClr val="000000"/>
                   </a:solidFill>
@@ -2980,7 +3091,7 @@
             </a:ln>
             <a:extLst>
               <a:ext uri="{91240B29-F687-4f45-9708-019B960494DF}">
-                <a14:hiddenLine xmlns:a14="http://schemas.microsoft.com/office/drawing/2010/main" xmlns="" w="9525">
+                <a14:hiddenLine xmlns="" xmlns:a14="http://schemas.microsoft.com/office/drawing/2010/main" w="9525">
                   <a:solidFill>
                     <a:srgbClr val="000000"/>
                   </a:solidFill>
@@ -3070,7 +3181,7 @@
             </a:ln>
             <a:extLst>
               <a:ext uri="{91240B29-F687-4f45-9708-019B960494DF}">
-                <a14:hiddenLine xmlns:a14="http://schemas.microsoft.com/office/drawing/2010/main" xmlns="" w="9525">
+                <a14:hiddenLine xmlns="" xmlns:a14="http://schemas.microsoft.com/office/drawing/2010/main" w="9525">
                   <a:solidFill>
                     <a:srgbClr val="000000"/>
                   </a:solidFill>
@@ -3132,7 +3243,7 @@
             </a:ln>
             <a:extLst>
               <a:ext uri="{91240B29-F687-4f45-9708-019B960494DF}">
-                <a14:hiddenLine xmlns:a14="http://schemas.microsoft.com/office/drawing/2010/main" xmlns="" w="9525">
+                <a14:hiddenLine xmlns="" xmlns:a14="http://schemas.microsoft.com/office/drawing/2010/main" w="9525">
                   <a:solidFill>
                     <a:srgbClr val="000000"/>
                   </a:solidFill>
@@ -3194,7 +3305,7 @@
             </a:ln>
             <a:extLst>
               <a:ext uri="{91240B29-F687-4f45-9708-019B960494DF}">
-                <a14:hiddenLine xmlns:a14="http://schemas.microsoft.com/office/drawing/2010/main" xmlns="" w="9525">
+                <a14:hiddenLine xmlns="" xmlns:a14="http://schemas.microsoft.com/office/drawing/2010/main" w="9525">
                   <a:solidFill>
                     <a:srgbClr val="000000"/>
                   </a:solidFill>
@@ -3284,7 +3395,7 @@
             </a:ln>
             <a:extLst>
               <a:ext uri="{91240B29-F687-4f45-9708-019B960494DF}">
-                <a14:hiddenLine xmlns:a14="http://schemas.microsoft.com/office/drawing/2010/main" xmlns="" w="9525">
+                <a14:hiddenLine xmlns="" xmlns:a14="http://schemas.microsoft.com/office/drawing/2010/main" w="9525">
                   <a:solidFill>
                     <a:srgbClr val="000000"/>
                   </a:solidFill>
@@ -3352,7 +3463,7 @@
             </a:ln>
             <a:extLst>
               <a:ext uri="{91240B29-F687-4f45-9708-019B960494DF}">
-                <a14:hiddenLine xmlns:a14="http://schemas.microsoft.com/office/drawing/2010/main" xmlns="" w="9525">
+                <a14:hiddenLine xmlns="" xmlns:a14="http://schemas.microsoft.com/office/drawing/2010/main" w="9525">
                   <a:solidFill>
                     <a:srgbClr val="000000"/>
                   </a:solidFill>
@@ -3414,7 +3525,7 @@
             </a:ln>
             <a:extLst>
               <a:ext uri="{91240B29-F687-4f45-9708-019B960494DF}">
-                <a14:hiddenLine xmlns:a14="http://schemas.microsoft.com/office/drawing/2010/main" xmlns="" w="9525">
+                <a14:hiddenLine xmlns="" xmlns:a14="http://schemas.microsoft.com/office/drawing/2010/main" w="9525">
                   <a:solidFill>
                     <a:srgbClr val="000000"/>
                   </a:solidFill>
@@ -3504,7 +3615,7 @@
             </a:ln>
             <a:extLst>
               <a:ext uri="{91240B29-F687-4f45-9708-019B960494DF}">
-                <a14:hiddenLine xmlns:a14="http://schemas.microsoft.com/office/drawing/2010/main" xmlns="" w="9525">
+                <a14:hiddenLine xmlns="" xmlns:a14="http://schemas.microsoft.com/office/drawing/2010/main" w="9525">
                   <a:solidFill>
                     <a:srgbClr val="000000"/>
                   </a:solidFill>
@@ -3566,7 +3677,7 @@
             </a:ln>
             <a:extLst>
               <a:ext uri="{91240B29-F687-4f45-9708-019B960494DF}">
-                <a14:hiddenLine xmlns:a14="http://schemas.microsoft.com/office/drawing/2010/main" xmlns="" w="9525">
+                <a14:hiddenLine xmlns="" xmlns:a14="http://schemas.microsoft.com/office/drawing/2010/main" w="9525">
                   <a:solidFill>
                     <a:srgbClr val="000000"/>
                   </a:solidFill>
@@ -3656,7 +3767,7 @@
             </a:ln>
             <a:extLst>
               <a:ext uri="{91240B29-F687-4f45-9708-019B960494DF}">
-                <a14:hiddenLine xmlns:a14="http://schemas.microsoft.com/office/drawing/2010/main" xmlns="" w="9525">
+                <a14:hiddenLine xmlns="" xmlns:a14="http://schemas.microsoft.com/office/drawing/2010/main" w="9525">
                   <a:solidFill>
                     <a:srgbClr val="000000"/>
                   </a:solidFill>
@@ -3718,7 +3829,7 @@
             </a:ln>
             <a:extLst>
               <a:ext uri="{91240B29-F687-4f45-9708-019B960494DF}">
-                <a14:hiddenLine xmlns:a14="http://schemas.microsoft.com/office/drawing/2010/main" xmlns="" w="9525">
+                <a14:hiddenLine xmlns="" xmlns:a14="http://schemas.microsoft.com/office/drawing/2010/main" w="9525">
                   <a:solidFill>
                     <a:srgbClr val="000000"/>
                   </a:solidFill>
@@ -3808,7 +3919,7 @@
             </a:ln>
             <a:extLst>
               <a:ext uri="{91240B29-F687-4f45-9708-019B960494DF}">
-                <a14:hiddenLine xmlns:a14="http://schemas.microsoft.com/office/drawing/2010/main" xmlns="" w="9525">
+                <a14:hiddenLine xmlns="" xmlns:a14="http://schemas.microsoft.com/office/drawing/2010/main" w="9525">
                   <a:solidFill>
                     <a:srgbClr val="000000"/>
                   </a:solidFill>
@@ -3842,7 +3953,7 @@
             </a:ln>
             <a:extLst>
               <a:ext uri="{91240B29-F687-4f45-9708-019B960494DF}">
-                <a14:hiddenLine xmlns:a14="http://schemas.microsoft.com/office/drawing/2010/main" xmlns="" w="9525">
+                <a14:hiddenLine xmlns="" xmlns:a14="http://schemas.microsoft.com/office/drawing/2010/main" w="9525">
                   <a:solidFill>
                     <a:srgbClr val="000000"/>
                   </a:solidFill>
@@ -3907,7 +4018,7 @@
             </a:ln>
             <a:extLst>
               <a:ext uri="{91240B29-F687-4f45-9708-019B960494DF}">
-                <a14:hiddenLine xmlns:a14="http://schemas.microsoft.com/office/drawing/2010/main" xmlns="" w="9525">
+                <a14:hiddenLine xmlns="" xmlns:a14="http://schemas.microsoft.com/office/drawing/2010/main" w="9525">
                   <a:solidFill>
                     <a:srgbClr val="000000"/>
                   </a:solidFill>
@@ -3997,7 +4108,7 @@
             </a:ln>
             <a:extLst>
               <a:ext uri="{91240B29-F687-4f45-9708-019B960494DF}">
-                <a14:hiddenLine xmlns:a14="http://schemas.microsoft.com/office/drawing/2010/main" xmlns="" w="9525">
+                <a14:hiddenLine xmlns="" xmlns:a14="http://schemas.microsoft.com/office/drawing/2010/main" w="9525">
                   <a:solidFill>
                     <a:srgbClr val="000000"/>
                   </a:solidFill>
@@ -4059,7 +4170,7 @@
             </a:ln>
             <a:extLst>
               <a:ext uri="{91240B29-F687-4f45-9708-019B960494DF}">
-                <a14:hiddenLine xmlns:a14="http://schemas.microsoft.com/office/drawing/2010/main" xmlns="" w="9525">
+                <a14:hiddenLine xmlns="" xmlns:a14="http://schemas.microsoft.com/office/drawing/2010/main" w="9525">
                   <a:solidFill>
                     <a:srgbClr val="000000"/>
                   </a:solidFill>
@@ -4149,7 +4260,7 @@
             </a:ln>
             <a:extLst>
               <a:ext uri="{91240B29-F687-4f45-9708-019B960494DF}">
-                <a14:hiddenLine xmlns:a14="http://schemas.microsoft.com/office/drawing/2010/main" xmlns="" w="9525">
+                <a14:hiddenLine xmlns="" xmlns:a14="http://schemas.microsoft.com/office/drawing/2010/main" w="9525">
                   <a:solidFill>
                     <a:srgbClr val="000000"/>
                   </a:solidFill>
@@ -4239,7 +4350,7 @@
             </a:ln>
             <a:extLst>
               <a:ext uri="{91240B29-F687-4f45-9708-019B960494DF}">
-                <a14:hiddenLine xmlns:a14="http://schemas.microsoft.com/office/drawing/2010/main" xmlns="" w="9525">
+                <a14:hiddenLine xmlns="" xmlns:a14="http://schemas.microsoft.com/office/drawing/2010/main" w="9525">
                   <a:solidFill>
                     <a:srgbClr val="000000"/>
                   </a:solidFill>
@@ -4304,7 +4415,7 @@
             </a:ln>
             <a:extLst>
               <a:ext uri="{91240B29-F687-4f45-9708-019B960494DF}">
-                <a14:hiddenLine xmlns:a14="http://schemas.microsoft.com/office/drawing/2010/main" xmlns="" w="9525">
+                <a14:hiddenLine xmlns="" xmlns:a14="http://schemas.microsoft.com/office/drawing/2010/main" w="9525">
                   <a:solidFill>
                     <a:srgbClr val="000000"/>
                   </a:solidFill>
@@ -4366,7 +4477,7 @@
             </a:ln>
             <a:extLst>
               <a:ext uri="{91240B29-F687-4f45-9708-019B960494DF}">
-                <a14:hiddenLine xmlns:a14="http://schemas.microsoft.com/office/drawing/2010/main" xmlns="" w="9525">
+                <a14:hiddenLine xmlns="" xmlns:a14="http://schemas.microsoft.com/office/drawing/2010/main" w="9525">
                   <a:solidFill>
                     <a:srgbClr val="000000"/>
                   </a:solidFill>
@@ -4456,7 +4567,7 @@
             </a:ln>
             <a:extLst>
               <a:ext uri="{91240B29-F687-4f45-9708-019B960494DF}">
-                <a14:hiddenLine xmlns:a14="http://schemas.microsoft.com/office/drawing/2010/main" xmlns="" w="9525">
+                <a14:hiddenLine xmlns="" xmlns:a14="http://schemas.microsoft.com/office/drawing/2010/main" w="9525">
                   <a:solidFill>
                     <a:srgbClr val="000000"/>
                   </a:solidFill>
@@ -4546,7 +4657,7 @@
             </a:ln>
             <a:extLst>
               <a:ext uri="{91240B29-F687-4f45-9708-019B960494DF}">
-                <a14:hiddenLine xmlns:a14="http://schemas.microsoft.com/office/drawing/2010/main" xmlns="" w="9525">
+                <a14:hiddenLine xmlns="" xmlns:a14="http://schemas.microsoft.com/office/drawing/2010/main" w="9525">
                   <a:solidFill>
                     <a:srgbClr val="000000"/>
                   </a:solidFill>
@@ -4608,7 +4719,7 @@
             </a:ln>
             <a:extLst>
               <a:ext uri="{91240B29-F687-4f45-9708-019B960494DF}">
-                <a14:hiddenLine xmlns:a14="http://schemas.microsoft.com/office/drawing/2010/main" xmlns="" w="9525">
+                <a14:hiddenLine xmlns="" xmlns:a14="http://schemas.microsoft.com/office/drawing/2010/main" w="9525">
                   <a:solidFill>
                     <a:srgbClr val="000000"/>
                   </a:solidFill>
@@ -4728,7 +4839,7 @@
             </a:ln>
             <a:extLst>
               <a:ext uri="{91240B29-F687-4f45-9708-019B960494DF}">
-                <a14:hiddenLine xmlns:a14="http://schemas.microsoft.com/office/drawing/2010/main" xmlns="" w="9525">
+                <a14:hiddenLine xmlns="" xmlns:a14="http://schemas.microsoft.com/office/drawing/2010/main" w="9525">
                   <a:solidFill>
                     <a:srgbClr val="000000"/>
                   </a:solidFill>
@@ -4796,7 +4907,7 @@
             </a:ln>
             <a:extLst>
               <a:ext uri="{91240B29-F687-4f45-9708-019B960494DF}">
-                <a14:hiddenLine xmlns:a14="http://schemas.microsoft.com/office/drawing/2010/main" xmlns="" w="9525">
+                <a14:hiddenLine xmlns="" xmlns:a14="http://schemas.microsoft.com/office/drawing/2010/main" w="9525">
                   <a:solidFill>
                     <a:srgbClr val="000000"/>
                   </a:solidFill>
@@ -4886,7 +4997,7 @@
             </a:ln>
             <a:extLst>
               <a:ext uri="{91240B29-F687-4f45-9708-019B960494DF}">
-                <a14:hiddenLine xmlns:a14="http://schemas.microsoft.com/office/drawing/2010/main" xmlns="" w="9525">
+                <a14:hiddenLine xmlns="" xmlns:a14="http://schemas.microsoft.com/office/drawing/2010/main" w="9525">
                   <a:solidFill>
                     <a:srgbClr val="000000"/>
                   </a:solidFill>
@@ -5026,7 +5137,7 @@
           <a:p>
             <a:fld id="{041B6913-160D-42A0-B0F5-1CC4E0223D66}" type="datetimeFigureOut">
               <a:rPr lang="en-GB" smtClean="0"/>
-              <a:t>04/04/2018</a:t>
+              <a:t>06/04/2018</a:t>
             </a:fld>
             <a:endParaRPr lang="en-GB"/>
           </a:p>
@@ -5305,7 +5416,7 @@
           <a:p>
             <a:fld id="{041B6913-160D-42A0-B0F5-1CC4E0223D66}" type="datetimeFigureOut">
               <a:rPr lang="en-GB" smtClean="0"/>
-              <a:t>04/04/2018</a:t>
+              <a:t>06/04/2018</a:t>
             </a:fld>
             <a:endParaRPr lang="en-GB"/>
           </a:p>
@@ -5513,7 +5624,7 @@
           <a:p>
             <a:fld id="{041B6913-160D-42A0-B0F5-1CC4E0223D66}" type="datetimeFigureOut">
               <a:rPr lang="en-GB" smtClean="0"/>
-              <a:t>04/04/2018</a:t>
+              <a:t>06/04/2018</a:t>
             </a:fld>
             <a:endParaRPr lang="en-GB"/>
           </a:p>
@@ -5788,7 +5899,7 @@
           <a:p>
             <a:fld id="{041B6913-160D-42A0-B0F5-1CC4E0223D66}" type="datetimeFigureOut">
               <a:rPr lang="en-GB" smtClean="0"/>
-              <a:t>04/04/2018</a:t>
+              <a:t>06/04/2018</a:t>
             </a:fld>
             <a:endParaRPr lang="en-GB"/>
           </a:p>
@@ -6234,7 +6345,7 @@
           <a:p>
             <a:fld id="{041B6913-160D-42A0-B0F5-1CC4E0223D66}" type="datetimeFigureOut">
               <a:rPr lang="en-GB" smtClean="0"/>
-              <a:t>04/04/2018</a:t>
+              <a:t>06/04/2018</a:t>
             </a:fld>
             <a:endParaRPr lang="en-GB"/>
           </a:p>
@@ -6792,7 +6903,7 @@
           <a:p>
             <a:fld id="{041B6913-160D-42A0-B0F5-1CC4E0223D66}" type="datetimeFigureOut">
               <a:rPr lang="en-GB" smtClean="0"/>
-              <a:t>04/04/2018</a:t>
+              <a:t>06/04/2018</a:t>
             </a:fld>
             <a:endParaRPr lang="en-GB"/>
           </a:p>
@@ -7524,7 +7635,7 @@
           <a:p>
             <a:fld id="{041B6913-160D-42A0-B0F5-1CC4E0223D66}" type="datetimeFigureOut">
               <a:rPr lang="en-GB" smtClean="0"/>
-              <a:t>04/04/2018</a:t>
+              <a:t>06/04/2018</a:t>
             </a:fld>
             <a:endParaRPr lang="en-GB"/>
           </a:p>
@@ -7706,7 +7817,7 @@
           <a:p>
             <a:fld id="{041B6913-160D-42A0-B0F5-1CC4E0223D66}" type="datetimeFigureOut">
               <a:rPr lang="en-GB" smtClean="0"/>
-              <a:t>04/04/2018</a:t>
+              <a:t>06/04/2018</a:t>
             </a:fld>
             <a:endParaRPr lang="en-GB"/>
           </a:p>
@@ -7898,7 +8009,7 @@
           <a:p>
             <a:fld id="{041B6913-160D-42A0-B0F5-1CC4E0223D66}" type="datetimeFigureOut">
               <a:rPr lang="en-GB" smtClean="0"/>
-              <a:t>04/04/2018</a:t>
+              <a:t>06/04/2018</a:t>
             </a:fld>
             <a:endParaRPr lang="en-GB"/>
           </a:p>
@@ -8080,7 +8191,7 @@
           <a:p>
             <a:fld id="{041B6913-160D-42A0-B0F5-1CC4E0223D66}" type="datetimeFigureOut">
               <a:rPr lang="en-GB" smtClean="0"/>
-              <a:t>04/04/2018</a:t>
+              <a:t>06/04/2018</a:t>
             </a:fld>
             <a:endParaRPr lang="en-GB"/>
           </a:p>
@@ -8342,7 +8453,7 @@
           <a:p>
             <a:fld id="{041B6913-160D-42A0-B0F5-1CC4E0223D66}" type="datetimeFigureOut">
               <a:rPr lang="en-GB" smtClean="0"/>
-              <a:t>04/04/2018</a:t>
+              <a:t>06/04/2018</a:t>
             </a:fld>
             <a:endParaRPr lang="en-GB"/>
           </a:p>
@@ -8586,7 +8697,7 @@
           <a:p>
             <a:fld id="{041B6913-160D-42A0-B0F5-1CC4E0223D66}" type="datetimeFigureOut">
               <a:rPr lang="en-GB" smtClean="0"/>
-              <a:t>04/04/2018</a:t>
+              <a:t>06/04/2018</a:t>
             </a:fld>
             <a:endParaRPr lang="en-GB"/>
           </a:p>
@@ -8979,7 +9090,7 @@
           <a:p>
             <a:fld id="{041B6913-160D-42A0-B0F5-1CC4E0223D66}" type="datetimeFigureOut">
               <a:rPr lang="en-GB" smtClean="0"/>
-              <a:t>04/04/2018</a:t>
+              <a:t>06/04/2018</a:t>
             </a:fld>
             <a:endParaRPr lang="en-GB"/>
           </a:p>
@@ -9109,7 +9220,7 @@
           <a:p>
             <a:fld id="{041B6913-160D-42A0-B0F5-1CC4E0223D66}" type="datetimeFigureOut">
               <a:rPr lang="en-GB" smtClean="0"/>
-              <a:t>04/04/2018</a:t>
+              <a:t>06/04/2018</a:t>
             </a:fld>
             <a:endParaRPr lang="en-GB"/>
           </a:p>
@@ -9216,7 +9327,7 @@
           <a:p>
             <a:fld id="{041B6913-160D-42A0-B0F5-1CC4E0223D66}" type="datetimeFigureOut">
               <a:rPr lang="en-GB" smtClean="0"/>
-              <a:t>04/04/2018</a:t>
+              <a:t>06/04/2018</a:t>
             </a:fld>
             <a:endParaRPr lang="en-GB"/>
           </a:p>
@@ -9477,7 +9588,7 @@
           <a:p>
             <a:fld id="{041B6913-160D-42A0-B0F5-1CC4E0223D66}" type="datetimeFigureOut">
               <a:rPr lang="en-GB" smtClean="0"/>
-              <a:t>04/04/2018</a:t>
+              <a:t>06/04/2018</a:t>
             </a:fld>
             <a:endParaRPr lang="en-GB"/>
           </a:p>
@@ -9769,7 +9880,7 @@
           <a:p>
             <a:fld id="{041B6913-160D-42A0-B0F5-1CC4E0223D66}" type="datetimeFigureOut">
               <a:rPr lang="en-GB" smtClean="0"/>
-              <a:t>04/04/2018</a:t>
+              <a:t>06/04/2018</a:t>
             </a:fld>
             <a:endParaRPr lang="en-GB"/>
           </a:p>
@@ -9904,7 +10015,7 @@
           <a:noFill/>
           <a:extLst>
             <a:ext uri="{909E8E84-426E-40dd-AFC4-6F175D3DCCD1}">
-              <a14:hiddenFill xmlns:a14="http://schemas.microsoft.com/office/drawing/2010/main" xmlns="">
+              <a14:hiddenFill xmlns="" xmlns:a14="http://schemas.microsoft.com/office/drawing/2010/main">
                 <a:solidFill>
                   <a:srgbClr val="FFFFFF"/>
                 </a:solidFill>
@@ -9978,7 +10089,7 @@
               </a:ln>
               <a:extLst>
                 <a:ext uri="{91240B29-F687-4f45-9708-019B960494DF}">
-                  <a14:hiddenLine xmlns:a14="http://schemas.microsoft.com/office/drawing/2010/main" xmlns="" w="9525">
+                  <a14:hiddenLine xmlns="" xmlns:a14="http://schemas.microsoft.com/office/drawing/2010/main" w="9525">
                     <a:solidFill>
                       <a:srgbClr val="000000"/>
                     </a:solidFill>
@@ -10068,7 +10179,7 @@
               </a:ln>
               <a:extLst>
                 <a:ext uri="{91240B29-F687-4f45-9708-019B960494DF}">
-                  <a14:hiddenLine xmlns:a14="http://schemas.microsoft.com/office/drawing/2010/main" xmlns="" w="9525">
+                  <a14:hiddenLine xmlns="" xmlns:a14="http://schemas.microsoft.com/office/drawing/2010/main" w="9525">
                     <a:solidFill>
                       <a:srgbClr val="000000"/>
                     </a:solidFill>
@@ -10158,7 +10269,7 @@
               </a:ln>
               <a:extLst>
                 <a:ext uri="{91240B29-F687-4f45-9708-019B960494DF}">
-                  <a14:hiddenLine xmlns:a14="http://schemas.microsoft.com/office/drawing/2010/main" xmlns="" w="9525">
+                  <a14:hiddenLine xmlns="" xmlns:a14="http://schemas.microsoft.com/office/drawing/2010/main" w="9525">
                     <a:solidFill>
                       <a:srgbClr val="000000"/>
                     </a:solidFill>
@@ -10220,7 +10331,7 @@
               </a:ln>
               <a:extLst>
                 <a:ext uri="{91240B29-F687-4f45-9708-019B960494DF}">
-                  <a14:hiddenLine xmlns:a14="http://schemas.microsoft.com/office/drawing/2010/main" xmlns="" w="9525">
+                  <a14:hiddenLine xmlns="" xmlns:a14="http://schemas.microsoft.com/office/drawing/2010/main" w="9525">
                     <a:solidFill>
                       <a:srgbClr val="000000"/>
                     </a:solidFill>
@@ -10310,7 +10421,7 @@
               </a:ln>
               <a:extLst>
                 <a:ext uri="{91240B29-F687-4f45-9708-019B960494DF}">
-                  <a14:hiddenLine xmlns:a14="http://schemas.microsoft.com/office/drawing/2010/main" xmlns="" w="9525">
+                  <a14:hiddenLine xmlns="" xmlns:a14="http://schemas.microsoft.com/office/drawing/2010/main" w="9525">
                     <a:solidFill>
                       <a:srgbClr val="000000"/>
                     </a:solidFill>
@@ -10372,7 +10483,7 @@
               </a:ln>
               <a:extLst>
                 <a:ext uri="{91240B29-F687-4f45-9708-019B960494DF}">
-                  <a14:hiddenLine xmlns:a14="http://schemas.microsoft.com/office/drawing/2010/main" xmlns="" w="9525">
+                  <a14:hiddenLine xmlns="" xmlns:a14="http://schemas.microsoft.com/office/drawing/2010/main" w="9525">
                     <a:solidFill>
                       <a:srgbClr val="000000"/>
                     </a:solidFill>
@@ -10434,7 +10545,7 @@
               </a:ln>
               <a:extLst>
                 <a:ext uri="{91240B29-F687-4f45-9708-019B960494DF}">
-                  <a14:hiddenLine xmlns:a14="http://schemas.microsoft.com/office/drawing/2010/main" xmlns="" w="9525">
+                  <a14:hiddenLine xmlns="" xmlns:a14="http://schemas.microsoft.com/office/drawing/2010/main" w="9525">
                     <a:solidFill>
                       <a:srgbClr val="000000"/>
                     </a:solidFill>
@@ -10524,7 +10635,7 @@
               </a:ln>
               <a:extLst>
                 <a:ext uri="{91240B29-F687-4f45-9708-019B960494DF}">
-                  <a14:hiddenLine xmlns:a14="http://schemas.microsoft.com/office/drawing/2010/main" xmlns="" w="9525">
+                  <a14:hiddenLine xmlns="" xmlns:a14="http://schemas.microsoft.com/office/drawing/2010/main" w="9525">
                     <a:solidFill>
                       <a:srgbClr val="000000"/>
                     </a:solidFill>
@@ -10614,7 +10725,7 @@
               </a:ln>
               <a:extLst>
                 <a:ext uri="{91240B29-F687-4f45-9708-019B960494DF}">
-                  <a14:hiddenLine xmlns:a14="http://schemas.microsoft.com/office/drawing/2010/main" xmlns="" w="9525">
+                  <a14:hiddenLine xmlns="" xmlns:a14="http://schemas.microsoft.com/office/drawing/2010/main" w="9525">
                     <a:solidFill>
                       <a:srgbClr val="000000"/>
                     </a:solidFill>
@@ -10676,7 +10787,7 @@
               </a:ln>
               <a:extLst>
                 <a:ext uri="{91240B29-F687-4f45-9708-019B960494DF}">
-                  <a14:hiddenLine xmlns:a14="http://schemas.microsoft.com/office/drawing/2010/main" xmlns="" w="9525">
+                  <a14:hiddenLine xmlns="" xmlns:a14="http://schemas.microsoft.com/office/drawing/2010/main" w="9525">
                     <a:solidFill>
                       <a:srgbClr val="000000"/>
                     </a:solidFill>
@@ -10786,7 +10897,7 @@
               </a:ln>
               <a:extLst>
                 <a:ext uri="{91240B29-F687-4f45-9708-019B960494DF}">
-                  <a14:hiddenLine xmlns:a14="http://schemas.microsoft.com/office/drawing/2010/main" xmlns="" w="9525">
+                  <a14:hiddenLine xmlns="" xmlns:a14="http://schemas.microsoft.com/office/drawing/2010/main" w="9525">
                     <a:solidFill>
                       <a:srgbClr val="000000"/>
                     </a:solidFill>
@@ -10870,7 +10981,7 @@
               </a:ln>
               <a:extLst>
                 <a:ext uri="{91240B29-F687-4f45-9708-019B960494DF}">
-                  <a14:hiddenLine xmlns:a14="http://schemas.microsoft.com/office/drawing/2010/main" xmlns="" w="9525">
+                  <a14:hiddenLine xmlns="" xmlns:a14="http://schemas.microsoft.com/office/drawing/2010/main" w="9525">
                     <a:solidFill>
                       <a:srgbClr val="000000"/>
                     </a:solidFill>
@@ -10932,7 +11043,7 @@
               </a:ln>
               <a:extLst>
                 <a:ext uri="{91240B29-F687-4f45-9708-019B960494DF}">
-                  <a14:hiddenLine xmlns:a14="http://schemas.microsoft.com/office/drawing/2010/main" xmlns="" w="9525">
+                  <a14:hiddenLine xmlns="" xmlns:a14="http://schemas.microsoft.com/office/drawing/2010/main" w="9525">
                     <a:solidFill>
                       <a:srgbClr val="000000"/>
                     </a:solidFill>
@@ -10994,7 +11105,7 @@
               </a:ln>
               <a:extLst>
                 <a:ext uri="{91240B29-F687-4f45-9708-019B960494DF}">
-                  <a14:hiddenLine xmlns:a14="http://schemas.microsoft.com/office/drawing/2010/main" xmlns="" w="9525">
+                  <a14:hiddenLine xmlns="" xmlns:a14="http://schemas.microsoft.com/office/drawing/2010/main" w="9525">
                     <a:solidFill>
                       <a:srgbClr val="000000"/>
                     </a:solidFill>
@@ -11084,7 +11195,7 @@
               </a:ln>
               <a:extLst>
                 <a:ext uri="{91240B29-F687-4f45-9708-019B960494DF}">
-                  <a14:hiddenLine xmlns:a14="http://schemas.microsoft.com/office/drawing/2010/main" xmlns="" w="9525">
+                  <a14:hiddenLine xmlns="" xmlns:a14="http://schemas.microsoft.com/office/drawing/2010/main" w="9525">
                     <a:solidFill>
                       <a:srgbClr val="000000"/>
                     </a:solidFill>
@@ -11118,7 +11229,7 @@
               </a:ln>
               <a:extLst>
                 <a:ext uri="{91240B29-F687-4f45-9708-019B960494DF}">
-                  <a14:hiddenLine xmlns:a14="http://schemas.microsoft.com/office/drawing/2010/main" xmlns="" w="9525">
+                  <a14:hiddenLine xmlns="" xmlns:a14="http://schemas.microsoft.com/office/drawing/2010/main" w="9525">
                     <a:solidFill>
                       <a:srgbClr val="000000"/>
                     </a:solidFill>
@@ -11183,7 +11294,7 @@
               </a:ln>
               <a:extLst>
                 <a:ext uri="{91240B29-F687-4f45-9708-019B960494DF}">
-                  <a14:hiddenLine xmlns:a14="http://schemas.microsoft.com/office/drawing/2010/main" xmlns="" w="9525">
+                  <a14:hiddenLine xmlns="" xmlns:a14="http://schemas.microsoft.com/office/drawing/2010/main" w="9525">
                     <a:solidFill>
                       <a:srgbClr val="000000"/>
                     </a:solidFill>
@@ -11273,7 +11384,7 @@
               </a:ln>
               <a:extLst>
                 <a:ext uri="{91240B29-F687-4f45-9708-019B960494DF}">
-                  <a14:hiddenLine xmlns:a14="http://schemas.microsoft.com/office/drawing/2010/main" xmlns="" w="9525">
+                  <a14:hiddenLine xmlns="" xmlns:a14="http://schemas.microsoft.com/office/drawing/2010/main" w="9525">
                     <a:solidFill>
                       <a:srgbClr val="000000"/>
                     </a:solidFill>
@@ -11335,7 +11446,7 @@
               </a:ln>
               <a:extLst>
                 <a:ext uri="{91240B29-F687-4f45-9708-019B960494DF}">
-                  <a14:hiddenLine xmlns:a14="http://schemas.microsoft.com/office/drawing/2010/main" xmlns="" w="9525">
+                  <a14:hiddenLine xmlns="" xmlns:a14="http://schemas.microsoft.com/office/drawing/2010/main" w="9525">
                     <a:solidFill>
                       <a:srgbClr val="000000"/>
                     </a:solidFill>
@@ -11425,7 +11536,7 @@
               </a:ln>
               <a:extLst>
                 <a:ext uri="{91240B29-F687-4f45-9708-019B960494DF}">
-                  <a14:hiddenLine xmlns:a14="http://schemas.microsoft.com/office/drawing/2010/main" xmlns="" w="9525">
+                  <a14:hiddenLine xmlns="" xmlns:a14="http://schemas.microsoft.com/office/drawing/2010/main" w="9525">
                     <a:solidFill>
                       <a:srgbClr val="000000"/>
                     </a:solidFill>
@@ -11490,7 +11601,7 @@
               </a:ln>
               <a:extLst>
                 <a:ext uri="{91240B29-F687-4f45-9708-019B960494DF}">
-                  <a14:hiddenLine xmlns:a14="http://schemas.microsoft.com/office/drawing/2010/main" xmlns="" w="9525">
+                  <a14:hiddenLine xmlns="" xmlns:a14="http://schemas.microsoft.com/office/drawing/2010/main" w="9525">
                     <a:solidFill>
                       <a:srgbClr val="000000"/>
                     </a:solidFill>
@@ -11552,7 +11663,7 @@
               </a:ln>
               <a:extLst>
                 <a:ext uri="{91240B29-F687-4f45-9708-019B960494DF}">
-                  <a14:hiddenLine xmlns:a14="http://schemas.microsoft.com/office/drawing/2010/main" xmlns="" w="9525">
+                  <a14:hiddenLine xmlns="" xmlns:a14="http://schemas.microsoft.com/office/drawing/2010/main" w="9525">
                     <a:solidFill>
                       <a:srgbClr val="000000"/>
                     </a:solidFill>
@@ -11642,7 +11753,7 @@
               </a:ln>
               <a:extLst>
                 <a:ext uri="{91240B29-F687-4f45-9708-019B960494DF}">
-                  <a14:hiddenLine xmlns:a14="http://schemas.microsoft.com/office/drawing/2010/main" xmlns="" w="9525">
+                  <a14:hiddenLine xmlns="" xmlns:a14="http://schemas.microsoft.com/office/drawing/2010/main" w="9525">
                     <a:solidFill>
                       <a:srgbClr val="000000"/>
                     </a:solidFill>
@@ -11732,7 +11843,7 @@
               </a:ln>
               <a:extLst>
                 <a:ext uri="{91240B29-F687-4f45-9708-019B960494DF}">
-                  <a14:hiddenLine xmlns:a14="http://schemas.microsoft.com/office/drawing/2010/main" xmlns="" w="9525">
+                  <a14:hiddenLine xmlns="" xmlns:a14="http://schemas.microsoft.com/office/drawing/2010/main" w="9525">
                     <a:solidFill>
                       <a:srgbClr val="000000"/>
                     </a:solidFill>
@@ -11797,7 +11908,7 @@
               </a:ln>
               <a:extLst>
                 <a:ext uri="{91240B29-F687-4f45-9708-019B960494DF}">
-                  <a14:hiddenLine xmlns:a14="http://schemas.microsoft.com/office/drawing/2010/main" xmlns="" w="9525">
+                  <a14:hiddenLine xmlns="" xmlns:a14="http://schemas.microsoft.com/office/drawing/2010/main" w="9525">
                     <a:solidFill>
                       <a:srgbClr val="000000"/>
                     </a:solidFill>
@@ -11917,7 +12028,7 @@
               </a:ln>
               <a:extLst>
                 <a:ext uri="{91240B29-F687-4f45-9708-019B960494DF}">
-                  <a14:hiddenLine xmlns:a14="http://schemas.microsoft.com/office/drawing/2010/main" xmlns="" w="9525">
+                  <a14:hiddenLine xmlns="" xmlns:a14="http://schemas.microsoft.com/office/drawing/2010/main" w="9525">
                     <a:solidFill>
                       <a:srgbClr val="000000"/>
                     </a:solidFill>
@@ -11998,7 +12109,7 @@
               </a:ln>
               <a:extLst>
                 <a:ext uri="{91240B29-F687-4f45-9708-019B960494DF}">
-                  <a14:hiddenLine xmlns:a14="http://schemas.microsoft.com/office/drawing/2010/main" xmlns="" w="9525">
+                  <a14:hiddenLine xmlns="" xmlns:a14="http://schemas.microsoft.com/office/drawing/2010/main" w="9525">
                     <a:solidFill>
                       <a:srgbClr val="000000"/>
                     </a:solidFill>
@@ -12113,7 +12224,7 @@
               </a:ln>
               <a:extLst>
                 <a:ext uri="{91240B29-F687-4f45-9708-019B960494DF}">
-                  <a14:hiddenLine xmlns:a14="http://schemas.microsoft.com/office/drawing/2010/main" xmlns="" w="9525">
+                  <a14:hiddenLine xmlns="" xmlns:a14="http://schemas.microsoft.com/office/drawing/2010/main" w="9525">
                     <a:solidFill>
                       <a:srgbClr val="000000"/>
                     </a:solidFill>
@@ -12203,7 +12314,7 @@
               </a:ln>
               <a:extLst>
                 <a:ext uri="{91240B29-F687-4f45-9708-019B960494DF}">
-                  <a14:hiddenLine xmlns:a14="http://schemas.microsoft.com/office/drawing/2010/main" xmlns="" w="9525">
+                  <a14:hiddenLine xmlns="" xmlns:a14="http://schemas.microsoft.com/office/drawing/2010/main" w="9525">
                     <a:solidFill>
                       <a:srgbClr val="000000"/>
                     </a:solidFill>
@@ -12268,7 +12379,7 @@
               </a:ln>
               <a:extLst>
                 <a:ext uri="{91240B29-F687-4f45-9708-019B960494DF}">
-                  <a14:hiddenLine xmlns:a14="http://schemas.microsoft.com/office/drawing/2010/main" xmlns="" w="9525">
+                  <a14:hiddenLine xmlns="" xmlns:a14="http://schemas.microsoft.com/office/drawing/2010/main" w="9525">
                     <a:solidFill>
                       <a:srgbClr val="000000"/>
                     </a:solidFill>
@@ -12358,7 +12469,7 @@
               </a:ln>
               <a:extLst>
                 <a:ext uri="{91240B29-F687-4f45-9708-019B960494DF}">
-                  <a14:hiddenLine xmlns:a14="http://schemas.microsoft.com/office/drawing/2010/main" xmlns="" w="9525">
+                  <a14:hiddenLine xmlns="" xmlns:a14="http://schemas.microsoft.com/office/drawing/2010/main" w="9525">
                     <a:solidFill>
                       <a:srgbClr val="000000"/>
                     </a:solidFill>
@@ -12426,7 +12537,7 @@
               </a:ln>
               <a:extLst>
                 <a:ext uri="{91240B29-F687-4f45-9708-019B960494DF}">
-                  <a14:hiddenLine xmlns:a14="http://schemas.microsoft.com/office/drawing/2010/main" xmlns="" w="9525">
+                  <a14:hiddenLine xmlns="" xmlns:a14="http://schemas.microsoft.com/office/drawing/2010/main" w="9525">
                     <a:solidFill>
                       <a:srgbClr val="000000"/>
                     </a:solidFill>
@@ -12516,7 +12627,7 @@
               </a:ln>
               <a:extLst>
                 <a:ext uri="{91240B29-F687-4f45-9708-019B960494DF}">
-                  <a14:hiddenLine xmlns:a14="http://schemas.microsoft.com/office/drawing/2010/main" xmlns="" w="9525">
+                  <a14:hiddenLine xmlns="" xmlns:a14="http://schemas.microsoft.com/office/drawing/2010/main" w="9525">
                     <a:solidFill>
                       <a:srgbClr val="000000"/>
                     </a:solidFill>
@@ -12584,7 +12695,7 @@
               </a:ln>
               <a:extLst>
                 <a:ext uri="{91240B29-F687-4f45-9708-019B960494DF}">
-                  <a14:hiddenLine xmlns:a14="http://schemas.microsoft.com/office/drawing/2010/main" xmlns="" w="9525">
+                  <a14:hiddenLine xmlns="" xmlns:a14="http://schemas.microsoft.com/office/drawing/2010/main" w="9525">
                     <a:solidFill>
                       <a:srgbClr val="000000"/>
                     </a:solidFill>
@@ -12674,7 +12785,7 @@
               </a:ln>
               <a:extLst>
                 <a:ext uri="{91240B29-F687-4f45-9708-019B960494DF}">
-                  <a14:hiddenLine xmlns:a14="http://schemas.microsoft.com/office/drawing/2010/main" xmlns="" w="9525">
+                  <a14:hiddenLine xmlns="" xmlns:a14="http://schemas.microsoft.com/office/drawing/2010/main" w="9525">
                     <a:solidFill>
                       <a:srgbClr val="000000"/>
                     </a:solidFill>
@@ -12708,7 +12819,7 @@
               </a:ln>
               <a:extLst>
                 <a:ext uri="{91240B29-F687-4f45-9708-019B960494DF}">
-                  <a14:hiddenLine xmlns:a14="http://schemas.microsoft.com/office/drawing/2010/main" xmlns="" w="9525">
+                  <a14:hiddenLine xmlns="" xmlns:a14="http://schemas.microsoft.com/office/drawing/2010/main" w="9525">
                     <a:solidFill>
                       <a:srgbClr val="000000"/>
                     </a:solidFill>
@@ -12848,7 +12959,7 @@
           <a:p>
             <a:fld id="{041B6913-160D-42A0-B0F5-1CC4E0223D66}" type="datetimeFigureOut">
               <a:rPr lang="en-GB" smtClean="0"/>
-              <a:t>04/04/2018</a:t>
+              <a:t>06/04/2018</a:t>
             </a:fld>
             <a:endParaRPr lang="en-GB"/>
           </a:p>
@@ -15433,6 +15544,766 @@
 <file path=ppt/slides/slide6.xml><?xml version="1.0" encoding="utf-8"?>
 <p:sld xmlns:a="http://schemas.openxmlformats.org/drawingml/2006/main" xmlns:r="http://schemas.openxmlformats.org/officeDocument/2006/relationships" xmlns:p="http://schemas.openxmlformats.org/presentationml/2006/main">
   <p:cSld>
+    <p:bg>
+      <p:bgPr>
+        <a:blipFill>
+          <a:blip r:embed="rId2">
+            <a:duotone>
+              <a:schemeClr val="bg2">
+                <a:shade val="88000"/>
+                <a:hueMod val="106000"/>
+                <a:satMod val="140000"/>
+                <a:lumMod val="54000"/>
+              </a:schemeClr>
+              <a:schemeClr val="bg2">
+                <a:tint val="98000"/>
+                <a:hueMod val="92000"/>
+                <a:satMod val="150000"/>
+                <a:lumMod val="150000"/>
+              </a:schemeClr>
+            </a:duotone>
+            <a:extLst/>
+          </a:blip>
+          <a:stretch/>
+        </a:blipFill>
+        <a:effectLst/>
+      </p:bgPr>
+    </p:bg>
+    <p:spTree>
+      <p:nvGrpSpPr>
+        <p:cNvPr id="1" name=""/>
+        <p:cNvGrpSpPr/>
+        <p:nvPr/>
+      </p:nvGrpSpPr>
+      <p:grpSpPr>
+        <a:xfrm>
+          <a:off x="0" y="0"/>
+          <a:ext cx="0" cy="0"/>
+          <a:chOff x="0" y="0"/>
+          <a:chExt cx="0" cy="0"/>
+        </a:xfrm>
+      </p:grpSpPr>
+      <p:pic>
+        <p:nvPicPr>
+          <p:cNvPr id="5" name="Picture 4" descr="A close up of text on a white background&#10;&#10;Description generated with high confidence">
+            <a:extLst>
+              <a:ext uri="{FF2B5EF4-FFF2-40B4-BE49-F238E27FC236}">
+                <a16:creationId xmlns:a16="http://schemas.microsoft.com/office/drawing/2014/main" id="{68CD8263-BBDD-43C2-BC99-483B9888D620}"/>
+              </a:ext>
+            </a:extLst>
+          </p:cNvPr>
+          <p:cNvPicPr>
+            <a:picLocks noChangeAspect="1"/>
+          </p:cNvPicPr>
+          <p:nvPr/>
+        </p:nvPicPr>
+        <p:blipFill>
+          <a:blip r:embed="rId3">
+            <a:extLst>
+              <a:ext uri="{28A0092B-C50C-407E-A947-70E740481C1C}">
+                <a14:useLocalDpi xmlns:a14="http://schemas.microsoft.com/office/drawing/2010/main" val="0"/>
+              </a:ext>
+            </a:extLst>
+          </a:blip>
+          <a:stretch>
+            <a:fillRect/>
+          </a:stretch>
+        </p:blipFill>
+        <p:spPr>
+          <a:xfrm>
+            <a:off x="183502" y="1999853"/>
+            <a:ext cx="5129654" cy="3495876"/>
+          </a:xfrm>
+          <a:prstGeom prst="round2DiagRect">
+            <a:avLst>
+              <a:gd name="adj1" fmla="val 0"/>
+              <a:gd name="adj2" fmla="val 0"/>
+            </a:avLst>
+          </a:prstGeom>
+          <a:ln w="19050" cap="sq">
+            <a:solidFill>
+              <a:schemeClr val="tx2">
+                <a:lumMod val="60000"/>
+                <a:lumOff val="40000"/>
+                <a:alpha val="60000"/>
+              </a:schemeClr>
+            </a:solidFill>
+            <a:miter lim="800000"/>
+          </a:ln>
+          <a:effectLst>
+            <a:outerShdw blurRad="88900" dist="38100" dir="5400000" algn="t" rotWithShape="0">
+              <a:prstClr val="black">
+                <a:alpha val="40000"/>
+              </a:prstClr>
+            </a:outerShdw>
+          </a:effectLst>
+        </p:spPr>
+      </p:pic>
+      <p:sp>
+        <p:nvSpPr>
+          <p:cNvPr id="2" name="Title 1">
+            <a:extLst>
+              <a:ext uri="{FF2B5EF4-FFF2-40B4-BE49-F238E27FC236}">
+                <a16:creationId xmlns:a16="http://schemas.microsoft.com/office/drawing/2014/main" id="{B2C48BB0-2C7E-47B0-8577-3561C0F1C711}"/>
+              </a:ext>
+            </a:extLst>
+          </p:cNvPr>
+          <p:cNvSpPr>
+            <a:spLocks noGrp="1"/>
+          </p:cNvSpPr>
+          <p:nvPr>
+            <p:ph type="title"/>
+          </p:nvPr>
+        </p:nvSpPr>
+        <p:spPr>
+          <a:xfrm>
+            <a:off x="1141412" y="204173"/>
+            <a:ext cx="9905998" cy="1478570"/>
+          </a:xfrm>
+        </p:spPr>
+        <p:txBody>
+          <a:bodyPr>
+            <a:normAutofit/>
+          </a:bodyPr>
+          <a:lstStyle/>
+          <a:p>
+            <a:r>
+              <a:rPr lang="en-GB" dirty="0"/>
+              <a:t>What else can be done?</a:t>
+            </a:r>
+          </a:p>
+        </p:txBody>
+      </p:sp>
+      <p:sp>
+        <p:nvSpPr>
+          <p:cNvPr id="3" name="Content Placeholder 2">
+            <a:extLst>
+              <a:ext uri="{FF2B5EF4-FFF2-40B4-BE49-F238E27FC236}">
+                <a16:creationId xmlns:a16="http://schemas.microsoft.com/office/drawing/2014/main" id="{6EC4B85D-3418-41B3-A022-498384BC0F05}"/>
+              </a:ext>
+            </a:extLst>
+          </p:cNvPr>
+          <p:cNvSpPr>
+            <a:spLocks noGrp="1"/>
+          </p:cNvSpPr>
+          <p:nvPr>
+            <p:ph idx="1"/>
+          </p:nvPr>
+        </p:nvSpPr>
+        <p:spPr>
+          <a:xfrm>
+            <a:off x="5473073" y="1682743"/>
+            <a:ext cx="6535425" cy="4971084"/>
+          </a:xfrm>
+        </p:spPr>
+        <p:txBody>
+          <a:bodyPr>
+            <a:normAutofit fontScale="92500" lnSpcReduction="10000"/>
+          </a:bodyPr>
+          <a:lstStyle/>
+          <a:p>
+            <a:r>
+              <a:rPr lang="en-GB" dirty="0"/>
+              <a:t>Other methods to design user interaction with the system are creating Robustness Diagrams and Sequence Diagrams.</a:t>
+            </a:r>
+          </a:p>
+          <a:p>
+            <a:endParaRPr lang="en-GB" dirty="0"/>
+          </a:p>
+          <a:p>
+            <a:r>
+              <a:rPr lang="en-GB" dirty="0"/>
+              <a:t>Robustness diagrams are the advanced versions of use case diagrams where each component has a specific purpose.</a:t>
+            </a:r>
+          </a:p>
+          <a:p>
+            <a:endParaRPr lang="en-GB" dirty="0"/>
+          </a:p>
+          <a:p>
+            <a:r>
+              <a:rPr lang="en-GB" dirty="0"/>
+              <a:t>Sequence Diagrams display object interactions and sequence of messages exchanged between the user and the system.</a:t>
+            </a:r>
+          </a:p>
+          <a:p>
+            <a:endParaRPr lang="en-GB" dirty="0"/>
+          </a:p>
+          <a:p>
+            <a:endParaRPr lang="en-GB" dirty="0"/>
+          </a:p>
+        </p:txBody>
+      </p:sp>
+      <p:pic>
+        <p:nvPicPr>
+          <p:cNvPr id="7" name="Picture 6" descr="A screenshot of a social media post&#10;&#10;Description generated with very high confidence">
+            <a:extLst>
+              <a:ext uri="{FF2B5EF4-FFF2-40B4-BE49-F238E27FC236}">
+                <a16:creationId xmlns:a16="http://schemas.microsoft.com/office/drawing/2014/main" id="{A3EBD2EA-DF4A-4EEC-AA90-BC41AD5A72DC}"/>
+              </a:ext>
+            </a:extLst>
+          </p:cNvPr>
+          <p:cNvPicPr>
+            <a:picLocks noChangeAspect="1"/>
+          </p:cNvPicPr>
+          <p:nvPr/>
+        </p:nvPicPr>
+        <p:blipFill>
+          <a:blip r:embed="rId4">
+            <a:extLst>
+              <a:ext uri="{28A0092B-C50C-407E-A947-70E740481C1C}">
+                <a14:useLocalDpi xmlns:a14="http://schemas.microsoft.com/office/drawing/2010/main" val="0"/>
+              </a:ext>
+            </a:extLst>
+          </a:blip>
+          <a:stretch>
+            <a:fillRect/>
+          </a:stretch>
+        </p:blipFill>
+        <p:spPr>
+          <a:xfrm>
+            <a:off x="183502" y="2324097"/>
+            <a:ext cx="5129654" cy="2847387"/>
+          </a:xfrm>
+          <a:prstGeom prst="rect">
+            <a:avLst/>
+          </a:prstGeom>
+        </p:spPr>
+      </p:pic>
+    </p:spTree>
+    <p:extLst>
+      <p:ext uri="{BB962C8B-B14F-4D97-AF65-F5344CB8AC3E}">
+        <p14:creationId xmlns:p14="http://schemas.microsoft.com/office/powerpoint/2010/main" val="1137362217"/>
+      </p:ext>
+    </p:extLst>
+  </p:cSld>
+  <p:clrMapOvr>
+    <a:masterClrMapping/>
+  </p:clrMapOvr>
+  <p:transition spd="slow">
+    <p:blinds/>
+  </p:transition>
+  <p:timing>
+    <p:tnLst>
+      <p:par>
+        <p:cTn id="1" dur="indefinite" restart="never" nodeType="tmRoot">
+          <p:childTnLst>
+            <p:seq concurrent="1" nextAc="seek">
+              <p:cTn id="2" dur="indefinite" nodeType="mainSeq">
+                <p:childTnLst>
+                  <p:par>
+                    <p:cTn id="3" fill="hold">
+                      <p:stCondLst>
+                        <p:cond delay="indefinite"/>
+                      </p:stCondLst>
+                      <p:childTnLst>
+                        <p:par>
+                          <p:cTn id="4" fill="hold">
+                            <p:stCondLst>
+                              <p:cond delay="0"/>
+                            </p:stCondLst>
+                            <p:childTnLst>
+                              <p:par>
+                                <p:cTn id="5" presetID="10" presetClass="entr" presetSubtype="0" fill="hold" grpId="0" nodeType="clickEffect">
+                                  <p:stCondLst>
+                                    <p:cond delay="0"/>
+                                  </p:stCondLst>
+                                  <p:childTnLst>
+                                    <p:set>
+                                      <p:cBhvr>
+                                        <p:cTn id="6" dur="1" fill="hold">
+                                          <p:stCondLst>
+                                            <p:cond delay="0"/>
+                                          </p:stCondLst>
+                                        </p:cTn>
+                                        <p:tgtEl>
+                                          <p:spTgt spid="2"/>
+                                        </p:tgtEl>
+                                        <p:attrNameLst>
+                                          <p:attrName>style.visibility</p:attrName>
+                                        </p:attrNameLst>
+                                      </p:cBhvr>
+                                      <p:to>
+                                        <p:strVal val="visible"/>
+                                      </p:to>
+                                    </p:set>
+                                    <p:animEffect transition="in" filter="fade">
+                                      <p:cBhvr>
+                                        <p:cTn id="7" dur="500"/>
+                                        <p:tgtEl>
+                                          <p:spTgt spid="2"/>
+                                        </p:tgtEl>
+                                      </p:cBhvr>
+                                    </p:animEffect>
+                                  </p:childTnLst>
+                                </p:cTn>
+                              </p:par>
+                            </p:childTnLst>
+                          </p:cTn>
+                        </p:par>
+                      </p:childTnLst>
+                    </p:cTn>
+                  </p:par>
+                  <p:par>
+                    <p:cTn id="8" fill="hold">
+                      <p:stCondLst>
+                        <p:cond delay="indefinite"/>
+                      </p:stCondLst>
+                      <p:childTnLst>
+                        <p:par>
+                          <p:cTn id="9" fill="hold">
+                            <p:stCondLst>
+                              <p:cond delay="0"/>
+                            </p:stCondLst>
+                            <p:childTnLst>
+                              <p:par>
+                                <p:cTn id="10" presetID="10" presetClass="entr" presetSubtype="0" fill="hold" grpId="0" nodeType="clickEffect">
+                                  <p:stCondLst>
+                                    <p:cond delay="0"/>
+                                  </p:stCondLst>
+                                  <p:childTnLst>
+                                    <p:set>
+                                      <p:cBhvr>
+                                        <p:cTn id="11" dur="1" fill="hold">
+                                          <p:stCondLst>
+                                            <p:cond delay="0"/>
+                                          </p:stCondLst>
+                                        </p:cTn>
+                                        <p:tgtEl>
+                                          <p:spTgt spid="3">
+                                            <p:txEl>
+                                              <p:pRg st="0" end="0"/>
+                                            </p:txEl>
+                                          </p:spTgt>
+                                        </p:tgtEl>
+                                        <p:attrNameLst>
+                                          <p:attrName>style.visibility</p:attrName>
+                                        </p:attrNameLst>
+                                      </p:cBhvr>
+                                      <p:to>
+                                        <p:strVal val="visible"/>
+                                      </p:to>
+                                    </p:set>
+                                    <p:animEffect transition="in" filter="fade">
+                                      <p:cBhvr>
+                                        <p:cTn id="12" dur="500"/>
+                                        <p:tgtEl>
+                                          <p:spTgt spid="3">
+                                            <p:txEl>
+                                              <p:pRg st="0" end="0"/>
+                                            </p:txEl>
+                                          </p:spTgt>
+                                        </p:tgtEl>
+                                      </p:cBhvr>
+                                    </p:animEffect>
+                                  </p:childTnLst>
+                                </p:cTn>
+                              </p:par>
+                            </p:childTnLst>
+                          </p:cTn>
+                        </p:par>
+                      </p:childTnLst>
+                    </p:cTn>
+                  </p:par>
+                  <p:par>
+                    <p:cTn id="13" fill="hold">
+                      <p:stCondLst>
+                        <p:cond delay="indefinite"/>
+                      </p:stCondLst>
+                      <p:childTnLst>
+                        <p:par>
+                          <p:cTn id="14" fill="hold">
+                            <p:stCondLst>
+                              <p:cond delay="0"/>
+                            </p:stCondLst>
+                            <p:childTnLst>
+                              <p:par>
+                                <p:cTn id="15" presetID="10" presetClass="entr" presetSubtype="0" fill="hold" grpId="0" nodeType="clickEffect">
+                                  <p:stCondLst>
+                                    <p:cond delay="0"/>
+                                  </p:stCondLst>
+                                  <p:childTnLst>
+                                    <p:set>
+                                      <p:cBhvr>
+                                        <p:cTn id="16" dur="1" fill="hold">
+                                          <p:stCondLst>
+                                            <p:cond delay="0"/>
+                                          </p:stCondLst>
+                                        </p:cTn>
+                                        <p:tgtEl>
+                                          <p:spTgt spid="3">
+                                            <p:txEl>
+                                              <p:pRg st="2" end="2"/>
+                                            </p:txEl>
+                                          </p:spTgt>
+                                        </p:tgtEl>
+                                        <p:attrNameLst>
+                                          <p:attrName>style.visibility</p:attrName>
+                                        </p:attrNameLst>
+                                      </p:cBhvr>
+                                      <p:to>
+                                        <p:strVal val="visible"/>
+                                      </p:to>
+                                    </p:set>
+                                    <p:animEffect transition="in" filter="fade">
+                                      <p:cBhvr>
+                                        <p:cTn id="17" dur="500"/>
+                                        <p:tgtEl>
+                                          <p:spTgt spid="3">
+                                            <p:txEl>
+                                              <p:pRg st="2" end="2"/>
+                                            </p:txEl>
+                                          </p:spTgt>
+                                        </p:tgtEl>
+                                      </p:cBhvr>
+                                    </p:animEffect>
+                                  </p:childTnLst>
+                                </p:cTn>
+                              </p:par>
+                              <p:par>
+                                <p:cTn id="18" presetID="10" presetClass="entr" presetSubtype="0" fill="hold" nodeType="withEffect">
+                                  <p:stCondLst>
+                                    <p:cond delay="0"/>
+                                  </p:stCondLst>
+                                  <p:childTnLst>
+                                    <p:set>
+                                      <p:cBhvr>
+                                        <p:cTn id="19" dur="1" fill="hold">
+                                          <p:stCondLst>
+                                            <p:cond delay="0"/>
+                                          </p:stCondLst>
+                                        </p:cTn>
+                                        <p:tgtEl>
+                                          <p:spTgt spid="5"/>
+                                        </p:tgtEl>
+                                        <p:attrNameLst>
+                                          <p:attrName>style.visibility</p:attrName>
+                                        </p:attrNameLst>
+                                      </p:cBhvr>
+                                      <p:to>
+                                        <p:strVal val="visible"/>
+                                      </p:to>
+                                    </p:set>
+                                    <p:animEffect transition="in" filter="fade">
+                                      <p:cBhvr>
+                                        <p:cTn id="20" dur="500"/>
+                                        <p:tgtEl>
+                                          <p:spTgt spid="5"/>
+                                        </p:tgtEl>
+                                      </p:cBhvr>
+                                    </p:animEffect>
+                                  </p:childTnLst>
+                                </p:cTn>
+                              </p:par>
+                            </p:childTnLst>
+                          </p:cTn>
+                        </p:par>
+                      </p:childTnLst>
+                    </p:cTn>
+                  </p:par>
+                  <p:par>
+                    <p:cTn id="21" fill="hold">
+                      <p:stCondLst>
+                        <p:cond delay="indefinite"/>
+                      </p:stCondLst>
+                      <p:childTnLst>
+                        <p:par>
+                          <p:cTn id="22" fill="hold">
+                            <p:stCondLst>
+                              <p:cond delay="0"/>
+                            </p:stCondLst>
+                            <p:childTnLst>
+                              <p:par>
+                                <p:cTn id="23" presetID="10" presetClass="entr" presetSubtype="0" fill="hold" grpId="0" nodeType="clickEffect">
+                                  <p:stCondLst>
+                                    <p:cond delay="0"/>
+                                  </p:stCondLst>
+                                  <p:childTnLst>
+                                    <p:set>
+                                      <p:cBhvr>
+                                        <p:cTn id="24" dur="1" fill="hold">
+                                          <p:stCondLst>
+                                            <p:cond delay="0"/>
+                                          </p:stCondLst>
+                                        </p:cTn>
+                                        <p:tgtEl>
+                                          <p:spTgt spid="3">
+                                            <p:txEl>
+                                              <p:pRg st="4" end="4"/>
+                                            </p:txEl>
+                                          </p:spTgt>
+                                        </p:tgtEl>
+                                        <p:attrNameLst>
+                                          <p:attrName>style.visibility</p:attrName>
+                                        </p:attrNameLst>
+                                      </p:cBhvr>
+                                      <p:to>
+                                        <p:strVal val="visible"/>
+                                      </p:to>
+                                    </p:set>
+                                    <p:animEffect transition="in" filter="fade">
+                                      <p:cBhvr>
+                                        <p:cTn id="25" dur="500"/>
+                                        <p:tgtEl>
+                                          <p:spTgt spid="3">
+                                            <p:txEl>
+                                              <p:pRg st="4" end="4"/>
+                                            </p:txEl>
+                                          </p:spTgt>
+                                        </p:tgtEl>
+                                      </p:cBhvr>
+                                    </p:animEffect>
+                                  </p:childTnLst>
+                                </p:cTn>
+                              </p:par>
+                              <p:par>
+                                <p:cTn id="26" presetID="10" presetClass="exit" presetSubtype="0" fill="hold" nodeType="withEffect">
+                                  <p:stCondLst>
+                                    <p:cond delay="0"/>
+                                  </p:stCondLst>
+                                  <p:childTnLst>
+                                    <p:animEffect transition="out" filter="fade">
+                                      <p:cBhvr>
+                                        <p:cTn id="27" dur="500"/>
+                                        <p:tgtEl>
+                                          <p:spTgt spid="5"/>
+                                        </p:tgtEl>
+                                      </p:cBhvr>
+                                    </p:animEffect>
+                                    <p:set>
+                                      <p:cBhvr>
+                                        <p:cTn id="28" dur="1" fill="hold">
+                                          <p:stCondLst>
+                                            <p:cond delay="499"/>
+                                          </p:stCondLst>
+                                        </p:cTn>
+                                        <p:tgtEl>
+                                          <p:spTgt spid="5"/>
+                                        </p:tgtEl>
+                                        <p:attrNameLst>
+                                          <p:attrName>style.visibility</p:attrName>
+                                        </p:attrNameLst>
+                                      </p:cBhvr>
+                                      <p:to>
+                                        <p:strVal val="hidden"/>
+                                      </p:to>
+                                    </p:set>
+                                  </p:childTnLst>
+                                </p:cTn>
+                              </p:par>
+                            </p:childTnLst>
+                          </p:cTn>
+                        </p:par>
+                        <p:par>
+                          <p:cTn id="29" fill="hold">
+                            <p:stCondLst>
+                              <p:cond delay="500"/>
+                            </p:stCondLst>
+                            <p:childTnLst>
+                              <p:par>
+                                <p:cTn id="30" presetID="10" presetClass="entr" presetSubtype="0" fill="hold" nodeType="afterEffect">
+                                  <p:stCondLst>
+                                    <p:cond delay="0"/>
+                                  </p:stCondLst>
+                                  <p:childTnLst>
+                                    <p:set>
+                                      <p:cBhvr>
+                                        <p:cTn id="31" dur="1" fill="hold">
+                                          <p:stCondLst>
+                                            <p:cond delay="0"/>
+                                          </p:stCondLst>
+                                        </p:cTn>
+                                        <p:tgtEl>
+                                          <p:spTgt spid="7"/>
+                                        </p:tgtEl>
+                                        <p:attrNameLst>
+                                          <p:attrName>style.visibility</p:attrName>
+                                        </p:attrNameLst>
+                                      </p:cBhvr>
+                                      <p:to>
+                                        <p:strVal val="visible"/>
+                                      </p:to>
+                                    </p:set>
+                                    <p:animEffect transition="in" filter="fade">
+                                      <p:cBhvr>
+                                        <p:cTn id="32" dur="500"/>
+                                        <p:tgtEl>
+                                          <p:spTgt spid="7"/>
+                                        </p:tgtEl>
+                                      </p:cBhvr>
+                                    </p:animEffect>
+                                  </p:childTnLst>
+                                </p:cTn>
+                              </p:par>
+                            </p:childTnLst>
+                          </p:cTn>
+                        </p:par>
+                      </p:childTnLst>
+                    </p:cTn>
+                  </p:par>
+                </p:childTnLst>
+              </p:cTn>
+              <p:prevCondLst>
+                <p:cond evt="onPrev" delay="0">
+                  <p:tgtEl>
+                    <p:sldTgt/>
+                  </p:tgtEl>
+                </p:cond>
+              </p:prevCondLst>
+              <p:nextCondLst>
+                <p:cond evt="onNext" delay="0">
+                  <p:tgtEl>
+                    <p:sldTgt/>
+                  </p:tgtEl>
+                </p:cond>
+              </p:nextCondLst>
+            </p:seq>
+          </p:childTnLst>
+        </p:cTn>
+      </p:par>
+    </p:tnLst>
+    <p:bldLst>
+      <p:bldP spid="2" grpId="0"/>
+      <p:bldP spid="3" grpId="0" uiExpand="1" build="p"/>
+    </p:bldLst>
+  </p:timing>
+</p:sld>
+</file>
+
+<file path=ppt/slides/slide7.xml><?xml version="1.0" encoding="utf-8"?>
+<p:sld xmlns:a="http://schemas.openxmlformats.org/drawingml/2006/main" xmlns:r="http://schemas.openxmlformats.org/officeDocument/2006/relationships" xmlns:p="http://schemas.openxmlformats.org/presentationml/2006/main">
+  <p:cSld>
+    <p:spTree>
+      <p:nvGrpSpPr>
+        <p:cNvPr id="1" name=""/>
+        <p:cNvGrpSpPr/>
+        <p:nvPr/>
+      </p:nvGrpSpPr>
+      <p:grpSpPr>
+        <a:xfrm>
+          <a:off x="0" y="0"/>
+          <a:ext cx="0" cy="0"/>
+          <a:chOff x="0" y="0"/>
+          <a:chExt cx="0" cy="0"/>
+        </a:xfrm>
+      </p:grpSpPr>
+      <p:sp>
+        <p:nvSpPr>
+          <p:cNvPr id="2" name="Title 1">
+            <a:extLst>
+              <a:ext uri="{FF2B5EF4-FFF2-40B4-BE49-F238E27FC236}">
+                <a16:creationId xmlns:a16="http://schemas.microsoft.com/office/drawing/2014/main" id="{25E515C5-3F5F-4876-BDAC-C8B42D436BF7}"/>
+              </a:ext>
+            </a:extLst>
+          </p:cNvPr>
+          <p:cNvSpPr>
+            <a:spLocks noGrp="1"/>
+          </p:cNvSpPr>
+          <p:nvPr>
+            <p:ph type="title"/>
+          </p:nvPr>
+        </p:nvSpPr>
+        <p:spPr>
+          <a:xfrm>
+            <a:off x="1143001" y="366592"/>
+            <a:ext cx="9905998" cy="1478570"/>
+          </a:xfrm>
+        </p:spPr>
+        <p:txBody>
+          <a:bodyPr/>
+          <a:lstStyle/>
+          <a:p>
+            <a:r>
+              <a:rPr lang="en-GB" dirty="0"/>
+              <a:t>Why were expanded use cases used?</a:t>
+            </a:r>
+          </a:p>
+        </p:txBody>
+      </p:sp>
+      <p:sp>
+        <p:nvSpPr>
+          <p:cNvPr id="3" name="Content Placeholder 2">
+            <a:extLst>
+              <a:ext uri="{FF2B5EF4-FFF2-40B4-BE49-F238E27FC236}">
+                <a16:creationId xmlns:a16="http://schemas.microsoft.com/office/drawing/2014/main" id="{3D107976-177A-49F8-814B-1E6D2F37F2BC}"/>
+              </a:ext>
+            </a:extLst>
+          </p:cNvPr>
+          <p:cNvSpPr>
+            <a:spLocks noGrp="1"/>
+          </p:cNvSpPr>
+          <p:nvPr>
+            <p:ph idx="1"/>
+          </p:nvPr>
+        </p:nvSpPr>
+        <p:spPr>
+          <a:xfrm>
+            <a:off x="1141412" y="1845162"/>
+            <a:ext cx="9905999" cy="4760911"/>
+          </a:xfrm>
+        </p:spPr>
+        <p:txBody>
+          <a:bodyPr/>
+          <a:lstStyle/>
+          <a:p>
+            <a:r>
+              <a:rPr lang="en-GB" dirty="0"/>
+              <a:t>The alternatives shown provide a useful visual flow but is still unable to explain each step in more detail.</a:t>
+            </a:r>
+          </a:p>
+          <a:p>
+            <a:endParaRPr lang="en-GB" dirty="0"/>
+          </a:p>
+          <a:p>
+            <a:r>
+              <a:rPr lang="en-GB" dirty="0"/>
+              <a:t>Expanded Use Cases combines each diagram’s purpose into one single document.</a:t>
+            </a:r>
+          </a:p>
+          <a:p>
+            <a:endParaRPr lang="en-GB" dirty="0"/>
+          </a:p>
+          <a:p>
+            <a:r>
+              <a:rPr lang="en-GB" dirty="0"/>
+              <a:t>It is very easy to implement and time-efficient. </a:t>
+            </a:r>
+          </a:p>
+          <a:p>
+            <a:endParaRPr lang="en-GB" dirty="0"/>
+          </a:p>
+          <a:p>
+            <a:endParaRPr lang="en-GB" dirty="0"/>
+          </a:p>
+        </p:txBody>
+      </p:sp>
+    </p:spTree>
+    <p:extLst>
+      <p:ext uri="{BB962C8B-B14F-4D97-AF65-F5344CB8AC3E}">
+        <p14:creationId xmlns:p14="http://schemas.microsoft.com/office/powerpoint/2010/main" val="66604519"/>
+      </p:ext>
+    </p:extLst>
+  </p:cSld>
+  <p:clrMapOvr>
+    <a:masterClrMapping/>
+  </p:clrMapOvr>
+  <mc:AlternateContent xmlns:mc="http://schemas.openxmlformats.org/markup-compatibility/2006" xmlns:p14="http://schemas.microsoft.com/office/powerpoint/2010/main">
+    <mc:Choice Requires="p14">
+      <p:transition spd="slow" p14:dur="1600">
+        <p:blinds dir="vert"/>
+      </p:transition>
+    </mc:Choice>
+    <mc:Fallback xmlns="">
+      <p:transition spd="slow">
+        <p:blinds dir="vert"/>
+      </p:transition>
+    </mc:Fallback>
+  </mc:AlternateContent>
+</p:sld>
+</file>
+
+<file path=ppt/slides/slide8.xml><?xml version="1.0" encoding="utf-8"?>
+<p:sld xmlns:a="http://schemas.openxmlformats.org/drawingml/2006/main" xmlns:r="http://schemas.openxmlformats.org/officeDocument/2006/relationships" xmlns:p="http://schemas.openxmlformats.org/presentationml/2006/main">
+  <p:cSld>
     <p:spTree>
       <p:nvGrpSpPr>
         <p:cNvPr id="1" name=""/>

</xml_diff>

<commit_message>
Reduced words in presentations
</commit_message>
<xml_diff>
--- a/Topic 2 - AE1.pptx
+++ b/Topic 2 - AE1.pptx
@@ -204,7 +204,7 @@
           <a:p>
             <a:fld id="{7D1D2ACD-840B-4FA9-9F16-DAC6CF3B9BC3}" type="datetimeFigureOut">
               <a:rPr lang="en-GB" smtClean="0"/>
-              <a:t>07/04/2018</a:t>
+              <a:t>10/04/2018</a:t>
             </a:fld>
             <a:endParaRPr lang="en-GB"/>
           </a:p>
@@ -912,7 +912,7 @@
           <a:noFill/>
           <a:extLst>
             <a:ext uri="{909E8E84-426E-40dd-AFC4-6F175D3DCCD1}">
-              <a14:hiddenFill xmlns="" xmlns:a14="http://schemas.microsoft.com/office/drawing/2010/main">
+              <a14:hiddenFill xmlns:a14="http://schemas.microsoft.com/office/drawing/2010/main" xmlns="">
                 <a:solidFill>
                   <a:srgbClr val="FFFFFF"/>
                 </a:solidFill>
@@ -971,7 +971,7 @@
             </a:ln>
             <a:extLst>
               <a:ext uri="{91240B29-F687-4f45-9708-019B960494DF}">
-                <a14:hiddenLine xmlns="" xmlns:a14="http://schemas.microsoft.com/office/drawing/2010/main" w="9525">
+                <a14:hiddenLine xmlns:a14="http://schemas.microsoft.com/office/drawing/2010/main" xmlns="" w="9525">
                   <a:solidFill>
                     <a:srgbClr val="000000"/>
                   </a:solidFill>
@@ -1061,7 +1061,7 @@
             </a:ln>
             <a:extLst>
               <a:ext uri="{91240B29-F687-4f45-9708-019B960494DF}">
-                <a14:hiddenLine xmlns="" xmlns:a14="http://schemas.microsoft.com/office/drawing/2010/main" w="9525">
+                <a14:hiddenLine xmlns:a14="http://schemas.microsoft.com/office/drawing/2010/main" xmlns="" w="9525">
                   <a:solidFill>
                     <a:srgbClr val="000000"/>
                   </a:solidFill>
@@ -1151,7 +1151,7 @@
             </a:ln>
             <a:extLst>
               <a:ext uri="{91240B29-F687-4f45-9708-019B960494DF}">
-                <a14:hiddenLine xmlns="" xmlns:a14="http://schemas.microsoft.com/office/drawing/2010/main" w="9525">
+                <a14:hiddenLine xmlns:a14="http://schemas.microsoft.com/office/drawing/2010/main" xmlns="" w="9525">
                   <a:solidFill>
                     <a:srgbClr val="000000"/>
                   </a:solidFill>
@@ -1185,7 +1185,7 @@
             </a:ln>
             <a:extLst>
               <a:ext uri="{91240B29-F687-4f45-9708-019B960494DF}">
-                <a14:hiddenLine xmlns="" xmlns:a14="http://schemas.microsoft.com/office/drawing/2010/main" w="9525">
+                <a14:hiddenLine xmlns:a14="http://schemas.microsoft.com/office/drawing/2010/main" xmlns="" w="9525">
                   <a:solidFill>
                     <a:srgbClr val="000000"/>
                   </a:solidFill>
@@ -1275,7 +1275,7 @@
             </a:ln>
             <a:extLst>
               <a:ext uri="{91240B29-F687-4f45-9708-019B960494DF}">
-                <a14:hiddenLine xmlns="" xmlns:a14="http://schemas.microsoft.com/office/drawing/2010/main" w="9525">
+                <a14:hiddenLine xmlns:a14="http://schemas.microsoft.com/office/drawing/2010/main" xmlns="" w="9525">
                   <a:solidFill>
                     <a:srgbClr val="000000"/>
                   </a:solidFill>
@@ -1337,7 +1337,7 @@
             </a:ln>
             <a:extLst>
               <a:ext uri="{91240B29-F687-4f45-9708-019B960494DF}">
-                <a14:hiddenLine xmlns="" xmlns:a14="http://schemas.microsoft.com/office/drawing/2010/main" w="9525">
+                <a14:hiddenLine xmlns:a14="http://schemas.microsoft.com/office/drawing/2010/main" xmlns="" w="9525">
                   <a:solidFill>
                     <a:srgbClr val="000000"/>
                   </a:solidFill>
@@ -1399,7 +1399,7 @@
             </a:ln>
             <a:extLst>
               <a:ext uri="{91240B29-F687-4f45-9708-019B960494DF}">
-                <a14:hiddenLine xmlns="" xmlns:a14="http://schemas.microsoft.com/office/drawing/2010/main" w="9525">
+                <a14:hiddenLine xmlns:a14="http://schemas.microsoft.com/office/drawing/2010/main" xmlns="" w="9525">
                   <a:solidFill>
                     <a:srgbClr val="000000"/>
                   </a:solidFill>
@@ -1489,7 +1489,7 @@
             </a:ln>
             <a:extLst>
               <a:ext uri="{91240B29-F687-4f45-9708-019B960494DF}">
-                <a14:hiddenLine xmlns="" xmlns:a14="http://schemas.microsoft.com/office/drawing/2010/main" w="9525">
+                <a14:hiddenLine xmlns:a14="http://schemas.microsoft.com/office/drawing/2010/main" xmlns="" w="9525">
                   <a:solidFill>
                     <a:srgbClr val="000000"/>
                   </a:solidFill>
@@ -1551,7 +1551,7 @@
             </a:ln>
             <a:extLst>
               <a:ext uri="{91240B29-F687-4f45-9708-019B960494DF}">
-                <a14:hiddenLine xmlns="" xmlns:a14="http://schemas.microsoft.com/office/drawing/2010/main" w="9525">
+                <a14:hiddenLine xmlns:a14="http://schemas.microsoft.com/office/drawing/2010/main" xmlns="" w="9525">
                   <a:solidFill>
                     <a:srgbClr val="000000"/>
                   </a:solidFill>
@@ -1613,7 +1613,7 @@
             </a:ln>
             <a:extLst>
               <a:ext uri="{91240B29-F687-4f45-9708-019B960494DF}">
-                <a14:hiddenLine xmlns="" xmlns:a14="http://schemas.microsoft.com/office/drawing/2010/main" w="9525">
+                <a14:hiddenLine xmlns:a14="http://schemas.microsoft.com/office/drawing/2010/main" xmlns="" w="9525">
                   <a:solidFill>
                     <a:srgbClr val="000000"/>
                   </a:solidFill>
@@ -1703,7 +1703,7 @@
             </a:ln>
             <a:extLst>
               <a:ext uri="{91240B29-F687-4f45-9708-019B960494DF}">
-                <a14:hiddenLine xmlns="" xmlns:a14="http://schemas.microsoft.com/office/drawing/2010/main" w="9525">
+                <a14:hiddenLine xmlns:a14="http://schemas.microsoft.com/office/drawing/2010/main" xmlns="" w="9525">
                   <a:solidFill>
                     <a:srgbClr val="000000"/>
                   </a:solidFill>
@@ -1793,7 +1793,7 @@
             </a:ln>
             <a:extLst>
               <a:ext uri="{91240B29-F687-4f45-9708-019B960494DF}">
-                <a14:hiddenLine xmlns="" xmlns:a14="http://schemas.microsoft.com/office/drawing/2010/main" w="9525">
+                <a14:hiddenLine xmlns:a14="http://schemas.microsoft.com/office/drawing/2010/main" xmlns="" w="9525">
                   <a:solidFill>
                     <a:srgbClr val="000000"/>
                   </a:solidFill>
@@ -1855,7 +1855,7 @@
             </a:ln>
             <a:extLst>
               <a:ext uri="{91240B29-F687-4f45-9708-019B960494DF}">
-                <a14:hiddenLine xmlns="" xmlns:a14="http://schemas.microsoft.com/office/drawing/2010/main" w="9525">
+                <a14:hiddenLine xmlns:a14="http://schemas.microsoft.com/office/drawing/2010/main" xmlns="" w="9525">
                   <a:solidFill>
                     <a:srgbClr val="000000"/>
                   </a:solidFill>
@@ -1965,7 +1965,7 @@
             </a:ln>
             <a:extLst>
               <a:ext uri="{91240B29-F687-4f45-9708-019B960494DF}">
-                <a14:hiddenLine xmlns="" xmlns:a14="http://schemas.microsoft.com/office/drawing/2010/main" w="9525">
+                <a14:hiddenLine xmlns:a14="http://schemas.microsoft.com/office/drawing/2010/main" xmlns="" w="9525">
                   <a:solidFill>
                     <a:srgbClr val="000000"/>
                   </a:solidFill>
@@ -2027,7 +2027,7 @@
             </a:ln>
             <a:extLst>
               <a:ext uri="{91240B29-F687-4f45-9708-019B960494DF}">
-                <a14:hiddenLine xmlns="" xmlns:a14="http://schemas.microsoft.com/office/drawing/2010/main" w="9525">
+                <a14:hiddenLine xmlns:a14="http://schemas.microsoft.com/office/drawing/2010/main" xmlns="" w="9525">
                   <a:solidFill>
                     <a:srgbClr val="000000"/>
                   </a:solidFill>
@@ -2117,7 +2117,7 @@
             </a:ln>
             <a:extLst>
               <a:ext uri="{91240B29-F687-4f45-9708-019B960494DF}">
-                <a14:hiddenLine xmlns="" xmlns:a14="http://schemas.microsoft.com/office/drawing/2010/main" w="9525">
+                <a14:hiddenLine xmlns:a14="http://schemas.microsoft.com/office/drawing/2010/main" xmlns="" w="9525">
                   <a:solidFill>
                     <a:srgbClr val="000000"/>
                   </a:solidFill>
@@ -2207,7 +2207,7 @@
             </a:ln>
             <a:extLst>
               <a:ext uri="{91240B29-F687-4f45-9708-019B960494DF}">
-                <a14:hiddenLine xmlns="" xmlns:a14="http://schemas.microsoft.com/office/drawing/2010/main" w="9525">
+                <a14:hiddenLine xmlns:a14="http://schemas.microsoft.com/office/drawing/2010/main" xmlns="" w="9525">
                   <a:solidFill>
                     <a:srgbClr val="000000"/>
                   </a:solidFill>
@@ -2269,7 +2269,7 @@
             </a:ln>
             <a:extLst>
               <a:ext uri="{91240B29-F687-4f45-9708-019B960494DF}">
-                <a14:hiddenLine xmlns="" xmlns:a14="http://schemas.microsoft.com/office/drawing/2010/main" w="9525">
+                <a14:hiddenLine xmlns:a14="http://schemas.microsoft.com/office/drawing/2010/main" xmlns="" w="9525">
                   <a:solidFill>
                     <a:srgbClr val="000000"/>
                   </a:solidFill>
@@ -2359,7 +2359,7 @@
             </a:ln>
             <a:extLst>
               <a:ext uri="{91240B29-F687-4f45-9708-019B960494DF}">
-                <a14:hiddenLine xmlns="" xmlns:a14="http://schemas.microsoft.com/office/drawing/2010/main" w="9525">
+                <a14:hiddenLine xmlns:a14="http://schemas.microsoft.com/office/drawing/2010/main" xmlns="" w="9525">
                   <a:solidFill>
                     <a:srgbClr val="000000"/>
                   </a:solidFill>
@@ -2449,7 +2449,7 @@
             </a:ln>
             <a:extLst>
               <a:ext uri="{91240B29-F687-4f45-9708-019B960494DF}">
-                <a14:hiddenLine xmlns="" xmlns:a14="http://schemas.microsoft.com/office/drawing/2010/main" w="9525">
+                <a14:hiddenLine xmlns:a14="http://schemas.microsoft.com/office/drawing/2010/main" xmlns="" w="9525">
                   <a:solidFill>
                     <a:srgbClr val="000000"/>
                   </a:solidFill>
@@ -2505,7 +2505,7 @@
             </a:ln>
             <a:extLst>
               <a:ext uri="{91240B29-F687-4f45-9708-019B960494DF}">
-                <a14:hiddenLine xmlns="" xmlns:a14="http://schemas.microsoft.com/office/drawing/2010/main" w="9525">
+                <a14:hiddenLine xmlns:a14="http://schemas.microsoft.com/office/drawing/2010/main" xmlns="" w="9525">
                   <a:solidFill>
                     <a:srgbClr val="000000"/>
                   </a:solidFill>
@@ -2595,7 +2595,7 @@
             </a:ln>
             <a:extLst>
               <a:ext uri="{91240B29-F687-4f45-9708-019B960494DF}">
-                <a14:hiddenLine xmlns="" xmlns:a14="http://schemas.microsoft.com/office/drawing/2010/main" w="9525">
+                <a14:hiddenLine xmlns:a14="http://schemas.microsoft.com/office/drawing/2010/main" xmlns="" w="9525">
                   <a:solidFill>
                     <a:srgbClr val="000000"/>
                   </a:solidFill>
@@ -2651,7 +2651,7 @@
             </a:ln>
             <a:extLst>
               <a:ext uri="{91240B29-F687-4f45-9708-019B960494DF}">
-                <a14:hiddenLine xmlns="" xmlns:a14="http://schemas.microsoft.com/office/drawing/2010/main" w="9525">
+                <a14:hiddenLine xmlns:a14="http://schemas.microsoft.com/office/drawing/2010/main" xmlns="" w="9525">
                   <a:solidFill>
                     <a:srgbClr val="000000"/>
                   </a:solidFill>
@@ -2741,7 +2741,7 @@
             </a:ln>
             <a:extLst>
               <a:ext uri="{91240B29-F687-4f45-9708-019B960494DF}">
-                <a14:hiddenLine xmlns="" xmlns:a14="http://schemas.microsoft.com/office/drawing/2010/main" w="9525">
+                <a14:hiddenLine xmlns:a14="http://schemas.microsoft.com/office/drawing/2010/main" xmlns="" w="9525">
                   <a:solidFill>
                     <a:srgbClr val="000000"/>
                   </a:solidFill>
@@ -2809,7 +2809,7 @@
             </a:ln>
             <a:extLst>
               <a:ext uri="{91240B29-F687-4f45-9708-019B960494DF}">
-                <a14:hiddenLine xmlns="" xmlns:a14="http://schemas.microsoft.com/office/drawing/2010/main" w="9525">
+                <a14:hiddenLine xmlns:a14="http://schemas.microsoft.com/office/drawing/2010/main" xmlns="" w="9525">
                   <a:solidFill>
                     <a:srgbClr val="000000"/>
                   </a:solidFill>
@@ -2899,7 +2899,7 @@
             </a:ln>
             <a:extLst>
               <a:ext uri="{91240B29-F687-4f45-9708-019B960494DF}">
-                <a14:hiddenLine xmlns="" xmlns:a14="http://schemas.microsoft.com/office/drawing/2010/main" w="9525">
+                <a14:hiddenLine xmlns:a14="http://schemas.microsoft.com/office/drawing/2010/main" xmlns="" w="9525">
                   <a:solidFill>
                     <a:srgbClr val="000000"/>
                   </a:solidFill>
@@ -2967,7 +2967,7 @@
             </a:ln>
             <a:extLst>
               <a:ext uri="{91240B29-F687-4f45-9708-019B960494DF}">
-                <a14:hiddenLine xmlns="" xmlns:a14="http://schemas.microsoft.com/office/drawing/2010/main" w="9525">
+                <a14:hiddenLine xmlns:a14="http://schemas.microsoft.com/office/drawing/2010/main" xmlns="" w="9525">
                   <a:solidFill>
                     <a:srgbClr val="000000"/>
                   </a:solidFill>
@@ -3057,7 +3057,7 @@
             </a:ln>
             <a:extLst>
               <a:ext uri="{91240B29-F687-4f45-9708-019B960494DF}">
-                <a14:hiddenLine xmlns="" xmlns:a14="http://schemas.microsoft.com/office/drawing/2010/main" w="9525">
+                <a14:hiddenLine xmlns:a14="http://schemas.microsoft.com/office/drawing/2010/main" xmlns="" w="9525">
                   <a:solidFill>
                     <a:srgbClr val="000000"/>
                   </a:solidFill>
@@ -3091,7 +3091,7 @@
             </a:ln>
             <a:extLst>
               <a:ext uri="{91240B29-F687-4f45-9708-019B960494DF}">
-                <a14:hiddenLine xmlns="" xmlns:a14="http://schemas.microsoft.com/office/drawing/2010/main" w="9525">
+                <a14:hiddenLine xmlns:a14="http://schemas.microsoft.com/office/drawing/2010/main" xmlns="" w="9525">
                   <a:solidFill>
                     <a:srgbClr val="000000"/>
                   </a:solidFill>
@@ -3181,7 +3181,7 @@
             </a:ln>
             <a:extLst>
               <a:ext uri="{91240B29-F687-4f45-9708-019B960494DF}">
-                <a14:hiddenLine xmlns="" xmlns:a14="http://schemas.microsoft.com/office/drawing/2010/main" w="9525">
+                <a14:hiddenLine xmlns:a14="http://schemas.microsoft.com/office/drawing/2010/main" xmlns="" w="9525">
                   <a:solidFill>
                     <a:srgbClr val="000000"/>
                   </a:solidFill>
@@ -3243,7 +3243,7 @@
             </a:ln>
             <a:extLst>
               <a:ext uri="{91240B29-F687-4f45-9708-019B960494DF}">
-                <a14:hiddenLine xmlns="" xmlns:a14="http://schemas.microsoft.com/office/drawing/2010/main" w="9525">
+                <a14:hiddenLine xmlns:a14="http://schemas.microsoft.com/office/drawing/2010/main" xmlns="" w="9525">
                   <a:solidFill>
                     <a:srgbClr val="000000"/>
                   </a:solidFill>
@@ -3305,7 +3305,7 @@
             </a:ln>
             <a:extLst>
               <a:ext uri="{91240B29-F687-4f45-9708-019B960494DF}">
-                <a14:hiddenLine xmlns="" xmlns:a14="http://schemas.microsoft.com/office/drawing/2010/main" w="9525">
+                <a14:hiddenLine xmlns:a14="http://schemas.microsoft.com/office/drawing/2010/main" xmlns="" w="9525">
                   <a:solidFill>
                     <a:srgbClr val="000000"/>
                   </a:solidFill>
@@ -3395,7 +3395,7 @@
             </a:ln>
             <a:extLst>
               <a:ext uri="{91240B29-F687-4f45-9708-019B960494DF}">
-                <a14:hiddenLine xmlns="" xmlns:a14="http://schemas.microsoft.com/office/drawing/2010/main" w="9525">
+                <a14:hiddenLine xmlns:a14="http://schemas.microsoft.com/office/drawing/2010/main" xmlns="" w="9525">
                   <a:solidFill>
                     <a:srgbClr val="000000"/>
                   </a:solidFill>
@@ -3463,7 +3463,7 @@
             </a:ln>
             <a:extLst>
               <a:ext uri="{91240B29-F687-4f45-9708-019B960494DF}">
-                <a14:hiddenLine xmlns="" xmlns:a14="http://schemas.microsoft.com/office/drawing/2010/main" w="9525">
+                <a14:hiddenLine xmlns:a14="http://schemas.microsoft.com/office/drawing/2010/main" xmlns="" w="9525">
                   <a:solidFill>
                     <a:srgbClr val="000000"/>
                   </a:solidFill>
@@ -3525,7 +3525,7 @@
             </a:ln>
             <a:extLst>
               <a:ext uri="{91240B29-F687-4f45-9708-019B960494DF}">
-                <a14:hiddenLine xmlns="" xmlns:a14="http://schemas.microsoft.com/office/drawing/2010/main" w="9525">
+                <a14:hiddenLine xmlns:a14="http://schemas.microsoft.com/office/drawing/2010/main" xmlns="" w="9525">
                   <a:solidFill>
                     <a:srgbClr val="000000"/>
                   </a:solidFill>
@@ -3615,7 +3615,7 @@
             </a:ln>
             <a:extLst>
               <a:ext uri="{91240B29-F687-4f45-9708-019B960494DF}">
-                <a14:hiddenLine xmlns="" xmlns:a14="http://schemas.microsoft.com/office/drawing/2010/main" w="9525">
+                <a14:hiddenLine xmlns:a14="http://schemas.microsoft.com/office/drawing/2010/main" xmlns="" w="9525">
                   <a:solidFill>
                     <a:srgbClr val="000000"/>
                   </a:solidFill>
@@ -3677,7 +3677,7 @@
             </a:ln>
             <a:extLst>
               <a:ext uri="{91240B29-F687-4f45-9708-019B960494DF}">
-                <a14:hiddenLine xmlns="" xmlns:a14="http://schemas.microsoft.com/office/drawing/2010/main" w="9525">
+                <a14:hiddenLine xmlns:a14="http://schemas.microsoft.com/office/drawing/2010/main" xmlns="" w="9525">
                   <a:solidFill>
                     <a:srgbClr val="000000"/>
                   </a:solidFill>
@@ -3767,7 +3767,7 @@
             </a:ln>
             <a:extLst>
               <a:ext uri="{91240B29-F687-4f45-9708-019B960494DF}">
-                <a14:hiddenLine xmlns="" xmlns:a14="http://schemas.microsoft.com/office/drawing/2010/main" w="9525">
+                <a14:hiddenLine xmlns:a14="http://schemas.microsoft.com/office/drawing/2010/main" xmlns="" w="9525">
                   <a:solidFill>
                     <a:srgbClr val="000000"/>
                   </a:solidFill>
@@ -3829,7 +3829,7 @@
             </a:ln>
             <a:extLst>
               <a:ext uri="{91240B29-F687-4f45-9708-019B960494DF}">
-                <a14:hiddenLine xmlns="" xmlns:a14="http://schemas.microsoft.com/office/drawing/2010/main" w="9525">
+                <a14:hiddenLine xmlns:a14="http://schemas.microsoft.com/office/drawing/2010/main" xmlns="" w="9525">
                   <a:solidFill>
                     <a:srgbClr val="000000"/>
                   </a:solidFill>
@@ -3919,7 +3919,7 @@
             </a:ln>
             <a:extLst>
               <a:ext uri="{91240B29-F687-4f45-9708-019B960494DF}">
-                <a14:hiddenLine xmlns="" xmlns:a14="http://schemas.microsoft.com/office/drawing/2010/main" w="9525">
+                <a14:hiddenLine xmlns:a14="http://schemas.microsoft.com/office/drawing/2010/main" xmlns="" w="9525">
                   <a:solidFill>
                     <a:srgbClr val="000000"/>
                   </a:solidFill>
@@ -3953,7 +3953,7 @@
             </a:ln>
             <a:extLst>
               <a:ext uri="{91240B29-F687-4f45-9708-019B960494DF}">
-                <a14:hiddenLine xmlns="" xmlns:a14="http://schemas.microsoft.com/office/drawing/2010/main" w="9525">
+                <a14:hiddenLine xmlns:a14="http://schemas.microsoft.com/office/drawing/2010/main" xmlns="" w="9525">
                   <a:solidFill>
                     <a:srgbClr val="000000"/>
                   </a:solidFill>
@@ -4018,7 +4018,7 @@
             </a:ln>
             <a:extLst>
               <a:ext uri="{91240B29-F687-4f45-9708-019B960494DF}">
-                <a14:hiddenLine xmlns="" xmlns:a14="http://schemas.microsoft.com/office/drawing/2010/main" w="9525">
+                <a14:hiddenLine xmlns:a14="http://schemas.microsoft.com/office/drawing/2010/main" xmlns="" w="9525">
                   <a:solidFill>
                     <a:srgbClr val="000000"/>
                   </a:solidFill>
@@ -4108,7 +4108,7 @@
             </a:ln>
             <a:extLst>
               <a:ext uri="{91240B29-F687-4f45-9708-019B960494DF}">
-                <a14:hiddenLine xmlns="" xmlns:a14="http://schemas.microsoft.com/office/drawing/2010/main" w="9525">
+                <a14:hiddenLine xmlns:a14="http://schemas.microsoft.com/office/drawing/2010/main" xmlns="" w="9525">
                   <a:solidFill>
                     <a:srgbClr val="000000"/>
                   </a:solidFill>
@@ -4170,7 +4170,7 @@
             </a:ln>
             <a:extLst>
               <a:ext uri="{91240B29-F687-4f45-9708-019B960494DF}">
-                <a14:hiddenLine xmlns="" xmlns:a14="http://schemas.microsoft.com/office/drawing/2010/main" w="9525">
+                <a14:hiddenLine xmlns:a14="http://schemas.microsoft.com/office/drawing/2010/main" xmlns="" w="9525">
                   <a:solidFill>
                     <a:srgbClr val="000000"/>
                   </a:solidFill>
@@ -4260,7 +4260,7 @@
             </a:ln>
             <a:extLst>
               <a:ext uri="{91240B29-F687-4f45-9708-019B960494DF}">
-                <a14:hiddenLine xmlns="" xmlns:a14="http://schemas.microsoft.com/office/drawing/2010/main" w="9525">
+                <a14:hiddenLine xmlns:a14="http://schemas.microsoft.com/office/drawing/2010/main" xmlns="" w="9525">
                   <a:solidFill>
                     <a:srgbClr val="000000"/>
                   </a:solidFill>
@@ -4350,7 +4350,7 @@
             </a:ln>
             <a:extLst>
               <a:ext uri="{91240B29-F687-4f45-9708-019B960494DF}">
-                <a14:hiddenLine xmlns="" xmlns:a14="http://schemas.microsoft.com/office/drawing/2010/main" w="9525">
+                <a14:hiddenLine xmlns:a14="http://schemas.microsoft.com/office/drawing/2010/main" xmlns="" w="9525">
                   <a:solidFill>
                     <a:srgbClr val="000000"/>
                   </a:solidFill>
@@ -4415,7 +4415,7 @@
             </a:ln>
             <a:extLst>
               <a:ext uri="{91240B29-F687-4f45-9708-019B960494DF}">
-                <a14:hiddenLine xmlns="" xmlns:a14="http://schemas.microsoft.com/office/drawing/2010/main" w="9525">
+                <a14:hiddenLine xmlns:a14="http://schemas.microsoft.com/office/drawing/2010/main" xmlns="" w="9525">
                   <a:solidFill>
                     <a:srgbClr val="000000"/>
                   </a:solidFill>
@@ -4477,7 +4477,7 @@
             </a:ln>
             <a:extLst>
               <a:ext uri="{91240B29-F687-4f45-9708-019B960494DF}">
-                <a14:hiddenLine xmlns="" xmlns:a14="http://schemas.microsoft.com/office/drawing/2010/main" w="9525">
+                <a14:hiddenLine xmlns:a14="http://schemas.microsoft.com/office/drawing/2010/main" xmlns="" w="9525">
                   <a:solidFill>
                     <a:srgbClr val="000000"/>
                   </a:solidFill>
@@ -4567,7 +4567,7 @@
             </a:ln>
             <a:extLst>
               <a:ext uri="{91240B29-F687-4f45-9708-019B960494DF}">
-                <a14:hiddenLine xmlns="" xmlns:a14="http://schemas.microsoft.com/office/drawing/2010/main" w="9525">
+                <a14:hiddenLine xmlns:a14="http://schemas.microsoft.com/office/drawing/2010/main" xmlns="" w="9525">
                   <a:solidFill>
                     <a:srgbClr val="000000"/>
                   </a:solidFill>
@@ -4657,7 +4657,7 @@
             </a:ln>
             <a:extLst>
               <a:ext uri="{91240B29-F687-4f45-9708-019B960494DF}">
-                <a14:hiddenLine xmlns="" xmlns:a14="http://schemas.microsoft.com/office/drawing/2010/main" w="9525">
+                <a14:hiddenLine xmlns:a14="http://schemas.microsoft.com/office/drawing/2010/main" xmlns="" w="9525">
                   <a:solidFill>
                     <a:srgbClr val="000000"/>
                   </a:solidFill>
@@ -4719,7 +4719,7 @@
             </a:ln>
             <a:extLst>
               <a:ext uri="{91240B29-F687-4f45-9708-019B960494DF}">
-                <a14:hiddenLine xmlns="" xmlns:a14="http://schemas.microsoft.com/office/drawing/2010/main" w="9525">
+                <a14:hiddenLine xmlns:a14="http://schemas.microsoft.com/office/drawing/2010/main" xmlns="" w="9525">
                   <a:solidFill>
                     <a:srgbClr val="000000"/>
                   </a:solidFill>
@@ -4839,7 +4839,7 @@
             </a:ln>
             <a:extLst>
               <a:ext uri="{91240B29-F687-4f45-9708-019B960494DF}">
-                <a14:hiddenLine xmlns="" xmlns:a14="http://schemas.microsoft.com/office/drawing/2010/main" w="9525">
+                <a14:hiddenLine xmlns:a14="http://schemas.microsoft.com/office/drawing/2010/main" xmlns="" w="9525">
                   <a:solidFill>
                     <a:srgbClr val="000000"/>
                   </a:solidFill>
@@ -4907,7 +4907,7 @@
             </a:ln>
             <a:extLst>
               <a:ext uri="{91240B29-F687-4f45-9708-019B960494DF}">
-                <a14:hiddenLine xmlns="" xmlns:a14="http://schemas.microsoft.com/office/drawing/2010/main" w="9525">
+                <a14:hiddenLine xmlns:a14="http://schemas.microsoft.com/office/drawing/2010/main" xmlns="" w="9525">
                   <a:solidFill>
                     <a:srgbClr val="000000"/>
                   </a:solidFill>
@@ -4997,7 +4997,7 @@
             </a:ln>
             <a:extLst>
               <a:ext uri="{91240B29-F687-4f45-9708-019B960494DF}">
-                <a14:hiddenLine xmlns="" xmlns:a14="http://schemas.microsoft.com/office/drawing/2010/main" w="9525">
+                <a14:hiddenLine xmlns:a14="http://schemas.microsoft.com/office/drawing/2010/main" xmlns="" w="9525">
                   <a:solidFill>
                     <a:srgbClr val="000000"/>
                   </a:solidFill>
@@ -5137,7 +5137,7 @@
           <a:p>
             <a:fld id="{041B6913-160D-42A0-B0F5-1CC4E0223D66}" type="datetimeFigureOut">
               <a:rPr lang="en-GB" smtClean="0"/>
-              <a:t>07/04/2018</a:t>
+              <a:t>10/04/2018</a:t>
             </a:fld>
             <a:endParaRPr lang="en-GB"/>
           </a:p>
@@ -5416,7 +5416,7 @@
           <a:p>
             <a:fld id="{041B6913-160D-42A0-B0F5-1CC4E0223D66}" type="datetimeFigureOut">
               <a:rPr lang="en-GB" smtClean="0"/>
-              <a:t>07/04/2018</a:t>
+              <a:t>10/04/2018</a:t>
             </a:fld>
             <a:endParaRPr lang="en-GB"/>
           </a:p>
@@ -5624,7 +5624,7 @@
           <a:p>
             <a:fld id="{041B6913-160D-42A0-B0F5-1CC4E0223D66}" type="datetimeFigureOut">
               <a:rPr lang="en-GB" smtClean="0"/>
-              <a:t>07/04/2018</a:t>
+              <a:t>10/04/2018</a:t>
             </a:fld>
             <a:endParaRPr lang="en-GB"/>
           </a:p>
@@ -5899,7 +5899,7 @@
           <a:p>
             <a:fld id="{041B6913-160D-42A0-B0F5-1CC4E0223D66}" type="datetimeFigureOut">
               <a:rPr lang="en-GB" smtClean="0"/>
-              <a:t>07/04/2018</a:t>
+              <a:t>10/04/2018</a:t>
             </a:fld>
             <a:endParaRPr lang="en-GB"/>
           </a:p>
@@ -6345,7 +6345,7 @@
           <a:p>
             <a:fld id="{041B6913-160D-42A0-B0F5-1CC4E0223D66}" type="datetimeFigureOut">
               <a:rPr lang="en-GB" smtClean="0"/>
-              <a:t>07/04/2018</a:t>
+              <a:t>10/04/2018</a:t>
             </a:fld>
             <a:endParaRPr lang="en-GB"/>
           </a:p>
@@ -6903,7 +6903,7 @@
           <a:p>
             <a:fld id="{041B6913-160D-42A0-B0F5-1CC4E0223D66}" type="datetimeFigureOut">
               <a:rPr lang="en-GB" smtClean="0"/>
-              <a:t>07/04/2018</a:t>
+              <a:t>10/04/2018</a:t>
             </a:fld>
             <a:endParaRPr lang="en-GB"/>
           </a:p>
@@ -7635,7 +7635,7 @@
           <a:p>
             <a:fld id="{041B6913-160D-42A0-B0F5-1CC4E0223D66}" type="datetimeFigureOut">
               <a:rPr lang="en-GB" smtClean="0"/>
-              <a:t>07/04/2018</a:t>
+              <a:t>10/04/2018</a:t>
             </a:fld>
             <a:endParaRPr lang="en-GB"/>
           </a:p>
@@ -7817,7 +7817,7 @@
           <a:p>
             <a:fld id="{041B6913-160D-42A0-B0F5-1CC4E0223D66}" type="datetimeFigureOut">
               <a:rPr lang="en-GB" smtClean="0"/>
-              <a:t>07/04/2018</a:t>
+              <a:t>10/04/2018</a:t>
             </a:fld>
             <a:endParaRPr lang="en-GB"/>
           </a:p>
@@ -8009,7 +8009,7 @@
           <a:p>
             <a:fld id="{041B6913-160D-42A0-B0F5-1CC4E0223D66}" type="datetimeFigureOut">
               <a:rPr lang="en-GB" smtClean="0"/>
-              <a:t>07/04/2018</a:t>
+              <a:t>10/04/2018</a:t>
             </a:fld>
             <a:endParaRPr lang="en-GB"/>
           </a:p>
@@ -8191,7 +8191,7 @@
           <a:p>
             <a:fld id="{041B6913-160D-42A0-B0F5-1CC4E0223D66}" type="datetimeFigureOut">
               <a:rPr lang="en-GB" smtClean="0"/>
-              <a:t>07/04/2018</a:t>
+              <a:t>10/04/2018</a:t>
             </a:fld>
             <a:endParaRPr lang="en-GB"/>
           </a:p>
@@ -8453,7 +8453,7 @@
           <a:p>
             <a:fld id="{041B6913-160D-42A0-B0F5-1CC4E0223D66}" type="datetimeFigureOut">
               <a:rPr lang="en-GB" smtClean="0"/>
-              <a:t>07/04/2018</a:t>
+              <a:t>10/04/2018</a:t>
             </a:fld>
             <a:endParaRPr lang="en-GB"/>
           </a:p>
@@ -8697,7 +8697,7 @@
           <a:p>
             <a:fld id="{041B6913-160D-42A0-B0F5-1CC4E0223D66}" type="datetimeFigureOut">
               <a:rPr lang="en-GB" smtClean="0"/>
-              <a:t>07/04/2018</a:t>
+              <a:t>10/04/2018</a:t>
             </a:fld>
             <a:endParaRPr lang="en-GB"/>
           </a:p>
@@ -9090,7 +9090,7 @@
           <a:p>
             <a:fld id="{041B6913-160D-42A0-B0F5-1CC4E0223D66}" type="datetimeFigureOut">
               <a:rPr lang="en-GB" smtClean="0"/>
-              <a:t>07/04/2018</a:t>
+              <a:t>10/04/2018</a:t>
             </a:fld>
             <a:endParaRPr lang="en-GB"/>
           </a:p>
@@ -9220,7 +9220,7 @@
           <a:p>
             <a:fld id="{041B6913-160D-42A0-B0F5-1CC4E0223D66}" type="datetimeFigureOut">
               <a:rPr lang="en-GB" smtClean="0"/>
-              <a:t>07/04/2018</a:t>
+              <a:t>10/04/2018</a:t>
             </a:fld>
             <a:endParaRPr lang="en-GB"/>
           </a:p>
@@ -9327,7 +9327,7 @@
           <a:p>
             <a:fld id="{041B6913-160D-42A0-B0F5-1CC4E0223D66}" type="datetimeFigureOut">
               <a:rPr lang="en-GB" smtClean="0"/>
-              <a:t>07/04/2018</a:t>
+              <a:t>10/04/2018</a:t>
             </a:fld>
             <a:endParaRPr lang="en-GB"/>
           </a:p>
@@ -9588,7 +9588,7 @@
           <a:p>
             <a:fld id="{041B6913-160D-42A0-B0F5-1CC4E0223D66}" type="datetimeFigureOut">
               <a:rPr lang="en-GB" smtClean="0"/>
-              <a:t>07/04/2018</a:t>
+              <a:t>10/04/2018</a:t>
             </a:fld>
             <a:endParaRPr lang="en-GB"/>
           </a:p>
@@ -9880,7 +9880,7 @@
           <a:p>
             <a:fld id="{041B6913-160D-42A0-B0F5-1CC4E0223D66}" type="datetimeFigureOut">
               <a:rPr lang="en-GB" smtClean="0"/>
-              <a:t>07/04/2018</a:t>
+              <a:t>10/04/2018</a:t>
             </a:fld>
             <a:endParaRPr lang="en-GB"/>
           </a:p>
@@ -10015,7 +10015,7 @@
           <a:noFill/>
           <a:extLst>
             <a:ext uri="{909E8E84-426E-40dd-AFC4-6F175D3DCCD1}">
-              <a14:hiddenFill xmlns="" xmlns:a14="http://schemas.microsoft.com/office/drawing/2010/main">
+              <a14:hiddenFill xmlns:a14="http://schemas.microsoft.com/office/drawing/2010/main" xmlns="">
                 <a:solidFill>
                   <a:srgbClr val="FFFFFF"/>
                 </a:solidFill>
@@ -10089,7 +10089,7 @@
               </a:ln>
               <a:extLst>
                 <a:ext uri="{91240B29-F687-4f45-9708-019B960494DF}">
-                  <a14:hiddenLine xmlns="" xmlns:a14="http://schemas.microsoft.com/office/drawing/2010/main" w="9525">
+                  <a14:hiddenLine xmlns:a14="http://schemas.microsoft.com/office/drawing/2010/main" xmlns="" w="9525">
                     <a:solidFill>
                       <a:srgbClr val="000000"/>
                     </a:solidFill>
@@ -10179,7 +10179,7 @@
               </a:ln>
               <a:extLst>
                 <a:ext uri="{91240B29-F687-4f45-9708-019B960494DF}">
-                  <a14:hiddenLine xmlns="" xmlns:a14="http://schemas.microsoft.com/office/drawing/2010/main" w="9525">
+                  <a14:hiddenLine xmlns:a14="http://schemas.microsoft.com/office/drawing/2010/main" xmlns="" w="9525">
                     <a:solidFill>
                       <a:srgbClr val="000000"/>
                     </a:solidFill>
@@ -10269,7 +10269,7 @@
               </a:ln>
               <a:extLst>
                 <a:ext uri="{91240B29-F687-4f45-9708-019B960494DF}">
-                  <a14:hiddenLine xmlns="" xmlns:a14="http://schemas.microsoft.com/office/drawing/2010/main" w="9525">
+                  <a14:hiddenLine xmlns:a14="http://schemas.microsoft.com/office/drawing/2010/main" xmlns="" w="9525">
                     <a:solidFill>
                       <a:srgbClr val="000000"/>
                     </a:solidFill>
@@ -10331,7 +10331,7 @@
               </a:ln>
               <a:extLst>
                 <a:ext uri="{91240B29-F687-4f45-9708-019B960494DF}">
-                  <a14:hiddenLine xmlns="" xmlns:a14="http://schemas.microsoft.com/office/drawing/2010/main" w="9525">
+                  <a14:hiddenLine xmlns:a14="http://schemas.microsoft.com/office/drawing/2010/main" xmlns="" w="9525">
                     <a:solidFill>
                       <a:srgbClr val="000000"/>
                     </a:solidFill>
@@ -10421,7 +10421,7 @@
               </a:ln>
               <a:extLst>
                 <a:ext uri="{91240B29-F687-4f45-9708-019B960494DF}">
-                  <a14:hiddenLine xmlns="" xmlns:a14="http://schemas.microsoft.com/office/drawing/2010/main" w="9525">
+                  <a14:hiddenLine xmlns:a14="http://schemas.microsoft.com/office/drawing/2010/main" xmlns="" w="9525">
                     <a:solidFill>
                       <a:srgbClr val="000000"/>
                     </a:solidFill>
@@ -10483,7 +10483,7 @@
               </a:ln>
               <a:extLst>
                 <a:ext uri="{91240B29-F687-4f45-9708-019B960494DF}">
-                  <a14:hiddenLine xmlns="" xmlns:a14="http://schemas.microsoft.com/office/drawing/2010/main" w="9525">
+                  <a14:hiddenLine xmlns:a14="http://schemas.microsoft.com/office/drawing/2010/main" xmlns="" w="9525">
                     <a:solidFill>
                       <a:srgbClr val="000000"/>
                     </a:solidFill>
@@ -10545,7 +10545,7 @@
               </a:ln>
               <a:extLst>
                 <a:ext uri="{91240B29-F687-4f45-9708-019B960494DF}">
-                  <a14:hiddenLine xmlns="" xmlns:a14="http://schemas.microsoft.com/office/drawing/2010/main" w="9525">
+                  <a14:hiddenLine xmlns:a14="http://schemas.microsoft.com/office/drawing/2010/main" xmlns="" w="9525">
                     <a:solidFill>
                       <a:srgbClr val="000000"/>
                     </a:solidFill>
@@ -10635,7 +10635,7 @@
               </a:ln>
               <a:extLst>
                 <a:ext uri="{91240B29-F687-4f45-9708-019B960494DF}">
-                  <a14:hiddenLine xmlns="" xmlns:a14="http://schemas.microsoft.com/office/drawing/2010/main" w="9525">
+                  <a14:hiddenLine xmlns:a14="http://schemas.microsoft.com/office/drawing/2010/main" xmlns="" w="9525">
                     <a:solidFill>
                       <a:srgbClr val="000000"/>
                     </a:solidFill>
@@ -10725,7 +10725,7 @@
               </a:ln>
               <a:extLst>
                 <a:ext uri="{91240B29-F687-4f45-9708-019B960494DF}">
-                  <a14:hiddenLine xmlns="" xmlns:a14="http://schemas.microsoft.com/office/drawing/2010/main" w="9525">
+                  <a14:hiddenLine xmlns:a14="http://schemas.microsoft.com/office/drawing/2010/main" xmlns="" w="9525">
                     <a:solidFill>
                       <a:srgbClr val="000000"/>
                     </a:solidFill>
@@ -10787,7 +10787,7 @@
               </a:ln>
               <a:extLst>
                 <a:ext uri="{91240B29-F687-4f45-9708-019B960494DF}">
-                  <a14:hiddenLine xmlns="" xmlns:a14="http://schemas.microsoft.com/office/drawing/2010/main" w="9525">
+                  <a14:hiddenLine xmlns:a14="http://schemas.microsoft.com/office/drawing/2010/main" xmlns="" w="9525">
                     <a:solidFill>
                       <a:srgbClr val="000000"/>
                     </a:solidFill>
@@ -10897,7 +10897,7 @@
               </a:ln>
               <a:extLst>
                 <a:ext uri="{91240B29-F687-4f45-9708-019B960494DF}">
-                  <a14:hiddenLine xmlns="" xmlns:a14="http://schemas.microsoft.com/office/drawing/2010/main" w="9525">
+                  <a14:hiddenLine xmlns:a14="http://schemas.microsoft.com/office/drawing/2010/main" xmlns="" w="9525">
                     <a:solidFill>
                       <a:srgbClr val="000000"/>
                     </a:solidFill>
@@ -10981,7 +10981,7 @@
               </a:ln>
               <a:extLst>
                 <a:ext uri="{91240B29-F687-4f45-9708-019B960494DF}">
-                  <a14:hiddenLine xmlns="" xmlns:a14="http://schemas.microsoft.com/office/drawing/2010/main" w="9525">
+                  <a14:hiddenLine xmlns:a14="http://schemas.microsoft.com/office/drawing/2010/main" xmlns="" w="9525">
                     <a:solidFill>
                       <a:srgbClr val="000000"/>
                     </a:solidFill>
@@ -11043,7 +11043,7 @@
               </a:ln>
               <a:extLst>
                 <a:ext uri="{91240B29-F687-4f45-9708-019B960494DF}">
-                  <a14:hiddenLine xmlns="" xmlns:a14="http://schemas.microsoft.com/office/drawing/2010/main" w="9525">
+                  <a14:hiddenLine xmlns:a14="http://schemas.microsoft.com/office/drawing/2010/main" xmlns="" w="9525">
                     <a:solidFill>
                       <a:srgbClr val="000000"/>
                     </a:solidFill>
@@ -11105,7 +11105,7 @@
               </a:ln>
               <a:extLst>
                 <a:ext uri="{91240B29-F687-4f45-9708-019B960494DF}">
-                  <a14:hiddenLine xmlns="" xmlns:a14="http://schemas.microsoft.com/office/drawing/2010/main" w="9525">
+                  <a14:hiddenLine xmlns:a14="http://schemas.microsoft.com/office/drawing/2010/main" xmlns="" w="9525">
                     <a:solidFill>
                       <a:srgbClr val="000000"/>
                     </a:solidFill>
@@ -11195,7 +11195,7 @@
               </a:ln>
               <a:extLst>
                 <a:ext uri="{91240B29-F687-4f45-9708-019B960494DF}">
-                  <a14:hiddenLine xmlns="" xmlns:a14="http://schemas.microsoft.com/office/drawing/2010/main" w="9525">
+                  <a14:hiddenLine xmlns:a14="http://schemas.microsoft.com/office/drawing/2010/main" xmlns="" w="9525">
                     <a:solidFill>
                       <a:srgbClr val="000000"/>
                     </a:solidFill>
@@ -11229,7 +11229,7 @@
               </a:ln>
               <a:extLst>
                 <a:ext uri="{91240B29-F687-4f45-9708-019B960494DF}">
-                  <a14:hiddenLine xmlns="" xmlns:a14="http://schemas.microsoft.com/office/drawing/2010/main" w="9525">
+                  <a14:hiddenLine xmlns:a14="http://schemas.microsoft.com/office/drawing/2010/main" xmlns="" w="9525">
                     <a:solidFill>
                       <a:srgbClr val="000000"/>
                     </a:solidFill>
@@ -11294,7 +11294,7 @@
               </a:ln>
               <a:extLst>
                 <a:ext uri="{91240B29-F687-4f45-9708-019B960494DF}">
-                  <a14:hiddenLine xmlns="" xmlns:a14="http://schemas.microsoft.com/office/drawing/2010/main" w="9525">
+                  <a14:hiddenLine xmlns:a14="http://schemas.microsoft.com/office/drawing/2010/main" xmlns="" w="9525">
                     <a:solidFill>
                       <a:srgbClr val="000000"/>
                     </a:solidFill>
@@ -11384,7 +11384,7 @@
               </a:ln>
               <a:extLst>
                 <a:ext uri="{91240B29-F687-4f45-9708-019B960494DF}">
-                  <a14:hiddenLine xmlns="" xmlns:a14="http://schemas.microsoft.com/office/drawing/2010/main" w="9525">
+                  <a14:hiddenLine xmlns:a14="http://schemas.microsoft.com/office/drawing/2010/main" xmlns="" w="9525">
                     <a:solidFill>
                       <a:srgbClr val="000000"/>
                     </a:solidFill>
@@ -11446,7 +11446,7 @@
               </a:ln>
               <a:extLst>
                 <a:ext uri="{91240B29-F687-4f45-9708-019B960494DF}">
-                  <a14:hiddenLine xmlns="" xmlns:a14="http://schemas.microsoft.com/office/drawing/2010/main" w="9525">
+                  <a14:hiddenLine xmlns:a14="http://schemas.microsoft.com/office/drawing/2010/main" xmlns="" w="9525">
                     <a:solidFill>
                       <a:srgbClr val="000000"/>
                     </a:solidFill>
@@ -11536,7 +11536,7 @@
               </a:ln>
               <a:extLst>
                 <a:ext uri="{91240B29-F687-4f45-9708-019B960494DF}">
-                  <a14:hiddenLine xmlns="" xmlns:a14="http://schemas.microsoft.com/office/drawing/2010/main" w="9525">
+                  <a14:hiddenLine xmlns:a14="http://schemas.microsoft.com/office/drawing/2010/main" xmlns="" w="9525">
                     <a:solidFill>
                       <a:srgbClr val="000000"/>
                     </a:solidFill>
@@ -11601,7 +11601,7 @@
               </a:ln>
               <a:extLst>
                 <a:ext uri="{91240B29-F687-4f45-9708-019B960494DF}">
-                  <a14:hiddenLine xmlns="" xmlns:a14="http://schemas.microsoft.com/office/drawing/2010/main" w="9525">
+                  <a14:hiddenLine xmlns:a14="http://schemas.microsoft.com/office/drawing/2010/main" xmlns="" w="9525">
                     <a:solidFill>
                       <a:srgbClr val="000000"/>
                     </a:solidFill>
@@ -11663,7 +11663,7 @@
               </a:ln>
               <a:extLst>
                 <a:ext uri="{91240B29-F687-4f45-9708-019B960494DF}">
-                  <a14:hiddenLine xmlns="" xmlns:a14="http://schemas.microsoft.com/office/drawing/2010/main" w="9525">
+                  <a14:hiddenLine xmlns:a14="http://schemas.microsoft.com/office/drawing/2010/main" xmlns="" w="9525">
                     <a:solidFill>
                       <a:srgbClr val="000000"/>
                     </a:solidFill>
@@ -11753,7 +11753,7 @@
               </a:ln>
               <a:extLst>
                 <a:ext uri="{91240B29-F687-4f45-9708-019B960494DF}">
-                  <a14:hiddenLine xmlns="" xmlns:a14="http://schemas.microsoft.com/office/drawing/2010/main" w="9525">
+                  <a14:hiddenLine xmlns:a14="http://schemas.microsoft.com/office/drawing/2010/main" xmlns="" w="9525">
                     <a:solidFill>
                       <a:srgbClr val="000000"/>
                     </a:solidFill>
@@ -11843,7 +11843,7 @@
               </a:ln>
               <a:extLst>
                 <a:ext uri="{91240B29-F687-4f45-9708-019B960494DF}">
-                  <a14:hiddenLine xmlns="" xmlns:a14="http://schemas.microsoft.com/office/drawing/2010/main" w="9525">
+                  <a14:hiddenLine xmlns:a14="http://schemas.microsoft.com/office/drawing/2010/main" xmlns="" w="9525">
                     <a:solidFill>
                       <a:srgbClr val="000000"/>
                     </a:solidFill>
@@ -11908,7 +11908,7 @@
               </a:ln>
               <a:extLst>
                 <a:ext uri="{91240B29-F687-4f45-9708-019B960494DF}">
-                  <a14:hiddenLine xmlns="" xmlns:a14="http://schemas.microsoft.com/office/drawing/2010/main" w="9525">
+                  <a14:hiddenLine xmlns:a14="http://schemas.microsoft.com/office/drawing/2010/main" xmlns="" w="9525">
                     <a:solidFill>
                       <a:srgbClr val="000000"/>
                     </a:solidFill>
@@ -12028,7 +12028,7 @@
               </a:ln>
               <a:extLst>
                 <a:ext uri="{91240B29-F687-4f45-9708-019B960494DF}">
-                  <a14:hiddenLine xmlns="" xmlns:a14="http://schemas.microsoft.com/office/drawing/2010/main" w="9525">
+                  <a14:hiddenLine xmlns:a14="http://schemas.microsoft.com/office/drawing/2010/main" xmlns="" w="9525">
                     <a:solidFill>
                       <a:srgbClr val="000000"/>
                     </a:solidFill>
@@ -12109,7 +12109,7 @@
               </a:ln>
               <a:extLst>
                 <a:ext uri="{91240B29-F687-4f45-9708-019B960494DF}">
-                  <a14:hiddenLine xmlns="" xmlns:a14="http://schemas.microsoft.com/office/drawing/2010/main" w="9525">
+                  <a14:hiddenLine xmlns:a14="http://schemas.microsoft.com/office/drawing/2010/main" xmlns="" w="9525">
                     <a:solidFill>
                       <a:srgbClr val="000000"/>
                     </a:solidFill>
@@ -12224,7 +12224,7 @@
               </a:ln>
               <a:extLst>
                 <a:ext uri="{91240B29-F687-4f45-9708-019B960494DF}">
-                  <a14:hiddenLine xmlns="" xmlns:a14="http://schemas.microsoft.com/office/drawing/2010/main" w="9525">
+                  <a14:hiddenLine xmlns:a14="http://schemas.microsoft.com/office/drawing/2010/main" xmlns="" w="9525">
                     <a:solidFill>
                       <a:srgbClr val="000000"/>
                     </a:solidFill>
@@ -12314,7 +12314,7 @@
               </a:ln>
               <a:extLst>
                 <a:ext uri="{91240B29-F687-4f45-9708-019B960494DF}">
-                  <a14:hiddenLine xmlns="" xmlns:a14="http://schemas.microsoft.com/office/drawing/2010/main" w="9525">
+                  <a14:hiddenLine xmlns:a14="http://schemas.microsoft.com/office/drawing/2010/main" xmlns="" w="9525">
                     <a:solidFill>
                       <a:srgbClr val="000000"/>
                     </a:solidFill>
@@ -12379,7 +12379,7 @@
               </a:ln>
               <a:extLst>
                 <a:ext uri="{91240B29-F687-4f45-9708-019B960494DF}">
-                  <a14:hiddenLine xmlns="" xmlns:a14="http://schemas.microsoft.com/office/drawing/2010/main" w="9525">
+                  <a14:hiddenLine xmlns:a14="http://schemas.microsoft.com/office/drawing/2010/main" xmlns="" w="9525">
                     <a:solidFill>
                       <a:srgbClr val="000000"/>
                     </a:solidFill>
@@ -12469,7 +12469,7 @@
               </a:ln>
               <a:extLst>
                 <a:ext uri="{91240B29-F687-4f45-9708-019B960494DF}">
-                  <a14:hiddenLine xmlns="" xmlns:a14="http://schemas.microsoft.com/office/drawing/2010/main" w="9525">
+                  <a14:hiddenLine xmlns:a14="http://schemas.microsoft.com/office/drawing/2010/main" xmlns="" w="9525">
                     <a:solidFill>
                       <a:srgbClr val="000000"/>
                     </a:solidFill>
@@ -12537,7 +12537,7 @@
               </a:ln>
               <a:extLst>
                 <a:ext uri="{91240B29-F687-4f45-9708-019B960494DF}">
-                  <a14:hiddenLine xmlns="" xmlns:a14="http://schemas.microsoft.com/office/drawing/2010/main" w="9525">
+                  <a14:hiddenLine xmlns:a14="http://schemas.microsoft.com/office/drawing/2010/main" xmlns="" w="9525">
                     <a:solidFill>
                       <a:srgbClr val="000000"/>
                     </a:solidFill>
@@ -12627,7 +12627,7 @@
               </a:ln>
               <a:extLst>
                 <a:ext uri="{91240B29-F687-4f45-9708-019B960494DF}">
-                  <a14:hiddenLine xmlns="" xmlns:a14="http://schemas.microsoft.com/office/drawing/2010/main" w="9525">
+                  <a14:hiddenLine xmlns:a14="http://schemas.microsoft.com/office/drawing/2010/main" xmlns="" w="9525">
                     <a:solidFill>
                       <a:srgbClr val="000000"/>
                     </a:solidFill>
@@ -12695,7 +12695,7 @@
               </a:ln>
               <a:extLst>
                 <a:ext uri="{91240B29-F687-4f45-9708-019B960494DF}">
-                  <a14:hiddenLine xmlns="" xmlns:a14="http://schemas.microsoft.com/office/drawing/2010/main" w="9525">
+                  <a14:hiddenLine xmlns:a14="http://schemas.microsoft.com/office/drawing/2010/main" xmlns="" w="9525">
                     <a:solidFill>
                       <a:srgbClr val="000000"/>
                     </a:solidFill>
@@ -12785,7 +12785,7 @@
               </a:ln>
               <a:extLst>
                 <a:ext uri="{91240B29-F687-4f45-9708-019B960494DF}">
-                  <a14:hiddenLine xmlns="" xmlns:a14="http://schemas.microsoft.com/office/drawing/2010/main" w="9525">
+                  <a14:hiddenLine xmlns:a14="http://schemas.microsoft.com/office/drawing/2010/main" xmlns="" w="9525">
                     <a:solidFill>
                       <a:srgbClr val="000000"/>
                     </a:solidFill>
@@ -12819,7 +12819,7 @@
               </a:ln>
               <a:extLst>
                 <a:ext uri="{91240B29-F687-4f45-9708-019B960494DF}">
-                  <a14:hiddenLine xmlns="" xmlns:a14="http://schemas.microsoft.com/office/drawing/2010/main" w="9525">
+                  <a14:hiddenLine xmlns:a14="http://schemas.microsoft.com/office/drawing/2010/main" xmlns="" w="9525">
                     <a:solidFill>
                       <a:srgbClr val="000000"/>
                     </a:solidFill>
@@ -12959,7 +12959,7 @@
           <a:p>
             <a:fld id="{041B6913-160D-42A0-B0F5-1CC4E0223D66}" type="datetimeFigureOut">
               <a:rPr lang="en-GB" smtClean="0"/>
-              <a:t>07/04/2018</a:t>
+              <a:t>10/04/2018</a:t>
             </a:fld>
             <a:endParaRPr lang="en-GB"/>
           </a:p>
@@ -13540,31 +13540,45 @@
           </a:xfrm>
         </p:spPr>
         <p:txBody>
-          <a:bodyPr/>
+          <a:bodyPr>
+            <a:normAutofit lnSpcReduction="10000"/>
+          </a:bodyPr>
           <a:lstStyle/>
           <a:p>
+            <a:r>
+              <a:rPr lang="en-GB" dirty="0" smtClean="0"/>
+              <a:t>A </a:t>
+            </a:r>
             <a:r>
               <a:rPr lang="en-GB" dirty="0"/>
-              <a:t>Expanded Use Case is a detailed description of the processes used to complete various system functions.</a:t>
+              <a:t>detailed description of the processes used to complete various system functions.</a:t>
             </a:r>
           </a:p>
           <a:p>
+            <a:endParaRPr lang="en-GB" dirty="0" smtClean="0"/>
+          </a:p>
+          <a:p>
             <a:endParaRPr lang="en-GB" dirty="0"/>
           </a:p>
           <a:p>
             <a:r>
-              <a:rPr lang="en-GB" dirty="0"/>
-              <a:t>We’ll be covering on how expanded use cases were used to identify requirements and organise the management of the software development exercise.</a:t>
+              <a:rPr lang="en-GB" dirty="0" smtClean="0"/>
+              <a:t>Talking about how they were used.</a:t>
             </a:r>
-          </a:p>
-          <a:p>
             <a:endParaRPr lang="en-GB" dirty="0"/>
           </a:p>
           <a:p>
+            <a:endParaRPr lang="en-GB" dirty="0" smtClean="0"/>
+          </a:p>
+          <a:p>
+            <a:endParaRPr lang="en-GB" dirty="0"/>
+          </a:p>
+          <a:p>
             <a:r>
-              <a:rPr lang="en-GB" dirty="0"/>
-              <a:t>We’ll also be covering on how it provided more knowledge than that of an existing use case diagram.</a:t>
+              <a:rPr lang="en-GB" dirty="0" smtClean="0"/>
+              <a:t>Covering on how it provided more knowledge than an existing use case diagram.</a:t>
             </a:r>
+            <a:endParaRPr lang="en-GB" dirty="0"/>
           </a:p>
         </p:txBody>
       </p:sp>
@@ -13731,7 +13745,7 @@
                                         <p:tgtEl>
                                           <p:spTgt spid="3">
                                             <p:txEl>
-                                              <p:pRg st="2" end="2"/>
+                                              <p:pRg st="3" end="3"/>
                                             </p:txEl>
                                           </p:spTgt>
                                         </p:tgtEl>
@@ -13749,7 +13763,7 @@
                                         <p:tgtEl>
                                           <p:spTgt spid="3">
                                             <p:txEl>
-                                              <p:pRg st="2" end="2"/>
+                                              <p:pRg st="3" end="3"/>
                                             </p:txEl>
                                           </p:spTgt>
                                         </p:tgtEl>
@@ -13792,7 +13806,7 @@
                                         <p:tgtEl>
                                           <p:spTgt spid="3">
                                             <p:txEl>
-                                              <p:pRg st="4" end="4"/>
+                                              <p:pRg st="6" end="6"/>
                                             </p:txEl>
                                           </p:spTgt>
                                         </p:tgtEl>
@@ -13810,7 +13824,7 @@
                                         <p:tgtEl>
                                           <p:spTgt spid="3">
                                             <p:txEl>
-                                              <p:pRg st="4" end="4"/>
+                                              <p:pRg st="6" end="6"/>
                                             </p:txEl>
                                           </p:spTgt>
                                         </p:tgtEl>
@@ -14009,14 +14023,29 @@
         </p:spPr>
         <p:txBody>
           <a:bodyPr>
-            <a:normAutofit fontScale="92500" lnSpcReduction="10000"/>
+            <a:normAutofit/>
           </a:bodyPr>
           <a:lstStyle/>
           <a:p>
             <a:r>
-              <a:rPr lang="en-GB" dirty="0"/>
-              <a:t>The functions and processes of the system software were derived from the user stories of this project.</a:t>
+              <a:rPr lang="en-GB" dirty="0" smtClean="0"/>
+              <a:t>Derived from user stories.</a:t>
             </a:r>
+            <a:endParaRPr lang="en-GB" dirty="0"/>
+          </a:p>
+          <a:p>
+            <a:endParaRPr lang="en-GB" dirty="0"/>
+          </a:p>
+          <a:p>
+            <a:r>
+              <a:rPr lang="en-GB" dirty="0" smtClean="0"/>
+              <a:t>Categorise into primary and secondary functions</a:t>
+            </a:r>
+            <a:r>
+              <a:rPr lang="en-GB" dirty="0" smtClean="0"/>
+              <a:t>. </a:t>
+            </a:r>
+            <a:endParaRPr lang="en-GB" dirty="0"/>
           </a:p>
           <a:p>
             <a:endParaRPr lang="en-GB" dirty="0"/>
@@ -14024,17 +14053,34 @@
           <a:p>
             <a:r>
               <a:rPr lang="en-GB" dirty="0"/>
-              <a:t>From these functions, the team was able to categorise each function into primary and secondary functions. </a:t>
+              <a:t>Primary functions </a:t>
             </a:r>
-          </a:p>
-          <a:p>
-            <a:endParaRPr lang="en-GB" dirty="0"/>
-          </a:p>
-          <a:p>
+            <a:r>
+              <a:rPr lang="en-GB" dirty="0" smtClean="0"/>
+              <a:t>are essential.</a:t>
+            </a:r>
+          </a:p>
+          <a:p>
+            <a:endParaRPr lang="en-GB" dirty="0" smtClean="0"/>
+          </a:p>
+          <a:p>
+            <a:r>
+              <a:rPr lang="en-GB" dirty="0" smtClean="0"/>
+              <a:t>Secondary </a:t>
+            </a:r>
             <a:r>
               <a:rPr lang="en-GB" dirty="0"/>
-              <a:t>Primary functions are those which are very essential to the software product. Secondary functions are those which will help the user to perform extra features.</a:t>
+              <a:t>functions </a:t>
             </a:r>
+            <a:r>
+              <a:rPr lang="en-GB" dirty="0" smtClean="0"/>
+              <a:t>help the user to do more tasks</a:t>
+            </a:r>
+            <a:r>
+              <a:rPr lang="en-GB" dirty="0" smtClean="0"/>
+              <a:t>.</a:t>
+            </a:r>
+            <a:endParaRPr lang="en-GB" dirty="0"/>
           </a:p>
         </p:txBody>
       </p:sp>
@@ -14330,6 +14376,67 @@
                       </p:childTnLst>
                     </p:cTn>
                   </p:par>
+                  <p:par>
+                    <p:cTn id="26" fill="hold">
+                      <p:stCondLst>
+                        <p:cond delay="indefinite"/>
+                      </p:stCondLst>
+                      <p:childTnLst>
+                        <p:par>
+                          <p:cTn id="27" fill="hold">
+                            <p:stCondLst>
+                              <p:cond delay="0"/>
+                            </p:stCondLst>
+                            <p:childTnLst>
+                              <p:par>
+                                <p:cTn id="28" presetID="22" presetClass="entr" presetSubtype="8" fill="hold" nodeType="clickEffect">
+                                  <p:stCondLst>
+                                    <p:cond delay="0"/>
+                                  </p:stCondLst>
+                                  <p:childTnLst>
+                                    <p:set>
+                                      <p:cBhvr>
+                                        <p:cTn id="29" dur="1" fill="hold">
+                                          <p:stCondLst>
+                                            <p:cond delay="0"/>
+                                          </p:stCondLst>
+                                        </p:cTn>
+                                        <p:tgtEl>
+                                          <p:spTgt spid="3">
+                                            <p:txEl>
+                                              <p:pRg st="6" end="6"/>
+                                            </p:txEl>
+                                          </p:spTgt>
+                                        </p:tgtEl>
+                                        <p:attrNameLst>
+                                          <p:attrName>style.visibility</p:attrName>
+                                        </p:attrNameLst>
+                                      </p:cBhvr>
+                                      <p:to>
+                                        <p:strVal val="visible"/>
+                                      </p:to>
+                                    </p:set>
+                                    <p:animEffect transition="in" filter="wipe(left)">
+                                      <p:cBhvr>
+                                        <p:cTn id="30" dur="500"/>
+                                        <p:tgtEl>
+                                          <p:spTgt spid="3">
+                                            <p:txEl>
+                                              <p:pRg st="6" end="6"/>
+                                            </p:txEl>
+                                          </p:spTgt>
+                                        </p:tgtEl>
+                                      </p:cBhvr>
+                                    </p:animEffect>
+                                  </p:childTnLst>
+                                </p:cTn>
+                              </p:par>
+                            </p:childTnLst>
+                          </p:cTn>
+                        </p:par>
+                      </p:childTnLst>
+                    </p:cTn>
+                  </p:par>
                 </p:childTnLst>
               </p:cTn>
               <p:prevCondLst>
@@ -14525,9 +14632,18 @@
               </a:lnSpc>
             </a:pPr>
             <a:r>
-              <a:rPr lang="en-US" sz="2200" dirty="0"/>
-              <a:t>The use case diagram provided a clear visual flow but was unable to describe some steps in more detail.</a:t>
+              <a:rPr lang="en-US" sz="2200" dirty="0" smtClean="0"/>
+              <a:t>Unable to describe in detail.</a:t>
             </a:r>
+            <a:endParaRPr lang="en-US" sz="2200" dirty="0"/>
+          </a:p>
+          <a:p>
+            <a:pPr>
+              <a:lnSpc>
+                <a:spcPct val="110000"/>
+              </a:lnSpc>
+            </a:pPr>
+            <a:endParaRPr lang="en-US" sz="2200" dirty="0" smtClean="0"/>
           </a:p>
           <a:p>
             <a:pPr>
@@ -14544,9 +14660,18 @@
               </a:lnSpc>
             </a:pPr>
             <a:r>
-              <a:rPr lang="en-US" sz="2200" dirty="0"/>
-              <a:t>If more features were to be added, the diagram becomes more cluttered and will only get bigger.</a:t>
+              <a:rPr lang="en-US" sz="2200" dirty="0" smtClean="0"/>
+              <a:t>Can become cluttered and huge.</a:t>
             </a:r>
+            <a:endParaRPr lang="en-US" sz="2200" dirty="0"/>
+          </a:p>
+          <a:p>
+            <a:pPr>
+              <a:lnSpc>
+                <a:spcPct val="110000"/>
+              </a:lnSpc>
+            </a:pPr>
+            <a:endParaRPr lang="en-US" sz="2200" dirty="0" smtClean="0"/>
           </a:p>
           <a:p>
             <a:pPr>
@@ -14563,9 +14688,10 @@
               </a:lnSpc>
             </a:pPr>
             <a:r>
-              <a:rPr lang="en-US" sz="2200" dirty="0"/>
-              <a:t>Thus, expanded use cases were created to obtain an in-depth knowledge of these functions.</a:t>
+              <a:rPr lang="en-US" sz="2200" dirty="0" smtClean="0"/>
+              <a:t>Expanded Use Cases helped obtain in-depth information.</a:t>
             </a:r>
+            <a:endParaRPr lang="en-US" sz="2200" dirty="0"/>
           </a:p>
           <a:p>
             <a:pPr>
@@ -14847,7 +14973,7 @@
                                         <p:tgtEl>
                                           <p:spTgt spid="12">
                                             <p:txEl>
-                                              <p:pRg st="2" end="2"/>
+                                              <p:pRg st="3" end="3"/>
                                             </p:txEl>
                                           </p:spTgt>
                                         </p:tgtEl>
@@ -14865,7 +14991,7 @@
                                         <p:tgtEl>
                                           <p:spTgt spid="12">
                                             <p:txEl>
-                                              <p:pRg st="2" end="2"/>
+                                              <p:pRg st="3" end="3"/>
                                             </p:txEl>
                                           </p:spTgt>
                                         </p:tgtEl>
@@ -14908,7 +15034,7 @@
                                         <p:tgtEl>
                                           <p:spTgt spid="12">
                                             <p:txEl>
-                                              <p:pRg st="4" end="4"/>
+                                              <p:pRg st="6" end="6"/>
                                             </p:txEl>
                                           </p:spTgt>
                                         </p:tgtEl>
@@ -14926,7 +15052,7 @@
                                         <p:tgtEl>
                                           <p:spTgt spid="12">
                                             <p:txEl>
-                                              <p:pRg st="4" end="4"/>
+                                              <p:pRg st="6" end="6"/>
                                             </p:txEl>
                                           </p:spTgt>
                                         </p:tgtEl>
@@ -15243,19 +15369,35 @@
           </a:bodyPr>
           <a:lstStyle/>
           <a:p>
+            <a:endParaRPr lang="en-GB" dirty="0" smtClean="0"/>
+          </a:p>
+          <a:p>
             <a:r>
-              <a:rPr lang="en-GB" dirty="0"/>
-              <a:t>The detailed description from the expanded use case helped the team to sort out the weight of the tasks and assign them to each member equally.</a:t>
+              <a:rPr lang="en-GB" dirty="0" smtClean="0"/>
+              <a:t>Helped th</a:t>
             </a:r>
-          </a:p>
-          <a:p>
+            <a:r>
+              <a:rPr lang="en-GB" dirty="0" smtClean="0"/>
+              <a:t>e team to sort out the weight of tasks and get them assigned</a:t>
+            </a:r>
+            <a:r>
+              <a:rPr lang="en-GB" dirty="0" smtClean="0"/>
+              <a:t>.</a:t>
+            </a:r>
             <a:endParaRPr lang="en-GB" dirty="0"/>
           </a:p>
           <a:p>
+            <a:endParaRPr lang="en-GB" dirty="0" smtClean="0"/>
+          </a:p>
+          <a:p>
+            <a:endParaRPr lang="en-GB" dirty="0"/>
+          </a:p>
+          <a:p>
             <a:r>
-              <a:rPr lang="en-GB" dirty="0"/>
-              <a:t>The typical course of events enabled the team to understand the flow of processes in more detail and structure the query appropriately.</a:t>
+              <a:rPr lang="en-GB" dirty="0" smtClean="0"/>
+              <a:t>Enabled the team to understand the flow of process better.</a:t>
             </a:r>
+            <a:endParaRPr lang="en-GB" dirty="0"/>
           </a:p>
           <a:p>
             <a:endParaRPr lang="en-GB" dirty="0"/>
@@ -15385,7 +15527,7 @@
                                         <p:tgtEl>
                                           <p:spTgt spid="3">
                                             <p:txEl>
-                                              <p:pRg st="0" end="0"/>
+                                              <p:pRg st="1" end="1"/>
                                             </p:txEl>
                                           </p:spTgt>
                                         </p:tgtEl>
@@ -15403,7 +15545,7 @@
                                         <p:tgtEl>
                                           <p:spTgt spid="3">
                                             <p:txEl>
-                                              <p:pRg st="0" end="0"/>
+                                              <p:pRg st="1" end="1"/>
                                             </p:txEl>
                                           </p:spTgt>
                                         </p:tgtEl>
@@ -15481,7 +15623,7 @@
                                         <p:tgtEl>
                                           <p:spTgt spid="3">
                                             <p:txEl>
-                                              <p:pRg st="2" end="2"/>
+                                              <p:pRg st="4" end="4"/>
                                             </p:txEl>
                                           </p:spTgt>
                                         </p:tgtEl>
@@ -15499,7 +15641,7 @@
                                         <p:tgtEl>
                                           <p:spTgt spid="3">
                                             <p:txEl>
-                                              <p:pRg st="2" end="2"/>
+                                              <p:pRg st="4" end="4"/>
                                             </p:txEl>
                                           </p:spTgt>
                                         </p:tgtEl>
@@ -15699,22 +15841,21 @@
         </p:spPr>
         <p:txBody>
           <a:bodyPr>
-            <a:normAutofit fontScale="92500" lnSpcReduction="10000"/>
+            <a:normAutofit/>
           </a:bodyPr>
           <a:lstStyle/>
           <a:p>
             <a:r>
               <a:rPr lang="en-GB" dirty="0"/>
-              <a:t>Other methods to design user interaction with the system are creating Robustness Diagrams and Sequence Diagrams.</a:t>
+              <a:t>Other </a:t>
             </a:r>
-          </a:p>
-          <a:p>
-            <a:endParaRPr lang="en-GB" dirty="0"/>
-          </a:p>
-          <a:p>
+            <a:r>
+              <a:rPr lang="en-GB" dirty="0" smtClean="0"/>
+              <a:t>methods are Robustness </a:t>
+            </a:r>
             <a:r>
               <a:rPr lang="en-GB" dirty="0"/>
-              <a:t>Robustness diagrams are the simplified versions of UML class diagrams where each element has a specific purpose/action.</a:t>
+              <a:t>Diagrams and Sequence Diagrams.</a:t>
             </a:r>
           </a:p>
           <a:p>
@@ -15723,8 +15864,43 @@
           <a:p>
             <a:r>
               <a:rPr lang="en-GB" dirty="0"/>
-              <a:t>Sequence Diagrams display object interactions and sequence of messages exchanged between the user and the system.</a:t>
+              <a:t>Robustness diagrams </a:t>
             </a:r>
+            <a:r>
+              <a:rPr lang="en-GB" dirty="0" smtClean="0"/>
+              <a:t>- Simplified </a:t>
+            </a:r>
+            <a:r>
+              <a:rPr lang="en-GB" dirty="0"/>
+              <a:t>versions of UML class </a:t>
+            </a:r>
+            <a:r>
+              <a:rPr lang="en-GB" dirty="0" smtClean="0"/>
+              <a:t>diagrams.</a:t>
+            </a:r>
+            <a:endParaRPr lang="en-GB" dirty="0"/>
+          </a:p>
+          <a:p>
+            <a:endParaRPr lang="en-GB" dirty="0"/>
+          </a:p>
+          <a:p>
+            <a:r>
+              <a:rPr lang="en-GB" dirty="0"/>
+              <a:t>Sequence </a:t>
+            </a:r>
+            <a:r>
+              <a:rPr lang="en-GB" dirty="0" smtClean="0"/>
+              <a:t>Diagrams - Display </a:t>
+            </a:r>
+            <a:r>
+              <a:rPr lang="en-GB" dirty="0"/>
+              <a:t>object interactions and sequence of messages </a:t>
+            </a:r>
+            <a:r>
+              <a:rPr lang="en-GB" dirty="0" smtClean="0"/>
+              <a:t>exchanged.</a:t>
+            </a:r>
+            <a:endParaRPr lang="en-GB" dirty="0"/>
           </a:p>
           <a:p>
             <a:endParaRPr lang="en-GB" dirty="0"/>
@@ -16247,9 +16423,16 @@
           <a:lstStyle/>
           <a:p>
             <a:r>
+              <a:rPr lang="en-GB" dirty="0" smtClean="0"/>
+              <a:t>Still unable </a:t>
+            </a:r>
+            <a:r>
               <a:rPr lang="en-GB" dirty="0"/>
-              <a:t>The alternatives shown provide a useful visual flow but is still unable to explain each step in more detail.</a:t>
+              <a:t>to explain each step in more detail.</a:t>
             </a:r>
+          </a:p>
+          <a:p>
+            <a:endParaRPr lang="en-GB" dirty="0" smtClean="0"/>
           </a:p>
           <a:p>
             <a:endParaRPr lang="en-GB" dirty="0"/>
@@ -16261,12 +16444,19 @@
             </a:r>
           </a:p>
           <a:p>
+            <a:endParaRPr lang="en-GB" dirty="0" smtClean="0"/>
+          </a:p>
+          <a:p>
             <a:endParaRPr lang="en-GB" dirty="0"/>
           </a:p>
           <a:p>
+            <a:r>
+              <a:rPr lang="en-GB" dirty="0" smtClean="0"/>
+              <a:t>Easy </a:t>
+            </a:r>
             <a:r>
               <a:rPr lang="en-GB" dirty="0"/>
-              <a:t>It is very easy to implement and time-efficient.</a:t>
+              <a:t>to implement and time-efficient.</a:t>
             </a:r>
           </a:p>
         </p:txBody>
@@ -16434,7 +16624,7 @@
                                         <p:tgtEl>
                                           <p:spTgt spid="3">
                                             <p:txEl>
-                                              <p:pRg st="2" end="2"/>
+                                              <p:pRg st="3" end="3"/>
                                             </p:txEl>
                                           </p:spTgt>
                                         </p:tgtEl>
@@ -16452,7 +16642,7 @@
                                         <p:tgtEl>
                                           <p:spTgt spid="3">
                                             <p:txEl>
-                                              <p:pRg st="2" end="2"/>
+                                              <p:pRg st="3" end="3"/>
                                             </p:txEl>
                                           </p:spTgt>
                                         </p:tgtEl>
@@ -16495,7 +16685,7 @@
                                         <p:tgtEl>
                                           <p:spTgt spid="3">
                                             <p:txEl>
-                                              <p:pRg st="4" end="4"/>
+                                              <p:pRg st="6" end="6"/>
                                             </p:txEl>
                                           </p:spTgt>
                                         </p:tgtEl>
@@ -16513,7 +16703,7 @@
                                         <p:tgtEl>
                                           <p:spTgt spid="3">
                                             <p:txEl>
-                                              <p:pRg st="4" end="4"/>
+                                              <p:pRg st="6" end="6"/>
                                             </p:txEl>
                                           </p:spTgt>
                                         </p:tgtEl>
@@ -16629,8 +16819,44 @@
           <a:p>
             <a:r>
               <a:rPr lang="en-GB" dirty="0"/>
-              <a:t>http://www.comptechdoc.org/independent/uml/begin/umlexusecase.html</a:t>
+              <a:t>http://</a:t>
             </a:r>
+            <a:r>
+              <a:rPr lang="en-GB" dirty="0" smtClean="0"/>
+              <a:t>www.comptechdoc.org/independent/uml/begin/umlexusecase.html</a:t>
+            </a:r>
+          </a:p>
+          <a:p>
+            <a:endParaRPr lang="en-GB" dirty="0"/>
+          </a:p>
+          <a:p>
+            <a:r>
+              <a:rPr lang="en-GB" dirty="0"/>
+              <a:t>https://</a:t>
+            </a:r>
+            <a:r>
+              <a:rPr lang="en-GB" dirty="0" smtClean="0"/>
+              <a:t>gyires.inf.unideb.hu/GyBITT/07/ch03s05.html</a:t>
+            </a:r>
+          </a:p>
+          <a:p>
+            <a:endParaRPr lang="en-GB" dirty="0"/>
+          </a:p>
+          <a:p>
+            <a:r>
+              <a:rPr lang="en-GB" dirty="0"/>
+              <a:t>http://</a:t>
+            </a:r>
+            <a:r>
+              <a:rPr lang="en-GB" dirty="0" smtClean="0"/>
+              <a:t>www.agilemodeling.com/artifacts/sequenceDiagram.htm</a:t>
+            </a:r>
+          </a:p>
+          <a:p>
+            <a:endParaRPr lang="en-GB" dirty="0"/>
+          </a:p>
+          <a:p>
+            <a:endParaRPr lang="en-GB" dirty="0"/>
           </a:p>
           <a:p>
             <a:endParaRPr lang="en-GB" dirty="0"/>
@@ -16650,6 +16876,13 @@
   <p:transition spd="slow">
     <p:blinds/>
   </p:transition>
+  <p:timing>
+    <p:tnLst>
+      <p:par>
+        <p:cTn id="1" dur="indefinite" restart="never" nodeType="tmRoot"/>
+      </p:par>
+    </p:tnLst>
+  </p:timing>
 </p:sld>
 </file>
 

</xml_diff>